<commit_message>
CS 220 Lec 20 update
</commit_message>
<xml_diff>
--- a/tyler/meena/cs220/s20/materials/lec_20_S20.pptx
+++ b/tyler/meena/cs220/s20/materials/lec_20_S20.pptx
@@ -335,6 +335,11 @@
       </a:defRPr>
     </a:lvl9pPr>
   </p:defaultTextStyle>
+  <p:extLst>
+    <p:ext uri="{EFAFB233-063F-42B5-8137-9DF3F51BA10A}">
+      <p15:sldGuideLst xmlns:p15="http://schemas.microsoft.com/office/powerpoint/2012/main"/>
+    </p:ext>
+  </p:extLst>
 </p:presentation>
 </file>
 
@@ -2153,7 +2158,7 @@
           </a:ln>
           <a:extLst>
             <a:ext uri="{C572A759-6A51-4108-AA02-DFA0A04FC94B}">
-              <ma14:wrappingTextBoxFlag xmlns:ma14="http://schemas.microsoft.com/office/mac/drawingml/2011/main" xmlns:a14="http://schemas.microsoft.com/office/drawing/2010/main" xmlns:m="http://schemas.openxmlformats.org/officeDocument/2006/math" xmlns="" val="1"/>
+              <ma14:wrappingTextBoxFlag xmlns="" xmlns:m="http://schemas.openxmlformats.org/officeDocument/2006/math" xmlns:a14="http://schemas.microsoft.com/office/drawing/2010/main" xmlns:ma14="http://schemas.microsoft.com/office/mac/drawingml/2011/main" val="1"/>
             </a:ext>
           </a:extLst>
         </p:spPr>
@@ -2192,7 +2197,7 @@
           </a:ln>
           <a:extLst>
             <a:ext uri="{C572A759-6A51-4108-AA02-DFA0A04FC94B}">
-              <ma14:wrappingTextBoxFlag xmlns:ma14="http://schemas.microsoft.com/office/mac/drawingml/2011/main" xmlns:a14="http://schemas.microsoft.com/office/drawing/2010/main" xmlns:m="http://schemas.openxmlformats.org/officeDocument/2006/math" xmlns="" val="1"/>
+              <ma14:wrappingTextBoxFlag xmlns="" xmlns:m="http://schemas.openxmlformats.org/officeDocument/2006/math" xmlns:a14="http://schemas.microsoft.com/office/drawing/2010/main" xmlns:ma14="http://schemas.microsoft.com/office/mac/drawingml/2011/main" val="1"/>
             </a:ext>
           </a:extLst>
         </p:spPr>
@@ -3036,7 +3041,7 @@
         </p:nvSpPr>
         <p:spPr>
           <a:xfrm>
-            <a:off x="210740" y="1765300"/>
+            <a:off x="116610" y="412550"/>
             <a:ext cx="12583320" cy="3302000"/>
           </a:xfrm>
           <a:prstGeom prst="rect">
@@ -3087,7 +3092,7 @@
         </p:nvSpPr>
         <p:spPr>
           <a:xfrm>
-            <a:off x="1270000" y="5422900"/>
+            <a:off x="1175870" y="3903382"/>
             <a:ext cx="10464800" cy="1130300"/>
           </a:xfrm>
           <a:prstGeom prst="rect">
@@ -3098,7 +3103,7 @@
           </a:ln>
           <a:extLst>
             <a:ext uri="{C572A759-6A51-4108-AA02-DFA0A04FC94B}">
-              <ma14:wrappingTextBoxFlag xmlns="" xmlns:m="http://schemas.openxmlformats.org/officeDocument/2006/math" xmlns:a14="http://schemas.microsoft.com/office/drawing/2010/main" xmlns:ma14="http://schemas.microsoft.com/office/mac/drawingml/2011/main" val="1"/>
+              <ma14:wrappingTextBoxFlag xmlns:ma14="http://schemas.microsoft.com/office/mac/drawingml/2011/main" xmlns:a14="http://schemas.microsoft.com/office/drawing/2010/main" xmlns:m="http://schemas.openxmlformats.org/officeDocument/2006/math" xmlns="" val="1"/>
             </a:ext>
           </a:extLst>
         </p:spPr>
@@ -3410,8 +3415,8 @@
         </p:nvSpPr>
         <p:spPr bwMode="auto">
           <a:xfrm>
-            <a:off x="7721600" y="7124759"/>
-            <a:ext cx="4495800" cy="841256"/>
+            <a:off x="7721600" y="6755427"/>
+            <a:ext cx="4495800" cy="1579920"/>
           </a:xfrm>
           <a:prstGeom prst="rect">
             <a:avLst/>
@@ -3589,6 +3594,26 @@
               <a:t>(Through P4)</a:t>
             </a:r>
           </a:p>
+          <a:p>
+            <a:pPr algn="ctr" eaLnBrk="1"/>
+            <a:r>
+              <a:rPr lang="en-US" altLang="en-US" dirty="0">
+                <a:latin typeface="Helvetica Neue" panose="02000503000000020004" pitchFamily="2" charset="0"/>
+                <a:sym typeface="Helvetica Neue" panose="02000503000000020004" pitchFamily="2" charset="0"/>
+              </a:rPr>
+              <a:t>10 suspicious works for P5</a:t>
+            </a:r>
+          </a:p>
+          <a:p>
+            <a:pPr algn="ctr" eaLnBrk="1"/>
+            <a:r>
+              <a:rPr lang="en-US" altLang="en-US" dirty="0">
+                <a:latin typeface="Helvetica Neue" panose="02000503000000020004" pitchFamily="2" charset="0"/>
+                <a:sym typeface="Helvetica Neue" panose="02000503000000020004" pitchFamily="2" charset="0"/>
+              </a:rPr>
+              <a:t>(send Mike email to confess)</a:t>
+            </a:r>
+          </a:p>
         </p:txBody>
       </p:sp>
       <p:sp>
@@ -3607,8 +3632,8 @@
         </p:nvSpPr>
         <p:spPr bwMode="auto">
           <a:xfrm>
-            <a:off x="787401" y="7147044"/>
-            <a:ext cx="4495800" cy="841256"/>
+            <a:off x="787400" y="5022481"/>
+            <a:ext cx="4495800" cy="4534575"/>
           </a:xfrm>
           <a:prstGeom prst="rect">
             <a:avLst/>
@@ -3752,14 +3777,64 @@
             </a:lvl9pPr>
           </a:lstStyle>
           <a:p>
-            <a:pPr algn="ctr" eaLnBrk="1"/>
-            <a:r>
-              <a:rPr lang="en-US" altLang="en-US" dirty="0">
+            <a:pPr marL="457200" indent="-457200" algn="l" eaLnBrk="1">
+              <a:buFont typeface="Arial" panose="020B0604020202020204" pitchFamily="34" charset="0"/>
+              <a:buChar char="•"/>
+            </a:pPr>
+            <a:r>
+              <a:rPr lang="en-US" altLang="en-US" sz="3200" dirty="0">
+                <a:latin typeface="Helvetica Neue" panose="02000503000000020004" pitchFamily="2" charset="0"/>
+                <a:sym typeface="Helvetica Neue" panose="02000503000000020004" pitchFamily="2" charset="0"/>
+              </a:rPr>
+              <a:t>Open Worksheet from Website</a:t>
+            </a:r>
+          </a:p>
+          <a:p>
+            <a:pPr algn="l" eaLnBrk="1"/>
+            <a:endParaRPr lang="en-US" altLang="en-US" sz="3200" dirty="0">
+              <a:latin typeface="Helvetica Neue" panose="02000503000000020004" pitchFamily="2" charset="0"/>
+              <a:sym typeface="Helvetica Neue" panose="02000503000000020004" pitchFamily="2" charset="0"/>
+            </a:endParaRPr>
+          </a:p>
+          <a:p>
+            <a:pPr marL="457200" indent="-457200" algn="l" eaLnBrk="1">
+              <a:buFont typeface="Arial" panose="020B0604020202020204" pitchFamily="34" charset="0"/>
+              <a:buChar char="•"/>
+            </a:pPr>
+            <a:r>
+              <a:rPr lang="en-US" altLang="en-US" sz="3200" dirty="0">
                 <a:latin typeface="Helvetica Neue" panose="02000503000000020004" pitchFamily="2" charset="0"/>
                 <a:sym typeface="Helvetica Neue" panose="02000503000000020004" pitchFamily="2" charset="0"/>
               </a:rPr>
               <a:t>Do not post &gt; 5 lines on Piazza!</a:t>
             </a:r>
+          </a:p>
+          <a:p>
+            <a:pPr algn="l" eaLnBrk="1"/>
+            <a:endParaRPr lang="en-US" altLang="en-US" sz="3200" dirty="0">
+              <a:latin typeface="Helvetica Neue" panose="02000503000000020004" pitchFamily="2" charset="0"/>
+              <a:sym typeface="Helvetica Neue" panose="02000503000000020004" pitchFamily="2" charset="0"/>
+            </a:endParaRPr>
+          </a:p>
+          <a:p>
+            <a:pPr marL="457200" indent="-457200" algn="l" eaLnBrk="1">
+              <a:buFont typeface="Arial" panose="020B0604020202020204" pitchFamily="34" charset="0"/>
+              <a:buChar char="•"/>
+            </a:pPr>
+            <a:r>
+              <a:rPr lang="en-US" altLang="en-US" sz="3200" dirty="0">
+                <a:latin typeface="Helvetica Neue" panose="02000503000000020004" pitchFamily="2" charset="0"/>
+                <a:sym typeface="Helvetica Neue" panose="02000503000000020004" pitchFamily="2" charset="0"/>
+              </a:rPr>
+              <a:t>Open Slides and Idle to follow along</a:t>
+            </a:r>
+          </a:p>
+          <a:p>
+            <a:pPr algn="ctr" eaLnBrk="1"/>
+            <a:endParaRPr lang="en-US" altLang="en-US" sz="3200" dirty="0">
+              <a:latin typeface="Helvetica Neue" panose="02000503000000020004" pitchFamily="2" charset="0"/>
+              <a:sym typeface="Helvetica Neue" panose="02000503000000020004" pitchFamily="2" charset="0"/>
+            </a:endParaRPr>
           </a:p>
         </p:txBody>
       </p:sp>
@@ -3927,7 +4002,7 @@
           </a:ln>
           <a:extLst>
             <a:ext uri="{C572A759-6A51-4108-AA02-DFA0A04FC94B}">
-              <ma14:wrappingTextBoxFlag xmlns:ma14="http://schemas.microsoft.com/office/mac/drawingml/2011/main" xmlns:a14="http://schemas.microsoft.com/office/drawing/2010/main" xmlns:m="http://schemas.openxmlformats.org/officeDocument/2006/math" xmlns="" val="1"/>
+              <ma14:wrappingTextBoxFlag xmlns="" xmlns:m="http://schemas.openxmlformats.org/officeDocument/2006/math" xmlns:a14="http://schemas.microsoft.com/office/drawing/2010/main" xmlns:ma14="http://schemas.microsoft.com/office/mac/drawingml/2011/main" val="1"/>
             </a:ext>
           </a:extLst>
         </p:spPr>
@@ -3962,7 +4037,7 @@
           </a:ln>
           <a:extLst>
             <a:ext uri="{C572A759-6A51-4108-AA02-DFA0A04FC94B}">
-              <ma14:wrappingTextBoxFlag xmlns:ma14="http://schemas.microsoft.com/office/mac/drawingml/2011/main" xmlns:a14="http://schemas.microsoft.com/office/drawing/2010/main" xmlns:m="http://schemas.openxmlformats.org/officeDocument/2006/math" xmlns="" val="1"/>
+              <ma14:wrappingTextBoxFlag xmlns="" xmlns:m="http://schemas.openxmlformats.org/officeDocument/2006/math" xmlns:a14="http://schemas.microsoft.com/office/drawing/2010/main" xmlns:ma14="http://schemas.microsoft.com/office/mac/drawingml/2011/main" val="1"/>
             </a:ext>
           </a:extLst>
         </p:spPr>
@@ -3997,7 +4072,7 @@
           </a:ln>
           <a:extLst>
             <a:ext uri="{C572A759-6A51-4108-AA02-DFA0A04FC94B}">
-              <ma14:wrappingTextBoxFlag xmlns:ma14="http://schemas.microsoft.com/office/mac/drawingml/2011/main" xmlns:a14="http://schemas.microsoft.com/office/drawing/2010/main" xmlns:m="http://schemas.openxmlformats.org/officeDocument/2006/math" xmlns="" val="1"/>
+              <ma14:wrappingTextBoxFlag xmlns="" xmlns:m="http://schemas.openxmlformats.org/officeDocument/2006/math" xmlns:a14="http://schemas.microsoft.com/office/drawing/2010/main" xmlns:ma14="http://schemas.microsoft.com/office/mac/drawingml/2011/main" val="1"/>
             </a:ext>
           </a:extLst>
         </p:spPr>
@@ -4095,7 +4170,7 @@
           </a:ln>
           <a:extLst>
             <a:ext uri="{C572A759-6A51-4108-AA02-DFA0A04FC94B}">
-              <ma14:wrappingTextBoxFlag xmlns:ma14="http://schemas.microsoft.com/office/mac/drawingml/2011/main" xmlns:a14="http://schemas.microsoft.com/office/drawing/2010/main" xmlns:m="http://schemas.openxmlformats.org/officeDocument/2006/math" xmlns="" val="1"/>
+              <ma14:wrappingTextBoxFlag xmlns="" xmlns:m="http://schemas.openxmlformats.org/officeDocument/2006/math" xmlns:a14="http://schemas.microsoft.com/office/drawing/2010/main" xmlns:ma14="http://schemas.microsoft.com/office/mac/drawingml/2011/main" val="1"/>
             </a:ext>
           </a:extLst>
         </p:spPr>
@@ -4164,7 +4239,7 @@
           </a:ln>
           <a:extLst>
             <a:ext uri="{C572A759-6A51-4108-AA02-DFA0A04FC94B}">
-              <ma14:wrappingTextBoxFlag xmlns:ma14="http://schemas.microsoft.com/office/mac/drawingml/2011/main" xmlns:a14="http://schemas.microsoft.com/office/drawing/2010/main" xmlns:m="http://schemas.openxmlformats.org/officeDocument/2006/math" xmlns="" val="1"/>
+              <ma14:wrappingTextBoxFlag xmlns="" xmlns:m="http://schemas.openxmlformats.org/officeDocument/2006/math" xmlns:a14="http://schemas.microsoft.com/office/drawing/2010/main" xmlns:ma14="http://schemas.microsoft.com/office/mac/drawingml/2011/main" val="1"/>
             </a:ext>
           </a:extLst>
         </p:spPr>
@@ -4211,7 +4286,7 @@
           </a:ln>
           <a:extLst>
             <a:ext uri="{C572A759-6A51-4108-AA02-DFA0A04FC94B}">
-              <ma14:wrappingTextBoxFlag xmlns:ma14="http://schemas.microsoft.com/office/mac/drawingml/2011/main" xmlns:a14="http://schemas.microsoft.com/office/drawing/2010/main" xmlns:m="http://schemas.openxmlformats.org/officeDocument/2006/math" xmlns="" val="1"/>
+              <ma14:wrappingTextBoxFlag xmlns="" xmlns:m="http://schemas.openxmlformats.org/officeDocument/2006/math" xmlns:a14="http://schemas.microsoft.com/office/drawing/2010/main" xmlns:ma14="http://schemas.microsoft.com/office/mac/drawingml/2011/main" val="1"/>
             </a:ext>
           </a:extLst>
         </p:spPr>
@@ -4258,7 +4333,7 @@
           </a:ln>
           <a:extLst>
             <a:ext uri="{C572A759-6A51-4108-AA02-DFA0A04FC94B}">
-              <ma14:wrappingTextBoxFlag xmlns:ma14="http://schemas.microsoft.com/office/mac/drawingml/2011/main" xmlns:a14="http://schemas.microsoft.com/office/drawing/2010/main" xmlns:m="http://schemas.openxmlformats.org/officeDocument/2006/math" xmlns="" val="1"/>
+              <ma14:wrappingTextBoxFlag xmlns="" xmlns:m="http://schemas.openxmlformats.org/officeDocument/2006/math" xmlns:a14="http://schemas.microsoft.com/office/drawing/2010/main" xmlns:ma14="http://schemas.microsoft.com/office/mac/drawingml/2011/main" val="1"/>
             </a:ext>
           </a:extLst>
         </p:spPr>
@@ -4444,7 +4519,7 @@
           </a:ln>
           <a:extLst>
             <a:ext uri="{C572A759-6A51-4108-AA02-DFA0A04FC94B}">
-              <ma14:wrappingTextBoxFlag xmlns:ma14="http://schemas.microsoft.com/office/mac/drawingml/2011/main" xmlns:a14="http://schemas.microsoft.com/office/drawing/2010/main" xmlns:m="http://schemas.openxmlformats.org/officeDocument/2006/math" xmlns="" val="1"/>
+              <ma14:wrappingTextBoxFlag xmlns="" xmlns:m="http://schemas.openxmlformats.org/officeDocument/2006/math" xmlns:a14="http://schemas.microsoft.com/office/drawing/2010/main" xmlns:ma14="http://schemas.microsoft.com/office/mac/drawingml/2011/main" val="1"/>
             </a:ext>
           </a:extLst>
         </p:spPr>
@@ -4536,7 +4611,7 @@
           </a:ln>
           <a:extLst>
             <a:ext uri="{C572A759-6A51-4108-AA02-DFA0A04FC94B}">
-              <ma14:wrappingTextBoxFlag xmlns:ma14="http://schemas.microsoft.com/office/mac/drawingml/2011/main" xmlns:a14="http://schemas.microsoft.com/office/drawing/2010/main" xmlns:m="http://schemas.openxmlformats.org/officeDocument/2006/math" xmlns="" val="1"/>
+              <ma14:wrappingTextBoxFlag xmlns="" xmlns:m="http://schemas.openxmlformats.org/officeDocument/2006/math" xmlns:a14="http://schemas.microsoft.com/office/drawing/2010/main" xmlns:ma14="http://schemas.microsoft.com/office/mac/drawingml/2011/main" val="1"/>
             </a:ext>
           </a:extLst>
         </p:spPr>
@@ -4661,7 +4736,7 @@
           </a:ln>
           <a:extLst>
             <a:ext uri="{C572A759-6A51-4108-AA02-DFA0A04FC94B}">
-              <ma14:wrappingTextBoxFlag xmlns:ma14="http://schemas.microsoft.com/office/mac/drawingml/2011/main" xmlns:a14="http://schemas.microsoft.com/office/drawing/2010/main" xmlns:m="http://schemas.openxmlformats.org/officeDocument/2006/math" xmlns="" val="1"/>
+              <ma14:wrappingTextBoxFlag xmlns="" xmlns:m="http://schemas.openxmlformats.org/officeDocument/2006/math" xmlns:a14="http://schemas.microsoft.com/office/drawing/2010/main" xmlns:ma14="http://schemas.microsoft.com/office/mac/drawingml/2011/main" val="1"/>
             </a:ext>
           </a:extLst>
         </p:spPr>
@@ -4771,7 +4846,7 @@
           </a:ln>
           <a:extLst>
             <a:ext uri="{C572A759-6A51-4108-AA02-DFA0A04FC94B}">
-              <ma14:wrappingTextBoxFlag xmlns:ma14="http://schemas.microsoft.com/office/mac/drawingml/2011/main" xmlns:a14="http://schemas.microsoft.com/office/drawing/2010/main" xmlns:m="http://schemas.openxmlformats.org/officeDocument/2006/math" xmlns="" val="1"/>
+              <ma14:wrappingTextBoxFlag xmlns="" xmlns:m="http://schemas.openxmlformats.org/officeDocument/2006/math" xmlns:a14="http://schemas.microsoft.com/office/drawing/2010/main" xmlns:ma14="http://schemas.microsoft.com/office/mac/drawingml/2011/main" val="1"/>
             </a:ext>
           </a:extLst>
         </p:spPr>
@@ -4889,7 +4964,7 @@
           </a:ln>
           <a:extLst>
             <a:ext uri="{C572A759-6A51-4108-AA02-DFA0A04FC94B}">
-              <ma14:wrappingTextBoxFlag xmlns:ma14="http://schemas.microsoft.com/office/mac/drawingml/2011/main" xmlns:a14="http://schemas.microsoft.com/office/drawing/2010/main" xmlns:m="http://schemas.openxmlformats.org/officeDocument/2006/math" xmlns="" val="1"/>
+              <ma14:wrappingTextBoxFlag xmlns="" xmlns:m="http://schemas.openxmlformats.org/officeDocument/2006/math" xmlns:a14="http://schemas.microsoft.com/office/drawing/2010/main" xmlns:ma14="http://schemas.microsoft.com/office/mac/drawingml/2011/main" val="1"/>
             </a:ext>
           </a:extLst>
         </p:spPr>
@@ -5081,7 +5156,7 @@
           </a:ln>
           <a:extLst>
             <a:ext uri="{C572A759-6A51-4108-AA02-DFA0A04FC94B}">
-              <ma14:wrappingTextBoxFlag xmlns:ma14="http://schemas.microsoft.com/office/mac/drawingml/2011/main" xmlns:a14="http://schemas.microsoft.com/office/drawing/2010/main" xmlns:m="http://schemas.openxmlformats.org/officeDocument/2006/math" xmlns="" val="1"/>
+              <ma14:wrappingTextBoxFlag xmlns="" xmlns:m="http://schemas.openxmlformats.org/officeDocument/2006/math" xmlns:a14="http://schemas.microsoft.com/office/drawing/2010/main" xmlns:ma14="http://schemas.microsoft.com/office/mac/drawingml/2011/main" val="1"/>
             </a:ext>
           </a:extLst>
         </p:spPr>
@@ -5116,7 +5191,7 @@
           </a:ln>
           <a:extLst>
             <a:ext uri="{C572A759-6A51-4108-AA02-DFA0A04FC94B}">
-              <ma14:wrappingTextBoxFlag xmlns:ma14="http://schemas.microsoft.com/office/mac/drawingml/2011/main" xmlns:a14="http://schemas.microsoft.com/office/drawing/2010/main" xmlns:m="http://schemas.openxmlformats.org/officeDocument/2006/math" xmlns="" val="1"/>
+              <ma14:wrappingTextBoxFlag xmlns="" xmlns:m="http://schemas.openxmlformats.org/officeDocument/2006/math" xmlns:a14="http://schemas.microsoft.com/office/drawing/2010/main" xmlns:ma14="http://schemas.microsoft.com/office/mac/drawingml/2011/main" val="1"/>
             </a:ext>
           </a:extLst>
         </p:spPr>
@@ -5151,7 +5226,7 @@
           </a:ln>
           <a:extLst>
             <a:ext uri="{C572A759-6A51-4108-AA02-DFA0A04FC94B}">
-              <ma14:wrappingTextBoxFlag xmlns:ma14="http://schemas.microsoft.com/office/mac/drawingml/2011/main" xmlns:a14="http://schemas.microsoft.com/office/drawing/2010/main" xmlns:m="http://schemas.openxmlformats.org/officeDocument/2006/math" xmlns="" val="1"/>
+              <ma14:wrappingTextBoxFlag xmlns="" xmlns:m="http://schemas.openxmlformats.org/officeDocument/2006/math" xmlns:a14="http://schemas.microsoft.com/office/drawing/2010/main" xmlns:ma14="http://schemas.microsoft.com/office/mac/drawingml/2011/main" val="1"/>
             </a:ext>
           </a:extLst>
         </p:spPr>
@@ -5249,7 +5324,7 @@
           </a:ln>
           <a:extLst>
             <a:ext uri="{C572A759-6A51-4108-AA02-DFA0A04FC94B}">
-              <ma14:wrappingTextBoxFlag xmlns:ma14="http://schemas.microsoft.com/office/mac/drawingml/2011/main" xmlns:a14="http://schemas.microsoft.com/office/drawing/2010/main" xmlns:m="http://schemas.openxmlformats.org/officeDocument/2006/math" xmlns="" val="1"/>
+              <ma14:wrappingTextBoxFlag xmlns="" xmlns:m="http://schemas.openxmlformats.org/officeDocument/2006/math" xmlns:a14="http://schemas.microsoft.com/office/drawing/2010/main" xmlns:ma14="http://schemas.microsoft.com/office/mac/drawingml/2011/main" val="1"/>
             </a:ext>
           </a:extLst>
         </p:spPr>
@@ -5318,7 +5393,7 @@
           </a:ln>
           <a:extLst>
             <a:ext uri="{C572A759-6A51-4108-AA02-DFA0A04FC94B}">
-              <ma14:wrappingTextBoxFlag xmlns:ma14="http://schemas.microsoft.com/office/mac/drawingml/2011/main" xmlns:a14="http://schemas.microsoft.com/office/drawing/2010/main" xmlns:m="http://schemas.openxmlformats.org/officeDocument/2006/math" xmlns="" val="1"/>
+              <ma14:wrappingTextBoxFlag xmlns="" xmlns:m="http://schemas.openxmlformats.org/officeDocument/2006/math" xmlns:a14="http://schemas.microsoft.com/office/drawing/2010/main" xmlns:ma14="http://schemas.microsoft.com/office/mac/drawingml/2011/main" val="1"/>
             </a:ext>
           </a:extLst>
         </p:spPr>
@@ -5365,7 +5440,7 @@
           </a:ln>
           <a:extLst>
             <a:ext uri="{C572A759-6A51-4108-AA02-DFA0A04FC94B}">
-              <ma14:wrappingTextBoxFlag xmlns:ma14="http://schemas.microsoft.com/office/mac/drawingml/2011/main" xmlns:a14="http://schemas.microsoft.com/office/drawing/2010/main" xmlns:m="http://schemas.openxmlformats.org/officeDocument/2006/math" xmlns="" val="1"/>
+              <ma14:wrappingTextBoxFlag xmlns="" xmlns:m="http://schemas.openxmlformats.org/officeDocument/2006/math" xmlns:a14="http://schemas.microsoft.com/office/drawing/2010/main" xmlns:ma14="http://schemas.microsoft.com/office/mac/drawingml/2011/main" val="1"/>
             </a:ext>
           </a:extLst>
         </p:spPr>
@@ -5412,7 +5487,7 @@
           </a:ln>
           <a:extLst>
             <a:ext uri="{C572A759-6A51-4108-AA02-DFA0A04FC94B}">
-              <ma14:wrappingTextBoxFlag xmlns:ma14="http://schemas.microsoft.com/office/mac/drawingml/2011/main" xmlns:a14="http://schemas.microsoft.com/office/drawing/2010/main" xmlns:m="http://schemas.openxmlformats.org/officeDocument/2006/math" xmlns="" val="1"/>
+              <ma14:wrappingTextBoxFlag xmlns="" xmlns:m="http://schemas.openxmlformats.org/officeDocument/2006/math" xmlns:a14="http://schemas.microsoft.com/office/drawing/2010/main" xmlns:ma14="http://schemas.microsoft.com/office/mac/drawingml/2011/main" val="1"/>
             </a:ext>
           </a:extLst>
         </p:spPr>
@@ -5598,7 +5673,7 @@
           </a:ln>
           <a:extLst>
             <a:ext uri="{C572A759-6A51-4108-AA02-DFA0A04FC94B}">
-              <ma14:wrappingTextBoxFlag xmlns:ma14="http://schemas.microsoft.com/office/mac/drawingml/2011/main" xmlns:a14="http://schemas.microsoft.com/office/drawing/2010/main" xmlns:m="http://schemas.openxmlformats.org/officeDocument/2006/math" xmlns="" val="1"/>
+              <ma14:wrappingTextBoxFlag xmlns="" xmlns:m="http://schemas.openxmlformats.org/officeDocument/2006/math" xmlns:a14="http://schemas.microsoft.com/office/drawing/2010/main" xmlns:ma14="http://schemas.microsoft.com/office/mac/drawingml/2011/main" val="1"/>
             </a:ext>
           </a:extLst>
         </p:spPr>
@@ -5690,7 +5765,7 @@
           </a:ln>
           <a:extLst>
             <a:ext uri="{C572A759-6A51-4108-AA02-DFA0A04FC94B}">
-              <ma14:wrappingTextBoxFlag xmlns:ma14="http://schemas.microsoft.com/office/mac/drawingml/2011/main" xmlns:a14="http://schemas.microsoft.com/office/drawing/2010/main" xmlns:m="http://schemas.openxmlformats.org/officeDocument/2006/math" xmlns="" val="1"/>
+              <ma14:wrappingTextBoxFlag xmlns="" xmlns:m="http://schemas.openxmlformats.org/officeDocument/2006/math" xmlns:a14="http://schemas.microsoft.com/office/drawing/2010/main" xmlns:ma14="http://schemas.microsoft.com/office/mac/drawingml/2011/main" val="1"/>
             </a:ext>
           </a:extLst>
         </p:spPr>
@@ -5815,7 +5890,7 @@
           </a:ln>
           <a:extLst>
             <a:ext uri="{C572A759-6A51-4108-AA02-DFA0A04FC94B}">
-              <ma14:wrappingTextBoxFlag xmlns:ma14="http://schemas.microsoft.com/office/mac/drawingml/2011/main" xmlns:a14="http://schemas.microsoft.com/office/drawing/2010/main" xmlns:m="http://schemas.openxmlformats.org/officeDocument/2006/math" xmlns="" val="1"/>
+              <ma14:wrappingTextBoxFlag xmlns="" xmlns:m="http://schemas.openxmlformats.org/officeDocument/2006/math" xmlns:a14="http://schemas.microsoft.com/office/drawing/2010/main" xmlns:ma14="http://schemas.microsoft.com/office/mac/drawingml/2011/main" val="1"/>
             </a:ext>
           </a:extLst>
         </p:spPr>
@@ -5925,7 +6000,7 @@
           </a:ln>
           <a:extLst>
             <a:ext uri="{C572A759-6A51-4108-AA02-DFA0A04FC94B}">
-              <ma14:wrappingTextBoxFlag xmlns:ma14="http://schemas.microsoft.com/office/mac/drawingml/2011/main" xmlns:a14="http://schemas.microsoft.com/office/drawing/2010/main" xmlns:m="http://schemas.openxmlformats.org/officeDocument/2006/math" xmlns="" val="1"/>
+              <ma14:wrappingTextBoxFlag xmlns="" xmlns:m="http://schemas.openxmlformats.org/officeDocument/2006/math" xmlns:a14="http://schemas.microsoft.com/office/drawing/2010/main" xmlns:ma14="http://schemas.microsoft.com/office/mac/drawingml/2011/main" val="1"/>
             </a:ext>
           </a:extLst>
         </p:spPr>
@@ -6043,7 +6118,7 @@
           </a:ln>
           <a:extLst>
             <a:ext uri="{C572A759-6A51-4108-AA02-DFA0A04FC94B}">
-              <ma14:wrappingTextBoxFlag xmlns:ma14="http://schemas.microsoft.com/office/mac/drawingml/2011/main" xmlns:a14="http://schemas.microsoft.com/office/drawing/2010/main" xmlns:m="http://schemas.openxmlformats.org/officeDocument/2006/math" xmlns="" val="1"/>
+              <ma14:wrappingTextBoxFlag xmlns="" xmlns:m="http://schemas.openxmlformats.org/officeDocument/2006/math" xmlns:a14="http://schemas.microsoft.com/office/drawing/2010/main" xmlns:ma14="http://schemas.microsoft.com/office/mac/drawingml/2011/main" val="1"/>
             </a:ext>
           </a:extLst>
         </p:spPr>
@@ -6235,7 +6310,7 @@
           </a:ln>
           <a:extLst>
             <a:ext uri="{C572A759-6A51-4108-AA02-DFA0A04FC94B}">
-              <ma14:wrappingTextBoxFlag xmlns:ma14="http://schemas.microsoft.com/office/mac/drawingml/2011/main" xmlns:a14="http://schemas.microsoft.com/office/drawing/2010/main" xmlns:m="http://schemas.openxmlformats.org/officeDocument/2006/math" xmlns="" val="1"/>
+              <ma14:wrappingTextBoxFlag xmlns="" xmlns:m="http://schemas.openxmlformats.org/officeDocument/2006/math" xmlns:a14="http://schemas.microsoft.com/office/drawing/2010/main" xmlns:ma14="http://schemas.microsoft.com/office/mac/drawingml/2011/main" val="1"/>
             </a:ext>
           </a:extLst>
         </p:spPr>
@@ -6270,7 +6345,7 @@
           </a:ln>
           <a:extLst>
             <a:ext uri="{C572A759-6A51-4108-AA02-DFA0A04FC94B}">
-              <ma14:wrappingTextBoxFlag xmlns:ma14="http://schemas.microsoft.com/office/mac/drawingml/2011/main" xmlns:a14="http://schemas.microsoft.com/office/drawing/2010/main" xmlns:m="http://schemas.openxmlformats.org/officeDocument/2006/math" xmlns="" val="1"/>
+              <ma14:wrappingTextBoxFlag xmlns="" xmlns:m="http://schemas.openxmlformats.org/officeDocument/2006/math" xmlns:a14="http://schemas.microsoft.com/office/drawing/2010/main" xmlns:ma14="http://schemas.microsoft.com/office/mac/drawingml/2011/main" val="1"/>
             </a:ext>
           </a:extLst>
         </p:spPr>
@@ -6305,7 +6380,7 @@
           </a:ln>
           <a:extLst>
             <a:ext uri="{C572A759-6A51-4108-AA02-DFA0A04FC94B}">
-              <ma14:wrappingTextBoxFlag xmlns:ma14="http://schemas.microsoft.com/office/mac/drawingml/2011/main" xmlns:a14="http://schemas.microsoft.com/office/drawing/2010/main" xmlns:m="http://schemas.openxmlformats.org/officeDocument/2006/math" xmlns="" val="1"/>
+              <ma14:wrappingTextBoxFlag xmlns="" xmlns:m="http://schemas.openxmlformats.org/officeDocument/2006/math" xmlns:a14="http://schemas.microsoft.com/office/drawing/2010/main" xmlns:ma14="http://schemas.microsoft.com/office/mac/drawingml/2011/main" val="1"/>
             </a:ext>
           </a:extLst>
         </p:spPr>
@@ -6403,7 +6478,7 @@
           </a:ln>
           <a:extLst>
             <a:ext uri="{C572A759-6A51-4108-AA02-DFA0A04FC94B}">
-              <ma14:wrappingTextBoxFlag xmlns:ma14="http://schemas.microsoft.com/office/mac/drawingml/2011/main" xmlns:a14="http://schemas.microsoft.com/office/drawing/2010/main" xmlns:m="http://schemas.openxmlformats.org/officeDocument/2006/math" xmlns="" val="1"/>
+              <ma14:wrappingTextBoxFlag xmlns="" xmlns:m="http://schemas.openxmlformats.org/officeDocument/2006/math" xmlns:a14="http://schemas.microsoft.com/office/drawing/2010/main" xmlns:ma14="http://schemas.microsoft.com/office/mac/drawingml/2011/main" val="1"/>
             </a:ext>
           </a:extLst>
         </p:spPr>
@@ -6472,7 +6547,7 @@
           </a:ln>
           <a:extLst>
             <a:ext uri="{C572A759-6A51-4108-AA02-DFA0A04FC94B}">
-              <ma14:wrappingTextBoxFlag xmlns:ma14="http://schemas.microsoft.com/office/mac/drawingml/2011/main" xmlns:a14="http://schemas.microsoft.com/office/drawing/2010/main" xmlns:m="http://schemas.openxmlformats.org/officeDocument/2006/math" xmlns="" val="1"/>
+              <ma14:wrappingTextBoxFlag xmlns="" xmlns:m="http://schemas.openxmlformats.org/officeDocument/2006/math" xmlns:a14="http://schemas.microsoft.com/office/drawing/2010/main" xmlns:ma14="http://schemas.microsoft.com/office/mac/drawingml/2011/main" val="1"/>
             </a:ext>
           </a:extLst>
         </p:spPr>
@@ -6519,7 +6594,7 @@
           </a:ln>
           <a:extLst>
             <a:ext uri="{C572A759-6A51-4108-AA02-DFA0A04FC94B}">
-              <ma14:wrappingTextBoxFlag xmlns:ma14="http://schemas.microsoft.com/office/mac/drawingml/2011/main" xmlns:a14="http://schemas.microsoft.com/office/drawing/2010/main" xmlns:m="http://schemas.openxmlformats.org/officeDocument/2006/math" xmlns="" val="1"/>
+              <ma14:wrappingTextBoxFlag xmlns="" xmlns:m="http://schemas.openxmlformats.org/officeDocument/2006/math" xmlns:a14="http://schemas.microsoft.com/office/drawing/2010/main" xmlns:ma14="http://schemas.microsoft.com/office/mac/drawingml/2011/main" val="1"/>
             </a:ext>
           </a:extLst>
         </p:spPr>
@@ -6566,7 +6641,7 @@
           </a:ln>
           <a:extLst>
             <a:ext uri="{C572A759-6A51-4108-AA02-DFA0A04FC94B}">
-              <ma14:wrappingTextBoxFlag xmlns:ma14="http://schemas.microsoft.com/office/mac/drawingml/2011/main" xmlns:a14="http://schemas.microsoft.com/office/drawing/2010/main" xmlns:m="http://schemas.openxmlformats.org/officeDocument/2006/math" xmlns="" val="1"/>
+              <ma14:wrappingTextBoxFlag xmlns="" xmlns:m="http://schemas.openxmlformats.org/officeDocument/2006/math" xmlns:a14="http://schemas.microsoft.com/office/drawing/2010/main" xmlns:ma14="http://schemas.microsoft.com/office/mac/drawingml/2011/main" val="1"/>
             </a:ext>
           </a:extLst>
         </p:spPr>
@@ -6752,7 +6827,7 @@
           </a:ln>
           <a:extLst>
             <a:ext uri="{C572A759-6A51-4108-AA02-DFA0A04FC94B}">
-              <ma14:wrappingTextBoxFlag xmlns:ma14="http://schemas.microsoft.com/office/mac/drawingml/2011/main" xmlns:a14="http://schemas.microsoft.com/office/drawing/2010/main" xmlns:m="http://schemas.openxmlformats.org/officeDocument/2006/math" xmlns="" val="1"/>
+              <ma14:wrappingTextBoxFlag xmlns="" xmlns:m="http://schemas.openxmlformats.org/officeDocument/2006/math" xmlns:a14="http://schemas.microsoft.com/office/drawing/2010/main" xmlns:ma14="http://schemas.microsoft.com/office/mac/drawingml/2011/main" val="1"/>
             </a:ext>
           </a:extLst>
         </p:spPr>
@@ -6844,7 +6919,7 @@
           </a:ln>
           <a:extLst>
             <a:ext uri="{C572A759-6A51-4108-AA02-DFA0A04FC94B}">
-              <ma14:wrappingTextBoxFlag xmlns:ma14="http://schemas.microsoft.com/office/mac/drawingml/2011/main" xmlns:a14="http://schemas.microsoft.com/office/drawing/2010/main" xmlns:m="http://schemas.openxmlformats.org/officeDocument/2006/math" xmlns="" val="1"/>
+              <ma14:wrappingTextBoxFlag xmlns="" xmlns:m="http://schemas.openxmlformats.org/officeDocument/2006/math" xmlns:a14="http://schemas.microsoft.com/office/drawing/2010/main" xmlns:ma14="http://schemas.microsoft.com/office/mac/drawingml/2011/main" val="1"/>
             </a:ext>
           </a:extLst>
         </p:spPr>
@@ -6969,7 +7044,7 @@
           </a:ln>
           <a:extLst>
             <a:ext uri="{C572A759-6A51-4108-AA02-DFA0A04FC94B}">
-              <ma14:wrappingTextBoxFlag xmlns:ma14="http://schemas.microsoft.com/office/mac/drawingml/2011/main" xmlns:a14="http://schemas.microsoft.com/office/drawing/2010/main" xmlns:m="http://schemas.openxmlformats.org/officeDocument/2006/math" xmlns="" val="1"/>
+              <ma14:wrappingTextBoxFlag xmlns="" xmlns:m="http://schemas.openxmlformats.org/officeDocument/2006/math" xmlns:a14="http://schemas.microsoft.com/office/drawing/2010/main" xmlns:ma14="http://schemas.microsoft.com/office/mac/drawingml/2011/main" val="1"/>
             </a:ext>
           </a:extLst>
         </p:spPr>
@@ -7079,7 +7154,7 @@
           </a:ln>
           <a:extLst>
             <a:ext uri="{C572A759-6A51-4108-AA02-DFA0A04FC94B}">
-              <ma14:wrappingTextBoxFlag xmlns:ma14="http://schemas.microsoft.com/office/mac/drawingml/2011/main" xmlns:a14="http://schemas.microsoft.com/office/drawing/2010/main" xmlns:m="http://schemas.openxmlformats.org/officeDocument/2006/math" xmlns="" val="1"/>
+              <ma14:wrappingTextBoxFlag xmlns="" xmlns:m="http://schemas.openxmlformats.org/officeDocument/2006/math" xmlns:a14="http://schemas.microsoft.com/office/drawing/2010/main" xmlns:ma14="http://schemas.microsoft.com/office/mac/drawingml/2011/main" val="1"/>
             </a:ext>
           </a:extLst>
         </p:spPr>
@@ -7197,7 +7272,7 @@
           </a:ln>
           <a:extLst>
             <a:ext uri="{C572A759-6A51-4108-AA02-DFA0A04FC94B}">
-              <ma14:wrappingTextBoxFlag xmlns:ma14="http://schemas.microsoft.com/office/mac/drawingml/2011/main" xmlns:a14="http://schemas.microsoft.com/office/drawing/2010/main" xmlns:m="http://schemas.openxmlformats.org/officeDocument/2006/math" xmlns="" val="1"/>
+              <ma14:wrappingTextBoxFlag xmlns="" xmlns:m="http://schemas.openxmlformats.org/officeDocument/2006/math" xmlns:a14="http://schemas.microsoft.com/office/drawing/2010/main" xmlns:ma14="http://schemas.microsoft.com/office/mac/drawingml/2011/main" val="1"/>
             </a:ext>
           </a:extLst>
         </p:spPr>
@@ -7279,6 +7354,7 @@
           </a:lstStyle>
           <a:p>
             <a:r>
+              <a:rPr dirty="0"/>
               <a:t>JSON</a:t>
             </a:r>
           </a:p>
@@ -7312,10 +7388,11 @@
               <a:buNone/>
             </a:pPr>
             <a:r>
+              <a:rPr dirty="0"/>
               <a:t>Stands for </a:t>
             </a:r>
             <a:r>
-              <a:rPr b="1"/>
+              <a:rPr b="1" dirty="0"/>
               <a:t>JavaScript Object Notation</a:t>
             </a:r>
           </a:p>
@@ -7327,6 +7404,7 @@
               <a:defRPr sz="2800"/>
             </a:pPr>
             <a:r>
+              <a:rPr dirty="0"/>
               <a:t>JavaScript is a language for web development</a:t>
             </a:r>
           </a:p>
@@ -7338,7 +7416,16 @@
               <a:defRPr sz="2800"/>
             </a:pPr>
             <a:r>
-              <a:t>JSON was developed JavaScript programs to store/share data</a:t>
+              <a:rPr dirty="0"/>
+              <a:t>JSON was developed </a:t>
+            </a:r>
+            <a:r>
+              <a:rPr lang="en-US" dirty="0"/>
+              <a:t>for </a:t>
+            </a:r>
+            <a:r>
+              <a:rPr dirty="0"/>
+              <a:t>JavaScript programs to store/share data</a:t>
             </a:r>
           </a:p>
           <a:p>
@@ -7349,6 +7436,7 @@
               <a:defRPr sz="2800"/>
             </a:pPr>
             <a:r>
+              <a:rPr dirty="0"/>
               <a:t>JSON looks like Python code because JavaScript is similar to Python</a:t>
             </a:r>
           </a:p>
@@ -7358,6 +7446,7 @@
               <a:buNone/>
             </a:pPr>
             <a:r>
+              <a:rPr dirty="0"/>
               <a:t>Minor JavaScript vs. Python differences:</a:t>
             </a:r>
           </a:p>
@@ -7872,7 +7961,7 @@
           </a:ln>
           <a:extLst>
             <a:ext uri="{C572A759-6A51-4108-AA02-DFA0A04FC94B}">
-              <ma14:wrappingTextBoxFlag xmlns:ma14="http://schemas.microsoft.com/office/mac/drawingml/2011/main" xmlns:a14="http://schemas.microsoft.com/office/drawing/2010/main" xmlns:m="http://schemas.openxmlformats.org/officeDocument/2006/math" xmlns="" val="1"/>
+              <ma14:wrappingTextBoxFlag xmlns="" xmlns:m="http://schemas.openxmlformats.org/officeDocument/2006/math" xmlns:a14="http://schemas.microsoft.com/office/drawing/2010/main" xmlns:ma14="http://schemas.microsoft.com/office/mac/drawingml/2011/main" val="1"/>
             </a:ext>
           </a:extLst>
         </p:spPr>
@@ -8031,7 +8120,7 @@
           </a:ln>
           <a:extLst>
             <a:ext uri="{C572A759-6A51-4108-AA02-DFA0A04FC94B}">
-              <ma14:wrappingTextBoxFlag xmlns:ma14="http://schemas.microsoft.com/office/mac/drawingml/2011/main" xmlns:a14="http://schemas.microsoft.com/office/drawing/2010/main" xmlns:m="http://schemas.openxmlformats.org/officeDocument/2006/math" xmlns="" val="1"/>
+              <ma14:wrappingTextBoxFlag xmlns="" xmlns:m="http://schemas.openxmlformats.org/officeDocument/2006/math" xmlns:a14="http://schemas.microsoft.com/office/drawing/2010/main" xmlns:ma14="http://schemas.microsoft.com/office/mac/drawingml/2011/main" val="1"/>
             </a:ext>
           </a:extLst>
         </p:spPr>
@@ -8066,7 +8155,7 @@
           </a:ln>
           <a:extLst>
             <a:ext uri="{C572A759-6A51-4108-AA02-DFA0A04FC94B}">
-              <ma14:wrappingTextBoxFlag xmlns:ma14="http://schemas.microsoft.com/office/mac/drawingml/2011/main" xmlns:a14="http://schemas.microsoft.com/office/drawing/2010/main" xmlns:m="http://schemas.openxmlformats.org/officeDocument/2006/math" xmlns="" val="1"/>
+              <ma14:wrappingTextBoxFlag xmlns="" xmlns:m="http://schemas.openxmlformats.org/officeDocument/2006/math" xmlns:a14="http://schemas.microsoft.com/office/drawing/2010/main" xmlns:ma14="http://schemas.microsoft.com/office/mac/drawingml/2011/main" val="1"/>
             </a:ext>
           </a:extLst>
         </p:spPr>
@@ -8235,7 +8324,7 @@
           </a:ln>
           <a:extLst>
             <a:ext uri="{C572A759-6A51-4108-AA02-DFA0A04FC94B}">
-              <ma14:wrappingTextBoxFlag xmlns:ma14="http://schemas.microsoft.com/office/mac/drawingml/2011/main" xmlns:a14="http://schemas.microsoft.com/office/drawing/2010/main" xmlns:m="http://schemas.openxmlformats.org/officeDocument/2006/math" xmlns="" val="1"/>
+              <ma14:wrappingTextBoxFlag xmlns="" xmlns:m="http://schemas.openxmlformats.org/officeDocument/2006/math" xmlns:a14="http://schemas.microsoft.com/office/drawing/2010/main" xmlns:ma14="http://schemas.microsoft.com/office/mac/drawingml/2011/main" val="1"/>
             </a:ext>
           </a:extLst>
         </p:spPr>
@@ -8332,7 +8421,7 @@
           </a:ln>
           <a:extLst>
             <a:ext uri="{C572A759-6A51-4108-AA02-DFA0A04FC94B}">
-              <ma14:wrappingTextBoxFlag xmlns:ma14="http://schemas.microsoft.com/office/mac/drawingml/2011/main" xmlns:a14="http://schemas.microsoft.com/office/drawing/2010/main" xmlns:m="http://schemas.openxmlformats.org/officeDocument/2006/math" xmlns="" val="1"/>
+              <ma14:wrappingTextBoxFlag xmlns="" xmlns:m="http://schemas.openxmlformats.org/officeDocument/2006/math" xmlns:a14="http://schemas.microsoft.com/office/drawing/2010/main" xmlns:ma14="http://schemas.microsoft.com/office/mac/drawingml/2011/main" val="1"/>
             </a:ext>
           </a:extLst>
         </p:spPr>
@@ -8374,7 +8463,7 @@
           </a:ln>
           <a:extLst>
             <a:ext uri="{C572A759-6A51-4108-AA02-DFA0A04FC94B}">
-              <ma14:wrappingTextBoxFlag xmlns:ma14="http://schemas.microsoft.com/office/mac/drawingml/2011/main" xmlns:a14="http://schemas.microsoft.com/office/drawing/2010/main" xmlns:m="http://schemas.openxmlformats.org/officeDocument/2006/math" xmlns="" val="1"/>
+              <ma14:wrappingTextBoxFlag xmlns="" xmlns:m="http://schemas.openxmlformats.org/officeDocument/2006/math" xmlns:a14="http://schemas.microsoft.com/office/drawing/2010/main" xmlns:ma14="http://schemas.microsoft.com/office/mac/drawingml/2011/main" val="1"/>
             </a:ext>
           </a:extLst>
         </p:spPr>
@@ -8421,7 +8510,7 @@
           </a:ln>
           <a:extLst>
             <a:ext uri="{C572A759-6A51-4108-AA02-DFA0A04FC94B}">
-              <ma14:wrappingTextBoxFlag xmlns:ma14="http://schemas.microsoft.com/office/mac/drawingml/2011/main" xmlns:a14="http://schemas.microsoft.com/office/drawing/2010/main" xmlns:m="http://schemas.openxmlformats.org/officeDocument/2006/math" xmlns="" val="1"/>
+              <ma14:wrappingTextBoxFlag xmlns="" xmlns:m="http://schemas.openxmlformats.org/officeDocument/2006/math" xmlns:a14="http://schemas.microsoft.com/office/drawing/2010/main" xmlns:ma14="http://schemas.microsoft.com/office/mac/drawingml/2011/main" val="1"/>
             </a:ext>
           </a:extLst>
         </p:spPr>
@@ -8510,7 +8599,7 @@
           </a:ln>
           <a:extLst>
             <a:ext uri="{C572A759-6A51-4108-AA02-DFA0A04FC94B}">
-              <ma14:wrappingTextBoxFlag xmlns:ma14="http://schemas.microsoft.com/office/mac/drawingml/2011/main" xmlns:a14="http://schemas.microsoft.com/office/drawing/2010/main" xmlns:m="http://schemas.openxmlformats.org/officeDocument/2006/math" xmlns="" val="1"/>
+              <ma14:wrappingTextBoxFlag xmlns="" xmlns:m="http://schemas.openxmlformats.org/officeDocument/2006/math" xmlns:a14="http://schemas.microsoft.com/office/drawing/2010/main" xmlns:ma14="http://schemas.microsoft.com/office/mac/drawingml/2011/main" val="1"/>
             </a:ext>
           </a:extLst>
         </p:spPr>
@@ -8585,7 +8674,7 @@
           </a:ln>
           <a:extLst>
             <a:ext uri="{C572A759-6A51-4108-AA02-DFA0A04FC94B}">
-              <ma14:wrappingTextBoxFlag xmlns:ma14="http://schemas.microsoft.com/office/mac/drawingml/2011/main" xmlns:a14="http://schemas.microsoft.com/office/drawing/2010/main" xmlns:m="http://schemas.openxmlformats.org/officeDocument/2006/math" xmlns="" val="1"/>
+              <ma14:wrappingTextBoxFlag xmlns="" xmlns:m="http://schemas.openxmlformats.org/officeDocument/2006/math" xmlns:a14="http://schemas.microsoft.com/office/drawing/2010/main" xmlns:ma14="http://schemas.microsoft.com/office/mac/drawingml/2011/main" val="1"/>
             </a:ext>
           </a:extLst>
         </p:spPr>
@@ -8627,7 +8716,7 @@
           </a:ln>
           <a:extLst>
             <a:ext uri="{C572A759-6A51-4108-AA02-DFA0A04FC94B}">
-              <ma14:wrappingTextBoxFlag xmlns:ma14="http://schemas.microsoft.com/office/mac/drawingml/2011/main" xmlns:a14="http://schemas.microsoft.com/office/drawing/2010/main" xmlns:m="http://schemas.openxmlformats.org/officeDocument/2006/math" xmlns="" val="1"/>
+              <ma14:wrappingTextBoxFlag xmlns="" xmlns:m="http://schemas.openxmlformats.org/officeDocument/2006/math" xmlns:a14="http://schemas.microsoft.com/office/drawing/2010/main" xmlns:ma14="http://schemas.microsoft.com/office/mac/drawingml/2011/main" val="1"/>
             </a:ext>
           </a:extLst>
         </p:spPr>
@@ -8857,7 +8946,7 @@
           </a:ln>
           <a:extLst>
             <a:ext uri="{C572A759-6A51-4108-AA02-DFA0A04FC94B}">
-              <ma14:wrappingTextBoxFlag xmlns:ma14="http://schemas.microsoft.com/office/mac/drawingml/2011/main" xmlns:a14="http://schemas.microsoft.com/office/drawing/2010/main" xmlns:m="http://schemas.openxmlformats.org/officeDocument/2006/math" xmlns="" val="1"/>
+              <ma14:wrappingTextBoxFlag xmlns="" xmlns:m="http://schemas.openxmlformats.org/officeDocument/2006/math" xmlns:a14="http://schemas.microsoft.com/office/drawing/2010/main" xmlns:ma14="http://schemas.microsoft.com/office/mac/drawingml/2011/main" val="1"/>
             </a:ext>
           </a:extLst>
         </p:spPr>
@@ -8892,7 +8981,7 @@
           </a:ln>
           <a:extLst>
             <a:ext uri="{C572A759-6A51-4108-AA02-DFA0A04FC94B}">
-              <ma14:wrappingTextBoxFlag xmlns:ma14="http://schemas.microsoft.com/office/mac/drawingml/2011/main" xmlns:a14="http://schemas.microsoft.com/office/drawing/2010/main" xmlns:m="http://schemas.openxmlformats.org/officeDocument/2006/math" xmlns="" val="1"/>
+              <ma14:wrappingTextBoxFlag xmlns="" xmlns:m="http://schemas.openxmlformats.org/officeDocument/2006/math" xmlns:a14="http://schemas.microsoft.com/office/drawing/2010/main" xmlns:ma14="http://schemas.microsoft.com/office/mac/drawingml/2011/main" val="1"/>
             </a:ext>
           </a:extLst>
         </p:spPr>
@@ -9061,7 +9150,7 @@
           </a:ln>
           <a:extLst>
             <a:ext uri="{C572A759-6A51-4108-AA02-DFA0A04FC94B}">
-              <ma14:wrappingTextBoxFlag xmlns:ma14="http://schemas.microsoft.com/office/mac/drawingml/2011/main" xmlns:a14="http://schemas.microsoft.com/office/drawing/2010/main" xmlns:m="http://schemas.openxmlformats.org/officeDocument/2006/math" xmlns="" val="1"/>
+              <ma14:wrappingTextBoxFlag xmlns="" xmlns:m="http://schemas.openxmlformats.org/officeDocument/2006/math" xmlns:a14="http://schemas.microsoft.com/office/drawing/2010/main" xmlns:ma14="http://schemas.microsoft.com/office/mac/drawingml/2011/main" val="1"/>
             </a:ext>
           </a:extLst>
         </p:spPr>
@@ -9158,7 +9247,7 @@
           </a:ln>
           <a:extLst>
             <a:ext uri="{C572A759-6A51-4108-AA02-DFA0A04FC94B}">
-              <ma14:wrappingTextBoxFlag xmlns:ma14="http://schemas.microsoft.com/office/mac/drawingml/2011/main" xmlns:a14="http://schemas.microsoft.com/office/drawing/2010/main" xmlns:m="http://schemas.openxmlformats.org/officeDocument/2006/math" xmlns="" val="1"/>
+              <ma14:wrappingTextBoxFlag xmlns="" xmlns:m="http://schemas.openxmlformats.org/officeDocument/2006/math" xmlns:a14="http://schemas.microsoft.com/office/drawing/2010/main" xmlns:ma14="http://schemas.microsoft.com/office/mac/drawingml/2011/main" val="1"/>
             </a:ext>
           </a:extLst>
         </p:spPr>
@@ -9200,7 +9289,7 @@
           </a:ln>
           <a:extLst>
             <a:ext uri="{C572A759-6A51-4108-AA02-DFA0A04FC94B}">
-              <ma14:wrappingTextBoxFlag xmlns:ma14="http://schemas.microsoft.com/office/mac/drawingml/2011/main" xmlns:a14="http://schemas.microsoft.com/office/drawing/2010/main" xmlns:m="http://schemas.openxmlformats.org/officeDocument/2006/math" xmlns="" val="1"/>
+              <ma14:wrappingTextBoxFlag xmlns="" xmlns:m="http://schemas.openxmlformats.org/officeDocument/2006/math" xmlns:a14="http://schemas.microsoft.com/office/drawing/2010/main" xmlns:ma14="http://schemas.microsoft.com/office/mac/drawingml/2011/main" val="1"/>
             </a:ext>
           </a:extLst>
         </p:spPr>
@@ -9247,7 +9336,7 @@
           </a:ln>
           <a:extLst>
             <a:ext uri="{C572A759-6A51-4108-AA02-DFA0A04FC94B}">
-              <ma14:wrappingTextBoxFlag xmlns:ma14="http://schemas.microsoft.com/office/mac/drawingml/2011/main" xmlns:a14="http://schemas.microsoft.com/office/drawing/2010/main" xmlns:m="http://schemas.openxmlformats.org/officeDocument/2006/math" xmlns="" val="1"/>
+              <ma14:wrappingTextBoxFlag xmlns="" xmlns:m="http://schemas.openxmlformats.org/officeDocument/2006/math" xmlns:a14="http://schemas.microsoft.com/office/drawing/2010/main" xmlns:ma14="http://schemas.microsoft.com/office/mac/drawingml/2011/main" val="1"/>
             </a:ext>
           </a:extLst>
         </p:spPr>
@@ -9336,7 +9425,7 @@
           </a:ln>
           <a:extLst>
             <a:ext uri="{C572A759-6A51-4108-AA02-DFA0A04FC94B}">
-              <ma14:wrappingTextBoxFlag xmlns:ma14="http://schemas.microsoft.com/office/mac/drawingml/2011/main" xmlns:a14="http://schemas.microsoft.com/office/drawing/2010/main" xmlns:m="http://schemas.openxmlformats.org/officeDocument/2006/math" xmlns="" val="1"/>
+              <ma14:wrappingTextBoxFlag xmlns="" xmlns:m="http://schemas.openxmlformats.org/officeDocument/2006/math" xmlns:a14="http://schemas.microsoft.com/office/drawing/2010/main" xmlns:ma14="http://schemas.microsoft.com/office/mac/drawingml/2011/main" val="1"/>
             </a:ext>
           </a:extLst>
         </p:spPr>
@@ -9453,7 +9542,7 @@
           </a:ln>
           <a:extLst>
             <a:ext uri="{C572A759-6A51-4108-AA02-DFA0A04FC94B}">
-              <ma14:wrappingTextBoxFlag xmlns:ma14="http://schemas.microsoft.com/office/mac/drawingml/2011/main" xmlns:a14="http://schemas.microsoft.com/office/drawing/2010/main" xmlns:m="http://schemas.openxmlformats.org/officeDocument/2006/math" xmlns="" val="1"/>
+              <ma14:wrappingTextBoxFlag xmlns="" xmlns:m="http://schemas.openxmlformats.org/officeDocument/2006/math" xmlns:a14="http://schemas.microsoft.com/office/drawing/2010/main" xmlns:ma14="http://schemas.microsoft.com/office/mac/drawingml/2011/main" val="1"/>
             </a:ext>
           </a:extLst>
         </p:spPr>
@@ -9495,7 +9584,7 @@
           </a:ln>
           <a:extLst>
             <a:ext uri="{C572A759-6A51-4108-AA02-DFA0A04FC94B}">
-              <ma14:wrappingTextBoxFlag xmlns:ma14="http://schemas.microsoft.com/office/mac/drawingml/2011/main" xmlns:a14="http://schemas.microsoft.com/office/drawing/2010/main" xmlns:m="http://schemas.openxmlformats.org/officeDocument/2006/math" xmlns="" val="1"/>
+              <ma14:wrappingTextBoxFlag xmlns="" xmlns:m="http://schemas.openxmlformats.org/officeDocument/2006/math" xmlns:a14="http://schemas.microsoft.com/office/drawing/2010/main" xmlns:ma14="http://schemas.microsoft.com/office/mac/drawingml/2011/main" val="1"/>
             </a:ext>
           </a:extLst>
         </p:spPr>
@@ -9605,7 +9694,7 @@
           </a:ln>
           <a:extLst>
             <a:ext uri="{C572A759-6A51-4108-AA02-DFA0A04FC94B}">
-              <ma14:wrappingTextBoxFlag xmlns:ma14="http://schemas.microsoft.com/office/mac/drawingml/2011/main" xmlns:a14="http://schemas.microsoft.com/office/drawing/2010/main" xmlns:m="http://schemas.openxmlformats.org/officeDocument/2006/math" xmlns="" val="1"/>
+              <ma14:wrappingTextBoxFlag xmlns="" xmlns:m="http://schemas.openxmlformats.org/officeDocument/2006/math" xmlns:a14="http://schemas.microsoft.com/office/drawing/2010/main" xmlns:ma14="http://schemas.microsoft.com/office/mac/drawingml/2011/main" val="1"/>
             </a:ext>
           </a:extLst>
         </p:spPr>
@@ -9721,7 +9810,7 @@
           </a:effectLst>
           <a:extLst>
             <a:ext uri="{C572A759-6A51-4108-AA02-DFA0A04FC94B}">
-              <ma14:wrappingTextBoxFlag xmlns:ma14="http://schemas.microsoft.com/office/mac/drawingml/2011/main" xmlns:a14="http://schemas.microsoft.com/office/drawing/2010/main" xmlns:m="http://schemas.openxmlformats.org/officeDocument/2006/math" xmlns="" val="1"/>
+              <ma14:wrappingTextBoxFlag xmlns="" xmlns:m="http://schemas.openxmlformats.org/officeDocument/2006/math" xmlns:a14="http://schemas.microsoft.com/office/drawing/2010/main" xmlns:ma14="http://schemas.microsoft.com/office/mac/drawingml/2011/main" val="1"/>
             </a:ext>
           </a:extLst>
         </p:spPr>
@@ -9778,7 +9867,7 @@
           </a:effectLst>
           <a:extLst>
             <a:ext uri="{C572A759-6A51-4108-AA02-DFA0A04FC94B}">
-              <ma14:wrappingTextBoxFlag xmlns:ma14="http://schemas.microsoft.com/office/mac/drawingml/2011/main" xmlns:a14="http://schemas.microsoft.com/office/drawing/2010/main" xmlns:m="http://schemas.openxmlformats.org/officeDocument/2006/math" xmlns="" val="1"/>
+              <ma14:wrappingTextBoxFlag xmlns="" xmlns:m="http://schemas.openxmlformats.org/officeDocument/2006/math" xmlns:a14="http://schemas.microsoft.com/office/drawing/2010/main" xmlns:ma14="http://schemas.microsoft.com/office/mac/drawingml/2011/main" val="1"/>
             </a:ext>
           </a:extLst>
         </p:spPr>
@@ -9820,7 +9909,7 @@
           </a:ln>
           <a:extLst>
             <a:ext uri="{C572A759-6A51-4108-AA02-DFA0A04FC94B}">
-              <ma14:wrappingTextBoxFlag xmlns:ma14="http://schemas.microsoft.com/office/mac/drawingml/2011/main" xmlns:a14="http://schemas.microsoft.com/office/drawing/2010/main" xmlns:m="http://schemas.openxmlformats.org/officeDocument/2006/math" xmlns="" val="1"/>
+              <ma14:wrappingTextBoxFlag xmlns="" xmlns:m="http://schemas.openxmlformats.org/officeDocument/2006/math" xmlns:a14="http://schemas.microsoft.com/office/drawing/2010/main" xmlns:ma14="http://schemas.microsoft.com/office/mac/drawingml/2011/main" val="1"/>
             </a:ext>
           </a:extLst>
         </p:spPr>
@@ -9859,7 +9948,7 @@
           </a:ln>
           <a:extLst>
             <a:ext uri="{C572A759-6A51-4108-AA02-DFA0A04FC94B}">
-              <ma14:wrappingTextBoxFlag xmlns:ma14="http://schemas.microsoft.com/office/mac/drawingml/2011/main" xmlns:a14="http://schemas.microsoft.com/office/drawing/2010/main" xmlns:m="http://schemas.openxmlformats.org/officeDocument/2006/math" xmlns="" val="1"/>
+              <ma14:wrappingTextBoxFlag xmlns="" xmlns:m="http://schemas.openxmlformats.org/officeDocument/2006/math" xmlns:a14="http://schemas.microsoft.com/office/drawing/2010/main" xmlns:ma14="http://schemas.microsoft.com/office/mac/drawingml/2011/main" val="1"/>
             </a:ext>
           </a:extLst>
         </p:spPr>
@@ -10025,7 +10114,7 @@
           </a:ln>
           <a:extLst>
             <a:ext uri="{C572A759-6A51-4108-AA02-DFA0A04FC94B}">
-              <ma14:wrappingTextBoxFlag xmlns:ma14="http://schemas.microsoft.com/office/mac/drawingml/2011/main" xmlns:a14="http://schemas.microsoft.com/office/drawing/2010/main" xmlns:m="http://schemas.openxmlformats.org/officeDocument/2006/math" xmlns="" val="1"/>
+              <ma14:wrappingTextBoxFlag xmlns="" xmlns:m="http://schemas.openxmlformats.org/officeDocument/2006/math" xmlns:a14="http://schemas.microsoft.com/office/drawing/2010/main" xmlns:ma14="http://schemas.microsoft.com/office/mac/drawingml/2011/main" val="1"/>
             </a:ext>
           </a:extLst>
         </p:spPr>
@@ -10060,7 +10149,7 @@
           </a:ln>
           <a:extLst>
             <a:ext uri="{C572A759-6A51-4108-AA02-DFA0A04FC94B}">
-              <ma14:wrappingTextBoxFlag xmlns:ma14="http://schemas.microsoft.com/office/mac/drawingml/2011/main" xmlns:a14="http://schemas.microsoft.com/office/drawing/2010/main" xmlns:m="http://schemas.openxmlformats.org/officeDocument/2006/math" xmlns="" val="1"/>
+              <ma14:wrappingTextBoxFlag xmlns="" xmlns:m="http://schemas.openxmlformats.org/officeDocument/2006/math" xmlns:a14="http://schemas.microsoft.com/office/drawing/2010/main" xmlns:ma14="http://schemas.microsoft.com/office/mac/drawingml/2011/main" val="1"/>
             </a:ext>
           </a:extLst>
         </p:spPr>
@@ -10229,7 +10318,7 @@
           </a:ln>
           <a:extLst>
             <a:ext uri="{C572A759-6A51-4108-AA02-DFA0A04FC94B}">
-              <ma14:wrappingTextBoxFlag xmlns:ma14="http://schemas.microsoft.com/office/mac/drawingml/2011/main" xmlns:a14="http://schemas.microsoft.com/office/drawing/2010/main" xmlns:m="http://schemas.openxmlformats.org/officeDocument/2006/math" xmlns="" val="1"/>
+              <ma14:wrappingTextBoxFlag xmlns="" xmlns:m="http://schemas.openxmlformats.org/officeDocument/2006/math" xmlns:a14="http://schemas.microsoft.com/office/drawing/2010/main" xmlns:ma14="http://schemas.microsoft.com/office/mac/drawingml/2011/main" val="1"/>
             </a:ext>
           </a:extLst>
         </p:spPr>
@@ -10326,7 +10415,7 @@
           </a:ln>
           <a:extLst>
             <a:ext uri="{C572A759-6A51-4108-AA02-DFA0A04FC94B}">
-              <ma14:wrappingTextBoxFlag xmlns:ma14="http://schemas.microsoft.com/office/mac/drawingml/2011/main" xmlns:a14="http://schemas.microsoft.com/office/drawing/2010/main" xmlns:m="http://schemas.openxmlformats.org/officeDocument/2006/math" xmlns="" val="1"/>
+              <ma14:wrappingTextBoxFlag xmlns="" xmlns:m="http://schemas.openxmlformats.org/officeDocument/2006/math" xmlns:a14="http://schemas.microsoft.com/office/drawing/2010/main" xmlns:ma14="http://schemas.microsoft.com/office/mac/drawingml/2011/main" val="1"/>
             </a:ext>
           </a:extLst>
         </p:spPr>
@@ -10368,7 +10457,7 @@
           </a:ln>
           <a:extLst>
             <a:ext uri="{C572A759-6A51-4108-AA02-DFA0A04FC94B}">
-              <ma14:wrappingTextBoxFlag xmlns:ma14="http://schemas.microsoft.com/office/mac/drawingml/2011/main" xmlns:a14="http://schemas.microsoft.com/office/drawing/2010/main" xmlns:m="http://schemas.openxmlformats.org/officeDocument/2006/math" xmlns="" val="1"/>
+              <ma14:wrappingTextBoxFlag xmlns="" xmlns:m="http://schemas.openxmlformats.org/officeDocument/2006/math" xmlns:a14="http://schemas.microsoft.com/office/drawing/2010/main" xmlns:ma14="http://schemas.microsoft.com/office/mac/drawingml/2011/main" val="1"/>
             </a:ext>
           </a:extLst>
         </p:spPr>
@@ -10415,7 +10504,7 @@
           </a:ln>
           <a:extLst>
             <a:ext uri="{C572A759-6A51-4108-AA02-DFA0A04FC94B}">
-              <ma14:wrappingTextBoxFlag xmlns:ma14="http://schemas.microsoft.com/office/mac/drawingml/2011/main" xmlns:a14="http://schemas.microsoft.com/office/drawing/2010/main" xmlns:m="http://schemas.openxmlformats.org/officeDocument/2006/math" xmlns="" val="1"/>
+              <ma14:wrappingTextBoxFlag xmlns="" xmlns:m="http://schemas.openxmlformats.org/officeDocument/2006/math" xmlns:a14="http://schemas.microsoft.com/office/drawing/2010/main" xmlns:ma14="http://schemas.microsoft.com/office/mac/drawingml/2011/main" val="1"/>
             </a:ext>
           </a:extLst>
         </p:spPr>
@@ -10504,7 +10593,7 @@
           </a:ln>
           <a:extLst>
             <a:ext uri="{C572A759-6A51-4108-AA02-DFA0A04FC94B}">
-              <ma14:wrappingTextBoxFlag xmlns:ma14="http://schemas.microsoft.com/office/mac/drawingml/2011/main" xmlns:a14="http://schemas.microsoft.com/office/drawing/2010/main" xmlns:m="http://schemas.openxmlformats.org/officeDocument/2006/math" xmlns="" val="1"/>
+              <ma14:wrappingTextBoxFlag xmlns="" xmlns:m="http://schemas.openxmlformats.org/officeDocument/2006/math" xmlns:a14="http://schemas.microsoft.com/office/drawing/2010/main" xmlns:ma14="http://schemas.microsoft.com/office/mac/drawingml/2011/main" val="1"/>
             </a:ext>
           </a:extLst>
         </p:spPr>
@@ -10621,7 +10710,7 @@
           </a:ln>
           <a:extLst>
             <a:ext uri="{C572A759-6A51-4108-AA02-DFA0A04FC94B}">
-              <ma14:wrappingTextBoxFlag xmlns:ma14="http://schemas.microsoft.com/office/mac/drawingml/2011/main" xmlns:a14="http://schemas.microsoft.com/office/drawing/2010/main" xmlns:m="http://schemas.openxmlformats.org/officeDocument/2006/math" xmlns="" val="1"/>
+              <ma14:wrappingTextBoxFlag xmlns="" xmlns:m="http://schemas.openxmlformats.org/officeDocument/2006/math" xmlns:a14="http://schemas.microsoft.com/office/drawing/2010/main" xmlns:ma14="http://schemas.microsoft.com/office/mac/drawingml/2011/main" val="1"/>
             </a:ext>
           </a:extLst>
         </p:spPr>
@@ -10663,7 +10752,7 @@
           </a:ln>
           <a:extLst>
             <a:ext uri="{C572A759-6A51-4108-AA02-DFA0A04FC94B}">
-              <ma14:wrappingTextBoxFlag xmlns:ma14="http://schemas.microsoft.com/office/mac/drawingml/2011/main" xmlns:a14="http://schemas.microsoft.com/office/drawing/2010/main" xmlns:m="http://schemas.openxmlformats.org/officeDocument/2006/math" xmlns="" val="1"/>
+              <ma14:wrappingTextBoxFlag xmlns="" xmlns:m="http://schemas.openxmlformats.org/officeDocument/2006/math" xmlns:a14="http://schemas.microsoft.com/office/drawing/2010/main" xmlns:ma14="http://schemas.microsoft.com/office/mac/drawingml/2011/main" val="1"/>
             </a:ext>
           </a:extLst>
         </p:spPr>
@@ -10773,7 +10862,7 @@
           </a:ln>
           <a:extLst>
             <a:ext uri="{C572A759-6A51-4108-AA02-DFA0A04FC94B}">
-              <ma14:wrappingTextBoxFlag xmlns:ma14="http://schemas.microsoft.com/office/mac/drawingml/2011/main" xmlns:a14="http://schemas.microsoft.com/office/drawing/2010/main" xmlns:m="http://schemas.openxmlformats.org/officeDocument/2006/math" xmlns="" val="1"/>
+              <ma14:wrappingTextBoxFlag xmlns="" xmlns:m="http://schemas.openxmlformats.org/officeDocument/2006/math" xmlns:a14="http://schemas.microsoft.com/office/drawing/2010/main" xmlns:ma14="http://schemas.microsoft.com/office/mac/drawingml/2011/main" val="1"/>
             </a:ext>
           </a:extLst>
         </p:spPr>
@@ -10792,6 +10881,7 @@
               </a:defRPr>
             </a:pPr>
             <a:r>
+              <a:rPr dirty="0"/>
               <a:t>import json</a:t>
             </a:r>
           </a:p>
@@ -10804,7 +10894,7 @@
                 <a:sym typeface="Courier"/>
               </a:defRPr>
             </a:pPr>
-            <a:endParaRPr/>
+            <a:endParaRPr dirty="0"/>
           </a:p>
           <a:p>
             <a:pPr algn="l">
@@ -10816,7 +10906,16 @@
               </a:defRPr>
             </a:pPr>
             <a:r>
-              <a:t>def read_json(path):</a:t>
+              <a:rPr dirty="0"/>
+              <a:t>def </a:t>
+            </a:r>
+            <a:r>
+              <a:rPr dirty="0" err="1"/>
+              <a:t>read_json</a:t>
+            </a:r>
+            <a:r>
+              <a:rPr dirty="0"/>
+              <a:t>(path):</a:t>
             </a:r>
           </a:p>
           <a:p>
@@ -10829,6 +10928,7 @@
               </a:defRPr>
             </a:pPr>
             <a:r>
+              <a:rPr dirty="0"/>
               <a:t>    with open(path, encoding="utf-8") as f:</a:t>
             </a:r>
           </a:p>
@@ -10842,16 +10942,54 @@
               </a:defRPr>
             </a:pPr>
             <a:r>
-              <a:t>        return json.load(f) </a:t>
-            </a:r>
-            <a:r>
-              <a:rPr>
+              <a:rPr dirty="0"/>
+              <a:t>        return </a:t>
+            </a:r>
+            <a:r>
+              <a:rPr dirty="0" err="1"/>
+              <a:t>json.load</a:t>
+            </a:r>
+            <a:r>
+              <a:rPr dirty="0"/>
+              <a:t>(f) </a:t>
+            </a:r>
+            <a:r>
+              <a:rPr dirty="0">
                 <a:solidFill>
                   <a:srgbClr val="929292"/>
                 </a:solidFill>
               </a:rPr>
-              <a:t># dict, list, etc</a:t>
-            </a:r>
+              <a:t># </a:t>
+            </a:r>
+            <a:r>
+              <a:rPr dirty="0" err="1">
+                <a:solidFill>
+                  <a:srgbClr val="929292"/>
+                </a:solidFill>
+              </a:rPr>
+              <a:t>dict</a:t>
+            </a:r>
+            <a:r>
+              <a:rPr dirty="0">
+                <a:solidFill>
+                  <a:srgbClr val="929292"/>
+                </a:solidFill>
+              </a:rPr>
+              <a:t>, list, </a:t>
+            </a:r>
+            <a:r>
+              <a:rPr dirty="0" err="1">
+                <a:solidFill>
+                  <a:srgbClr val="929292"/>
+                </a:solidFill>
+              </a:rPr>
+              <a:t>etc</a:t>
+            </a:r>
+            <a:endParaRPr dirty="0">
+              <a:solidFill>
+                <a:srgbClr val="929292"/>
+              </a:solidFill>
+            </a:endParaRPr>
           </a:p>
         </p:txBody>
       </p:sp>
@@ -10874,7 +11012,7 @@
           </a:ln>
           <a:extLst>
             <a:ext uri="{C572A759-6A51-4108-AA02-DFA0A04FC94B}">
-              <ma14:wrappingTextBoxFlag xmlns:ma14="http://schemas.microsoft.com/office/mac/drawingml/2011/main" xmlns:a14="http://schemas.microsoft.com/office/drawing/2010/main" xmlns:m="http://schemas.openxmlformats.org/officeDocument/2006/math" xmlns="" val="1"/>
+              <ma14:wrappingTextBoxFlag xmlns="" xmlns:m="http://schemas.openxmlformats.org/officeDocument/2006/math" xmlns:a14="http://schemas.microsoft.com/office/drawing/2010/main" xmlns:ma14="http://schemas.microsoft.com/office/mac/drawingml/2011/main" val="1"/>
             </a:ext>
           </a:extLst>
         </p:spPr>
@@ -10936,7 +11074,7 @@
           </a:effectLst>
           <a:extLst>
             <a:ext uri="{C572A759-6A51-4108-AA02-DFA0A04FC94B}">
-              <ma14:wrappingTextBoxFlag xmlns:ma14="http://schemas.microsoft.com/office/mac/drawingml/2011/main" xmlns:a14="http://schemas.microsoft.com/office/drawing/2010/main" xmlns:m="http://schemas.openxmlformats.org/officeDocument/2006/math" xmlns="" val="1"/>
+              <ma14:wrappingTextBoxFlag xmlns="" xmlns:m="http://schemas.openxmlformats.org/officeDocument/2006/math" xmlns:a14="http://schemas.microsoft.com/office/drawing/2010/main" xmlns:ma14="http://schemas.microsoft.com/office/mac/drawingml/2011/main" val="1"/>
             </a:ext>
           </a:extLst>
         </p:spPr>
@@ -10993,7 +11131,7 @@
           </a:effectLst>
           <a:extLst>
             <a:ext uri="{C572A759-6A51-4108-AA02-DFA0A04FC94B}">
-              <ma14:wrappingTextBoxFlag xmlns:ma14="http://schemas.microsoft.com/office/mac/drawingml/2011/main" xmlns:a14="http://schemas.microsoft.com/office/drawing/2010/main" xmlns:m="http://schemas.openxmlformats.org/officeDocument/2006/math" xmlns="" val="1"/>
+              <ma14:wrappingTextBoxFlag xmlns="" xmlns:m="http://schemas.openxmlformats.org/officeDocument/2006/math" xmlns:a14="http://schemas.microsoft.com/office/drawing/2010/main" xmlns:ma14="http://schemas.microsoft.com/office/mac/drawingml/2011/main" val="1"/>
             </a:ext>
           </a:extLst>
         </p:spPr>
@@ -11035,7 +11173,7 @@
           </a:ln>
           <a:extLst>
             <a:ext uri="{C572A759-6A51-4108-AA02-DFA0A04FC94B}">
-              <ma14:wrappingTextBoxFlag xmlns:ma14="http://schemas.microsoft.com/office/mac/drawingml/2011/main" xmlns:a14="http://schemas.microsoft.com/office/drawing/2010/main" xmlns:m="http://schemas.openxmlformats.org/officeDocument/2006/math" xmlns="" val="1"/>
+              <ma14:wrappingTextBoxFlag xmlns="" xmlns:m="http://schemas.openxmlformats.org/officeDocument/2006/math" xmlns:a14="http://schemas.microsoft.com/office/drawing/2010/main" xmlns:ma14="http://schemas.microsoft.com/office/mac/drawingml/2011/main" val="1"/>
             </a:ext>
           </a:extLst>
         </p:spPr>
@@ -11074,7 +11212,7 @@
           </a:ln>
           <a:extLst>
             <a:ext uri="{C572A759-6A51-4108-AA02-DFA0A04FC94B}">
-              <ma14:wrappingTextBoxFlag xmlns:ma14="http://schemas.microsoft.com/office/mac/drawingml/2011/main" xmlns:a14="http://schemas.microsoft.com/office/drawing/2010/main" xmlns:m="http://schemas.openxmlformats.org/officeDocument/2006/math" xmlns="" val="1"/>
+              <ma14:wrappingTextBoxFlag xmlns="" xmlns:m="http://schemas.openxmlformats.org/officeDocument/2006/math" xmlns:a14="http://schemas.microsoft.com/office/drawing/2010/main" xmlns:ma14="http://schemas.microsoft.com/office/mac/drawingml/2011/main" val="1"/>
             </a:ext>
           </a:extLst>
         </p:spPr>
@@ -11187,7 +11325,7 @@
           </a:ln>
           <a:extLst>
             <a:ext uri="{C572A759-6A51-4108-AA02-DFA0A04FC94B}">
-              <ma14:wrappingTextBoxFlag xmlns:ma14="http://schemas.microsoft.com/office/mac/drawingml/2011/main" xmlns:a14="http://schemas.microsoft.com/office/drawing/2010/main" xmlns:m="http://schemas.openxmlformats.org/officeDocument/2006/math" xmlns="" val="1"/>
+              <ma14:wrappingTextBoxFlag xmlns="" xmlns:m="http://schemas.openxmlformats.org/officeDocument/2006/math" xmlns:a14="http://schemas.microsoft.com/office/drawing/2010/main" xmlns:ma14="http://schemas.microsoft.com/office/mac/drawingml/2011/main" val="1"/>
             </a:ext>
           </a:extLst>
         </p:spPr>
@@ -11252,7 +11390,7 @@
           </a:ln>
           <a:extLst>
             <a:ext uri="{C572A759-6A51-4108-AA02-DFA0A04FC94B}">
-              <ma14:wrappingTextBoxFlag xmlns:ma14="http://schemas.microsoft.com/office/mac/drawingml/2011/main" xmlns:a14="http://schemas.microsoft.com/office/drawing/2010/main" xmlns:m="http://schemas.openxmlformats.org/officeDocument/2006/math" xmlns="" val="1"/>
+              <ma14:wrappingTextBoxFlag xmlns="" xmlns:m="http://schemas.openxmlformats.org/officeDocument/2006/math" xmlns:a14="http://schemas.microsoft.com/office/drawing/2010/main" xmlns:ma14="http://schemas.microsoft.com/office/mac/drawingml/2011/main" val="1"/>
             </a:ext>
           </a:extLst>
         </p:spPr>
@@ -11430,7 +11568,7 @@
           </a:ln>
           <a:extLst>
             <a:ext uri="{C572A759-6A51-4108-AA02-DFA0A04FC94B}">
-              <ma14:wrappingTextBoxFlag xmlns:ma14="http://schemas.microsoft.com/office/mac/drawingml/2011/main" xmlns:a14="http://schemas.microsoft.com/office/drawing/2010/main" xmlns:m="http://schemas.openxmlformats.org/officeDocument/2006/math" xmlns="" val="1"/>
+              <ma14:wrappingTextBoxFlag xmlns="" xmlns:m="http://schemas.openxmlformats.org/officeDocument/2006/math" xmlns:a14="http://schemas.microsoft.com/office/drawing/2010/main" xmlns:ma14="http://schemas.microsoft.com/office/mac/drawingml/2011/main" val="1"/>
             </a:ext>
           </a:extLst>
         </p:spPr>
@@ -11465,7 +11603,7 @@
           </a:ln>
           <a:extLst>
             <a:ext uri="{C572A759-6A51-4108-AA02-DFA0A04FC94B}">
-              <ma14:wrappingTextBoxFlag xmlns:ma14="http://schemas.microsoft.com/office/mac/drawingml/2011/main" xmlns:a14="http://schemas.microsoft.com/office/drawing/2010/main" xmlns:m="http://schemas.openxmlformats.org/officeDocument/2006/math" xmlns="" val="1"/>
+              <ma14:wrappingTextBoxFlag xmlns="" xmlns:m="http://schemas.openxmlformats.org/officeDocument/2006/math" xmlns:a14="http://schemas.microsoft.com/office/drawing/2010/main" xmlns:ma14="http://schemas.microsoft.com/office/mac/drawingml/2011/main" val="1"/>
             </a:ext>
           </a:extLst>
         </p:spPr>
@@ -11500,7 +11638,7 @@
           </a:ln>
           <a:extLst>
             <a:ext uri="{C572A759-6A51-4108-AA02-DFA0A04FC94B}">
-              <ma14:wrappingTextBoxFlag xmlns:ma14="http://schemas.microsoft.com/office/mac/drawingml/2011/main" xmlns:a14="http://schemas.microsoft.com/office/drawing/2010/main" xmlns:m="http://schemas.openxmlformats.org/officeDocument/2006/math" xmlns="" val="1"/>
+              <ma14:wrappingTextBoxFlag xmlns="" xmlns:m="http://schemas.openxmlformats.org/officeDocument/2006/math" xmlns:a14="http://schemas.microsoft.com/office/drawing/2010/main" xmlns:ma14="http://schemas.microsoft.com/office/mac/drawingml/2011/main" val="1"/>
             </a:ext>
           </a:extLst>
         </p:spPr>
@@ -11539,7 +11677,7 @@
           </a:ln>
           <a:extLst>
             <a:ext uri="{C572A759-6A51-4108-AA02-DFA0A04FC94B}">
-              <ma14:wrappingTextBoxFlag xmlns:ma14="http://schemas.microsoft.com/office/mac/drawingml/2011/main" xmlns:a14="http://schemas.microsoft.com/office/drawing/2010/main" xmlns:m="http://schemas.openxmlformats.org/officeDocument/2006/math" xmlns="" val="1"/>
+              <ma14:wrappingTextBoxFlag xmlns="" xmlns:m="http://schemas.openxmlformats.org/officeDocument/2006/math" xmlns:a14="http://schemas.microsoft.com/office/drawing/2010/main" xmlns:ma14="http://schemas.microsoft.com/office/mac/drawingml/2011/main" val="1"/>
             </a:ext>
           </a:extLst>
         </p:spPr>
@@ -11586,7 +11724,7 @@
           </a:ln>
           <a:extLst>
             <a:ext uri="{C572A759-6A51-4108-AA02-DFA0A04FC94B}">
-              <ma14:wrappingTextBoxFlag xmlns:ma14="http://schemas.microsoft.com/office/mac/drawingml/2011/main" xmlns:a14="http://schemas.microsoft.com/office/drawing/2010/main" xmlns:m="http://schemas.openxmlformats.org/officeDocument/2006/math" xmlns="" val="1"/>
+              <ma14:wrappingTextBoxFlag xmlns="" xmlns:m="http://schemas.openxmlformats.org/officeDocument/2006/math" xmlns:a14="http://schemas.microsoft.com/office/drawing/2010/main" xmlns:ma14="http://schemas.microsoft.com/office/mac/drawingml/2011/main" val="1"/>
             </a:ext>
           </a:extLst>
         </p:spPr>
@@ -11625,7 +11763,7 @@
           </a:ln>
           <a:extLst>
             <a:ext uri="{C572A759-6A51-4108-AA02-DFA0A04FC94B}">
-              <ma14:wrappingTextBoxFlag xmlns:ma14="http://schemas.microsoft.com/office/mac/drawingml/2011/main" xmlns:a14="http://schemas.microsoft.com/office/drawing/2010/main" xmlns:m="http://schemas.openxmlformats.org/officeDocument/2006/math" xmlns="" val="1"/>
+              <ma14:wrappingTextBoxFlag xmlns="" xmlns:m="http://schemas.openxmlformats.org/officeDocument/2006/math" xmlns:a14="http://schemas.microsoft.com/office/drawing/2010/main" xmlns:ma14="http://schemas.microsoft.com/office/mac/drawingml/2011/main" val="1"/>
             </a:ext>
           </a:extLst>
         </p:spPr>
@@ -11731,7 +11869,7 @@
           </a:ln>
           <a:extLst>
             <a:ext uri="{C572A759-6A51-4108-AA02-DFA0A04FC94B}">
-              <ma14:wrappingTextBoxFlag xmlns:ma14="http://schemas.microsoft.com/office/mac/drawingml/2011/main" xmlns:a14="http://schemas.microsoft.com/office/drawing/2010/main" xmlns:m="http://schemas.openxmlformats.org/officeDocument/2006/math" xmlns="" val="1"/>
+              <ma14:wrappingTextBoxFlag xmlns="" xmlns:m="http://schemas.openxmlformats.org/officeDocument/2006/math" xmlns:a14="http://schemas.microsoft.com/office/drawing/2010/main" xmlns:ma14="http://schemas.microsoft.com/office/mac/drawingml/2011/main" val="1"/>
             </a:ext>
           </a:extLst>
         </p:spPr>
@@ -11806,7 +11944,7 @@
           </a:ln>
           <a:extLst>
             <a:ext uri="{C572A759-6A51-4108-AA02-DFA0A04FC94B}">
-              <ma14:wrappingTextBoxFlag xmlns:ma14="http://schemas.microsoft.com/office/mac/drawingml/2011/main" xmlns:a14="http://schemas.microsoft.com/office/drawing/2010/main" xmlns:m="http://schemas.openxmlformats.org/officeDocument/2006/math" xmlns="" val="1"/>
+              <ma14:wrappingTextBoxFlag xmlns="" xmlns:m="http://schemas.openxmlformats.org/officeDocument/2006/math" xmlns:a14="http://schemas.microsoft.com/office/drawing/2010/main" xmlns:ma14="http://schemas.microsoft.com/office/mac/drawingml/2011/main" val="1"/>
             </a:ext>
           </a:extLst>
         </p:spPr>
@@ -11900,7 +12038,7 @@
           </a:ln>
           <a:extLst>
             <a:ext uri="{C572A759-6A51-4108-AA02-DFA0A04FC94B}">
-              <ma14:wrappingTextBoxFlag xmlns:ma14="http://schemas.microsoft.com/office/mac/drawingml/2011/main" xmlns:a14="http://schemas.microsoft.com/office/drawing/2010/main" xmlns:m="http://schemas.openxmlformats.org/officeDocument/2006/math" xmlns="" val="1"/>
+              <ma14:wrappingTextBoxFlag xmlns="" xmlns:m="http://schemas.openxmlformats.org/officeDocument/2006/math" xmlns:a14="http://schemas.microsoft.com/office/drawing/2010/main" xmlns:ma14="http://schemas.microsoft.com/office/mac/drawingml/2011/main" val="1"/>
             </a:ext>
           </a:extLst>
         </p:spPr>
@@ -11942,7 +12080,7 @@
           </a:ln>
           <a:extLst>
             <a:ext uri="{C572A759-6A51-4108-AA02-DFA0A04FC94B}">
-              <ma14:wrappingTextBoxFlag xmlns:ma14="http://schemas.microsoft.com/office/mac/drawingml/2011/main" xmlns:a14="http://schemas.microsoft.com/office/drawing/2010/main" xmlns:m="http://schemas.openxmlformats.org/officeDocument/2006/math" xmlns="" val="1"/>
+              <ma14:wrappingTextBoxFlag xmlns="" xmlns:m="http://schemas.openxmlformats.org/officeDocument/2006/math" xmlns:a14="http://schemas.microsoft.com/office/drawing/2010/main" xmlns:ma14="http://schemas.microsoft.com/office/mac/drawingml/2011/main" val="1"/>
             </a:ext>
           </a:extLst>
         </p:spPr>
@@ -12048,7 +12186,7 @@
           </a:ln>
           <a:extLst>
             <a:ext uri="{C572A759-6A51-4108-AA02-DFA0A04FC94B}">
-              <ma14:wrappingTextBoxFlag xmlns:ma14="http://schemas.microsoft.com/office/mac/drawingml/2011/main" xmlns:a14="http://schemas.microsoft.com/office/drawing/2010/main" xmlns:m="http://schemas.openxmlformats.org/officeDocument/2006/math" xmlns="" val="1"/>
+              <ma14:wrappingTextBoxFlag xmlns="" xmlns:m="http://schemas.openxmlformats.org/officeDocument/2006/math" xmlns:a14="http://schemas.microsoft.com/office/drawing/2010/main" xmlns:ma14="http://schemas.microsoft.com/office/mac/drawingml/2011/main" val="1"/>
             </a:ext>
           </a:extLst>
         </p:spPr>
@@ -12123,7 +12261,7 @@
           </a:ln>
           <a:extLst>
             <a:ext uri="{C572A759-6A51-4108-AA02-DFA0A04FC94B}">
-              <ma14:wrappingTextBoxFlag xmlns:ma14="http://schemas.microsoft.com/office/mac/drawingml/2011/main" xmlns:a14="http://schemas.microsoft.com/office/drawing/2010/main" xmlns:m="http://schemas.openxmlformats.org/officeDocument/2006/math" xmlns="" val="1"/>
+              <ma14:wrappingTextBoxFlag xmlns="" xmlns:m="http://schemas.openxmlformats.org/officeDocument/2006/math" xmlns:a14="http://schemas.microsoft.com/office/drawing/2010/main" xmlns:ma14="http://schemas.microsoft.com/office/mac/drawingml/2011/main" val="1"/>
             </a:ext>
           </a:extLst>
         </p:spPr>
@@ -12217,7 +12355,7 @@
           </a:ln>
           <a:extLst>
             <a:ext uri="{C572A759-6A51-4108-AA02-DFA0A04FC94B}">
-              <ma14:wrappingTextBoxFlag xmlns:ma14="http://schemas.microsoft.com/office/mac/drawingml/2011/main" xmlns:a14="http://schemas.microsoft.com/office/drawing/2010/main" xmlns:m="http://schemas.openxmlformats.org/officeDocument/2006/math" xmlns="" val="1"/>
+              <ma14:wrappingTextBoxFlag xmlns="" xmlns:m="http://schemas.openxmlformats.org/officeDocument/2006/math" xmlns:a14="http://schemas.microsoft.com/office/drawing/2010/main" xmlns:ma14="http://schemas.microsoft.com/office/mac/drawingml/2011/main" val="1"/>
             </a:ext>
           </a:extLst>
         </p:spPr>
@@ -12259,7 +12397,7 @@
           </a:ln>
           <a:extLst>
             <a:ext uri="{C572A759-6A51-4108-AA02-DFA0A04FC94B}">
-              <ma14:wrappingTextBoxFlag xmlns:ma14="http://schemas.microsoft.com/office/mac/drawingml/2011/main" xmlns:a14="http://schemas.microsoft.com/office/drawing/2010/main" xmlns:m="http://schemas.openxmlformats.org/officeDocument/2006/math" xmlns="" val="1"/>
+              <ma14:wrappingTextBoxFlag xmlns="" xmlns:m="http://schemas.openxmlformats.org/officeDocument/2006/math" xmlns:a14="http://schemas.microsoft.com/office/drawing/2010/main" xmlns:ma14="http://schemas.microsoft.com/office/mac/drawingml/2011/main" val="1"/>
             </a:ext>
           </a:extLst>
         </p:spPr>
@@ -12306,7 +12444,7 @@
           </a:ln>
           <a:extLst>
             <a:ext uri="{C572A759-6A51-4108-AA02-DFA0A04FC94B}">
-              <ma14:wrappingTextBoxFlag xmlns:ma14="http://schemas.microsoft.com/office/mac/drawingml/2011/main" xmlns:a14="http://schemas.microsoft.com/office/drawing/2010/main" xmlns:m="http://schemas.openxmlformats.org/officeDocument/2006/math" xmlns="" val="1"/>
+              <ma14:wrappingTextBoxFlag xmlns="" xmlns:m="http://schemas.openxmlformats.org/officeDocument/2006/math" xmlns:a14="http://schemas.microsoft.com/office/drawing/2010/main" xmlns:ma14="http://schemas.microsoft.com/office/mac/drawingml/2011/main" val="1"/>
             </a:ext>
           </a:extLst>
         </p:spPr>
@@ -12419,7 +12557,7 @@
           </a:ln>
           <a:extLst>
             <a:ext uri="{C572A759-6A51-4108-AA02-DFA0A04FC94B}">
-              <ma14:wrappingTextBoxFlag xmlns:ma14="http://schemas.microsoft.com/office/mac/drawingml/2011/main" xmlns:a14="http://schemas.microsoft.com/office/drawing/2010/main" xmlns:m="http://schemas.openxmlformats.org/officeDocument/2006/math" xmlns="" val="1"/>
+              <ma14:wrappingTextBoxFlag xmlns="" xmlns:m="http://schemas.openxmlformats.org/officeDocument/2006/math" xmlns:a14="http://schemas.microsoft.com/office/drawing/2010/main" xmlns:ma14="http://schemas.microsoft.com/office/mac/drawingml/2011/main" val="1"/>
             </a:ext>
           </a:extLst>
         </p:spPr>
@@ -12501,7 +12639,7 @@
           </a:ln>
           <a:extLst>
             <a:ext uri="{C572A759-6A51-4108-AA02-DFA0A04FC94B}">
-              <ma14:wrappingTextBoxFlag xmlns:ma14="http://schemas.microsoft.com/office/mac/drawingml/2011/main" xmlns:a14="http://schemas.microsoft.com/office/drawing/2010/main" xmlns:m="http://schemas.openxmlformats.org/officeDocument/2006/math" xmlns="" val="1"/>
+              <ma14:wrappingTextBoxFlag xmlns="" xmlns:m="http://schemas.openxmlformats.org/officeDocument/2006/math" xmlns:a14="http://schemas.microsoft.com/office/drawing/2010/main" xmlns:ma14="http://schemas.microsoft.com/office/mac/drawingml/2011/main" val="1"/>
             </a:ext>
           </a:extLst>
         </p:spPr>
@@ -12583,7 +12721,7 @@
           </a:ln>
           <a:extLst>
             <a:ext uri="{C572A759-6A51-4108-AA02-DFA0A04FC94B}">
-              <ma14:wrappingTextBoxFlag xmlns:ma14="http://schemas.microsoft.com/office/mac/drawingml/2011/main" xmlns:a14="http://schemas.microsoft.com/office/drawing/2010/main" xmlns:m="http://schemas.openxmlformats.org/officeDocument/2006/math" xmlns="" val="1"/>
+              <ma14:wrappingTextBoxFlag xmlns="" xmlns:m="http://schemas.openxmlformats.org/officeDocument/2006/math" xmlns:a14="http://schemas.microsoft.com/office/drawing/2010/main" xmlns:ma14="http://schemas.microsoft.com/office/mac/drawingml/2011/main" val="1"/>
             </a:ext>
           </a:extLst>
         </p:spPr>
@@ -12622,7 +12760,7 @@
           </a:ln>
           <a:extLst>
             <a:ext uri="{C572A759-6A51-4108-AA02-DFA0A04FC94B}">
-              <ma14:wrappingTextBoxFlag xmlns:ma14="http://schemas.microsoft.com/office/mac/drawingml/2011/main" xmlns:a14="http://schemas.microsoft.com/office/drawing/2010/main" xmlns:m="http://schemas.openxmlformats.org/officeDocument/2006/math" xmlns="" val="1"/>
+              <ma14:wrappingTextBoxFlag xmlns="" xmlns:m="http://schemas.openxmlformats.org/officeDocument/2006/math" xmlns:a14="http://schemas.microsoft.com/office/drawing/2010/main" xmlns:ma14="http://schemas.microsoft.com/office/mac/drawingml/2011/main" val="1"/>
             </a:ext>
           </a:extLst>
         </p:spPr>
@@ -12747,7 +12885,7 @@
           </a:ln>
           <a:extLst>
             <a:ext uri="{C572A759-6A51-4108-AA02-DFA0A04FC94B}">
-              <ma14:wrappingTextBoxFlag xmlns:ma14="http://schemas.microsoft.com/office/mac/drawingml/2011/main" xmlns:a14="http://schemas.microsoft.com/office/drawing/2010/main" xmlns:m="http://schemas.openxmlformats.org/officeDocument/2006/math" xmlns="" val="1"/>
+              <ma14:wrappingTextBoxFlag xmlns="" xmlns:m="http://schemas.openxmlformats.org/officeDocument/2006/math" xmlns:a14="http://schemas.microsoft.com/office/drawing/2010/main" xmlns:ma14="http://schemas.microsoft.com/office/mac/drawingml/2011/main" val="1"/>
             </a:ext>
           </a:extLst>
         </p:spPr>
@@ -12786,7 +12924,7 @@
           </a:ln>
           <a:extLst>
             <a:ext uri="{C572A759-6A51-4108-AA02-DFA0A04FC94B}">
-              <ma14:wrappingTextBoxFlag xmlns:ma14="http://schemas.microsoft.com/office/mac/drawingml/2011/main" xmlns:a14="http://schemas.microsoft.com/office/drawing/2010/main" xmlns:m="http://schemas.openxmlformats.org/officeDocument/2006/math" xmlns="" val="1"/>
+              <ma14:wrappingTextBoxFlag xmlns="" xmlns:m="http://schemas.openxmlformats.org/officeDocument/2006/math" xmlns:a14="http://schemas.microsoft.com/office/drawing/2010/main" xmlns:ma14="http://schemas.microsoft.com/office/mac/drawingml/2011/main" val="1"/>
             </a:ext>
           </a:extLst>
         </p:spPr>
@@ -12874,7 +13012,7 @@
           </a:ln>
           <a:extLst>
             <a:ext uri="{C572A759-6A51-4108-AA02-DFA0A04FC94B}">
-              <ma14:wrappingTextBoxFlag xmlns:ma14="http://schemas.microsoft.com/office/mac/drawingml/2011/main" xmlns:a14="http://schemas.microsoft.com/office/drawing/2010/main" xmlns:m="http://schemas.openxmlformats.org/officeDocument/2006/math" xmlns="" val="1"/>
+              <ma14:wrappingTextBoxFlag xmlns="" xmlns:m="http://schemas.openxmlformats.org/officeDocument/2006/math" xmlns:a14="http://schemas.microsoft.com/office/drawing/2010/main" xmlns:ma14="http://schemas.microsoft.com/office/mac/drawingml/2011/main" val="1"/>
             </a:ext>
           </a:extLst>
         </p:spPr>
@@ -12917,7 +13055,7 @@
           </a:ln>
           <a:extLst>
             <a:ext uri="{C572A759-6A51-4108-AA02-DFA0A04FC94B}">
-              <ma14:wrappingTextBoxFlag xmlns:ma14="http://schemas.microsoft.com/office/mac/drawingml/2011/main" xmlns:a14="http://schemas.microsoft.com/office/drawing/2010/main" xmlns:m="http://schemas.openxmlformats.org/officeDocument/2006/math" xmlns="" val="1"/>
+              <ma14:wrappingTextBoxFlag xmlns="" xmlns:m="http://schemas.openxmlformats.org/officeDocument/2006/math" xmlns:a14="http://schemas.microsoft.com/office/drawing/2010/main" xmlns:ma14="http://schemas.microsoft.com/office/mac/drawingml/2011/main" val="1"/>
             </a:ext>
           </a:extLst>
         </p:spPr>
@@ -12960,7 +13098,7 @@
           </a:ln>
           <a:extLst>
             <a:ext uri="{C572A759-6A51-4108-AA02-DFA0A04FC94B}">
-              <ma14:wrappingTextBoxFlag xmlns:ma14="http://schemas.microsoft.com/office/mac/drawingml/2011/main" xmlns:a14="http://schemas.microsoft.com/office/drawing/2010/main" xmlns:m="http://schemas.openxmlformats.org/officeDocument/2006/math" xmlns="" val="1"/>
+              <ma14:wrappingTextBoxFlag xmlns="" xmlns:m="http://schemas.openxmlformats.org/officeDocument/2006/math" xmlns:a14="http://schemas.microsoft.com/office/drawing/2010/main" xmlns:ma14="http://schemas.microsoft.com/office/mac/drawingml/2011/main" val="1"/>
             </a:ext>
           </a:extLst>
         </p:spPr>
@@ -13003,7 +13141,7 @@
           </a:ln>
           <a:extLst>
             <a:ext uri="{C572A759-6A51-4108-AA02-DFA0A04FC94B}">
-              <ma14:wrappingTextBoxFlag xmlns:ma14="http://schemas.microsoft.com/office/mac/drawingml/2011/main" xmlns:a14="http://schemas.microsoft.com/office/drawing/2010/main" xmlns:m="http://schemas.openxmlformats.org/officeDocument/2006/math" xmlns="" val="1"/>
+              <ma14:wrappingTextBoxFlag xmlns="" xmlns:m="http://schemas.openxmlformats.org/officeDocument/2006/math" xmlns:a14="http://schemas.microsoft.com/office/drawing/2010/main" xmlns:ma14="http://schemas.microsoft.com/office/mac/drawingml/2011/main" val="1"/>
             </a:ext>
           </a:extLst>
         </p:spPr>
@@ -13046,7 +13184,7 @@
           </a:ln>
           <a:extLst>
             <a:ext uri="{C572A759-6A51-4108-AA02-DFA0A04FC94B}">
-              <ma14:wrappingTextBoxFlag xmlns:ma14="http://schemas.microsoft.com/office/mac/drawingml/2011/main" xmlns:a14="http://schemas.microsoft.com/office/drawing/2010/main" xmlns:m="http://schemas.openxmlformats.org/officeDocument/2006/math" xmlns="" val="1"/>
+              <ma14:wrappingTextBoxFlag xmlns="" xmlns:m="http://schemas.openxmlformats.org/officeDocument/2006/math" xmlns:a14="http://schemas.microsoft.com/office/drawing/2010/main" xmlns:ma14="http://schemas.microsoft.com/office/mac/drawingml/2011/main" val="1"/>
             </a:ext>
           </a:extLst>
         </p:spPr>
@@ -13089,7 +13227,7 @@
           </a:ln>
           <a:extLst>
             <a:ext uri="{C572A759-6A51-4108-AA02-DFA0A04FC94B}">
-              <ma14:wrappingTextBoxFlag xmlns:ma14="http://schemas.microsoft.com/office/mac/drawingml/2011/main" xmlns:a14="http://schemas.microsoft.com/office/drawing/2010/main" xmlns:m="http://schemas.openxmlformats.org/officeDocument/2006/math" xmlns="" val="1"/>
+              <ma14:wrappingTextBoxFlag xmlns="" xmlns:m="http://schemas.openxmlformats.org/officeDocument/2006/math" xmlns:a14="http://schemas.microsoft.com/office/drawing/2010/main" xmlns:ma14="http://schemas.microsoft.com/office/mac/drawingml/2011/main" val="1"/>
             </a:ext>
           </a:extLst>
         </p:spPr>
@@ -13132,7 +13270,7 @@
           </a:ln>
           <a:extLst>
             <a:ext uri="{C572A759-6A51-4108-AA02-DFA0A04FC94B}">
-              <ma14:wrappingTextBoxFlag xmlns:ma14="http://schemas.microsoft.com/office/mac/drawingml/2011/main" xmlns:a14="http://schemas.microsoft.com/office/drawing/2010/main" xmlns:m="http://schemas.openxmlformats.org/officeDocument/2006/math" xmlns="" val="1"/>
+              <ma14:wrappingTextBoxFlag xmlns="" xmlns:m="http://schemas.openxmlformats.org/officeDocument/2006/math" xmlns:a14="http://schemas.microsoft.com/office/drawing/2010/main" xmlns:ma14="http://schemas.microsoft.com/office/mac/drawingml/2011/main" val="1"/>
             </a:ext>
           </a:extLst>
         </p:spPr>
@@ -13169,7 +13307,7 @@
           </a:ln>
           <a:extLst>
             <a:ext uri="{C572A759-6A51-4108-AA02-DFA0A04FC94B}">
-              <ma14:wrappingTextBoxFlag xmlns:ma14="http://schemas.microsoft.com/office/mac/drawingml/2011/main" xmlns:a14="http://schemas.microsoft.com/office/drawing/2010/main" xmlns:m="http://schemas.openxmlformats.org/officeDocument/2006/math" xmlns="" val="1"/>
+              <ma14:wrappingTextBoxFlag xmlns="" xmlns:m="http://schemas.openxmlformats.org/officeDocument/2006/math" xmlns:a14="http://schemas.microsoft.com/office/drawing/2010/main" xmlns:ma14="http://schemas.microsoft.com/office/mac/drawingml/2011/main" val="1"/>
             </a:ext>
           </a:extLst>
         </p:spPr>
@@ -13208,7 +13346,7 @@
           </a:ln>
           <a:extLst>
             <a:ext uri="{C572A759-6A51-4108-AA02-DFA0A04FC94B}">
-              <ma14:wrappingTextBoxFlag xmlns:ma14="http://schemas.microsoft.com/office/mac/drawingml/2011/main" xmlns:a14="http://schemas.microsoft.com/office/drawing/2010/main" xmlns:m="http://schemas.openxmlformats.org/officeDocument/2006/math" xmlns="" val="1"/>
+              <ma14:wrappingTextBoxFlag xmlns="" xmlns:m="http://schemas.openxmlformats.org/officeDocument/2006/math" xmlns:a14="http://schemas.microsoft.com/office/drawing/2010/main" xmlns:ma14="http://schemas.microsoft.com/office/mac/drawingml/2011/main" val="1"/>
             </a:ext>
           </a:extLst>
         </p:spPr>
@@ -13253,7 +13391,7 @@
           </a:ln>
           <a:extLst>
             <a:ext uri="{C572A759-6A51-4108-AA02-DFA0A04FC94B}">
-              <ma14:wrappingTextBoxFlag xmlns:ma14="http://schemas.microsoft.com/office/mac/drawingml/2011/main" xmlns:a14="http://schemas.microsoft.com/office/drawing/2010/main" xmlns:m="http://schemas.openxmlformats.org/officeDocument/2006/math" xmlns="" val="1"/>
+              <ma14:wrappingTextBoxFlag xmlns="" xmlns:m="http://schemas.openxmlformats.org/officeDocument/2006/math" xmlns:a14="http://schemas.microsoft.com/office/drawing/2010/main" xmlns:ma14="http://schemas.microsoft.com/office/mac/drawingml/2011/main" val="1"/>
             </a:ext>
           </a:extLst>
         </p:spPr>
@@ -13296,7 +13434,7 @@
           </a:ln>
           <a:extLst>
             <a:ext uri="{C572A759-6A51-4108-AA02-DFA0A04FC94B}">
-              <ma14:wrappingTextBoxFlag xmlns:ma14="http://schemas.microsoft.com/office/mac/drawingml/2011/main" xmlns:a14="http://schemas.microsoft.com/office/drawing/2010/main" xmlns:m="http://schemas.openxmlformats.org/officeDocument/2006/math" xmlns="" val="1"/>
+              <ma14:wrappingTextBoxFlag xmlns="" xmlns:m="http://schemas.openxmlformats.org/officeDocument/2006/math" xmlns:a14="http://schemas.microsoft.com/office/drawing/2010/main" xmlns:ma14="http://schemas.microsoft.com/office/mac/drawingml/2011/main" val="1"/>
             </a:ext>
           </a:extLst>
         </p:spPr>
@@ -13403,7 +13541,7 @@
           </a:ln>
           <a:extLst>
             <a:ext uri="{C572A759-6A51-4108-AA02-DFA0A04FC94B}">
-              <ma14:wrappingTextBoxFlag xmlns:ma14="http://schemas.microsoft.com/office/mac/drawingml/2011/main" xmlns:a14="http://schemas.microsoft.com/office/drawing/2010/main" xmlns:m="http://schemas.openxmlformats.org/officeDocument/2006/math" xmlns="" val="1"/>
+              <ma14:wrappingTextBoxFlag xmlns="" xmlns:m="http://schemas.openxmlformats.org/officeDocument/2006/math" xmlns:a14="http://schemas.microsoft.com/office/drawing/2010/main" xmlns:ma14="http://schemas.microsoft.com/office/mac/drawingml/2011/main" val="1"/>
             </a:ext>
           </a:extLst>
         </p:spPr>
@@ -13442,7 +13580,7 @@
           </a:ln>
           <a:extLst>
             <a:ext uri="{C572A759-6A51-4108-AA02-DFA0A04FC94B}">
-              <ma14:wrappingTextBoxFlag xmlns:ma14="http://schemas.microsoft.com/office/mac/drawingml/2011/main" xmlns:a14="http://schemas.microsoft.com/office/drawing/2010/main" xmlns:m="http://schemas.openxmlformats.org/officeDocument/2006/math" xmlns="" val="1"/>
+              <ma14:wrappingTextBoxFlag xmlns="" xmlns:m="http://schemas.openxmlformats.org/officeDocument/2006/math" xmlns:a14="http://schemas.microsoft.com/office/drawing/2010/main" xmlns:ma14="http://schemas.microsoft.com/office/mac/drawingml/2011/main" val="1"/>
             </a:ext>
           </a:extLst>
         </p:spPr>
@@ -13481,7 +13619,7 @@
           </a:ln>
           <a:extLst>
             <a:ext uri="{C572A759-6A51-4108-AA02-DFA0A04FC94B}">
-              <ma14:wrappingTextBoxFlag xmlns:ma14="http://schemas.microsoft.com/office/mac/drawingml/2011/main" xmlns:a14="http://schemas.microsoft.com/office/drawing/2010/main" xmlns:m="http://schemas.openxmlformats.org/officeDocument/2006/math" xmlns="" val="1"/>
+              <ma14:wrappingTextBoxFlag xmlns="" xmlns:m="http://schemas.openxmlformats.org/officeDocument/2006/math" xmlns:a14="http://schemas.microsoft.com/office/drawing/2010/main" xmlns:ma14="http://schemas.microsoft.com/office/mac/drawingml/2011/main" val="1"/>
             </a:ext>
           </a:extLst>
         </p:spPr>
@@ -14097,7 +14235,7 @@
           </a:ln>
           <a:extLst>
             <a:ext uri="{C572A759-6A51-4108-AA02-DFA0A04FC94B}">
-              <ma14:wrappingTextBoxFlag xmlns:ma14="http://schemas.microsoft.com/office/mac/drawingml/2011/main" xmlns:a14="http://schemas.microsoft.com/office/drawing/2010/main" xmlns:m="http://schemas.openxmlformats.org/officeDocument/2006/math" xmlns="" val="1"/>
+              <ma14:wrappingTextBoxFlag xmlns="" xmlns:m="http://schemas.openxmlformats.org/officeDocument/2006/math" xmlns:a14="http://schemas.microsoft.com/office/drawing/2010/main" xmlns:ma14="http://schemas.microsoft.com/office/mac/drawingml/2011/main" val="1"/>
             </a:ext>
           </a:extLst>
         </p:spPr>
@@ -14140,7 +14278,7 @@
           </a:ln>
           <a:extLst>
             <a:ext uri="{C572A759-6A51-4108-AA02-DFA0A04FC94B}">
-              <ma14:wrappingTextBoxFlag xmlns:ma14="http://schemas.microsoft.com/office/mac/drawingml/2011/main" xmlns:a14="http://schemas.microsoft.com/office/drawing/2010/main" xmlns:m="http://schemas.openxmlformats.org/officeDocument/2006/math" xmlns="" val="1"/>
+              <ma14:wrappingTextBoxFlag xmlns="" xmlns:m="http://schemas.openxmlformats.org/officeDocument/2006/math" xmlns:a14="http://schemas.microsoft.com/office/drawing/2010/main" xmlns:ma14="http://schemas.microsoft.com/office/mac/drawingml/2011/main" val="1"/>
             </a:ext>
           </a:extLst>
         </p:spPr>
@@ -14183,7 +14321,7 @@
           </a:ln>
           <a:extLst>
             <a:ext uri="{C572A759-6A51-4108-AA02-DFA0A04FC94B}">
-              <ma14:wrappingTextBoxFlag xmlns:ma14="http://schemas.microsoft.com/office/mac/drawingml/2011/main" xmlns:a14="http://schemas.microsoft.com/office/drawing/2010/main" xmlns:m="http://schemas.openxmlformats.org/officeDocument/2006/math" xmlns="" val="1"/>
+              <ma14:wrappingTextBoxFlag xmlns="" xmlns:m="http://schemas.openxmlformats.org/officeDocument/2006/math" xmlns:a14="http://schemas.microsoft.com/office/drawing/2010/main" xmlns:ma14="http://schemas.microsoft.com/office/mac/drawingml/2011/main" val="1"/>
             </a:ext>
           </a:extLst>
         </p:spPr>
@@ -14226,7 +14364,7 @@
           </a:ln>
           <a:extLst>
             <a:ext uri="{C572A759-6A51-4108-AA02-DFA0A04FC94B}">
-              <ma14:wrappingTextBoxFlag xmlns:ma14="http://schemas.microsoft.com/office/mac/drawingml/2011/main" xmlns:a14="http://schemas.microsoft.com/office/drawing/2010/main" xmlns:m="http://schemas.openxmlformats.org/officeDocument/2006/math" xmlns="" val="1"/>
+              <ma14:wrappingTextBoxFlag xmlns="" xmlns:m="http://schemas.openxmlformats.org/officeDocument/2006/math" xmlns:a14="http://schemas.microsoft.com/office/drawing/2010/main" xmlns:ma14="http://schemas.microsoft.com/office/mac/drawingml/2011/main" val="1"/>
             </a:ext>
           </a:extLst>
         </p:spPr>
@@ -14269,7 +14407,7 @@
           </a:ln>
           <a:extLst>
             <a:ext uri="{C572A759-6A51-4108-AA02-DFA0A04FC94B}">
-              <ma14:wrappingTextBoxFlag xmlns:ma14="http://schemas.microsoft.com/office/mac/drawingml/2011/main" xmlns:a14="http://schemas.microsoft.com/office/drawing/2010/main" xmlns:m="http://schemas.openxmlformats.org/officeDocument/2006/math" xmlns="" val="1"/>
+              <ma14:wrappingTextBoxFlag xmlns="" xmlns:m="http://schemas.openxmlformats.org/officeDocument/2006/math" xmlns:a14="http://schemas.microsoft.com/office/drawing/2010/main" xmlns:ma14="http://schemas.microsoft.com/office/mac/drawingml/2011/main" val="1"/>
             </a:ext>
           </a:extLst>
         </p:spPr>
@@ -14312,7 +14450,7 @@
           </a:ln>
           <a:extLst>
             <a:ext uri="{C572A759-6A51-4108-AA02-DFA0A04FC94B}">
-              <ma14:wrappingTextBoxFlag xmlns:ma14="http://schemas.microsoft.com/office/mac/drawingml/2011/main" xmlns:a14="http://schemas.microsoft.com/office/drawing/2010/main" xmlns:m="http://schemas.openxmlformats.org/officeDocument/2006/math" xmlns="" val="1"/>
+              <ma14:wrappingTextBoxFlag xmlns="" xmlns:m="http://schemas.openxmlformats.org/officeDocument/2006/math" xmlns:a14="http://schemas.microsoft.com/office/drawing/2010/main" xmlns:ma14="http://schemas.microsoft.com/office/mac/drawingml/2011/main" val="1"/>
             </a:ext>
           </a:extLst>
         </p:spPr>
@@ -14445,7 +14583,7 @@
           </a:ln>
           <a:extLst>
             <a:ext uri="{C572A759-6A51-4108-AA02-DFA0A04FC94B}">
-              <ma14:wrappingTextBoxFlag xmlns:ma14="http://schemas.microsoft.com/office/mac/drawingml/2011/main" xmlns:a14="http://schemas.microsoft.com/office/drawing/2010/main" xmlns:m="http://schemas.openxmlformats.org/officeDocument/2006/math" xmlns="" val="1"/>
+              <ma14:wrappingTextBoxFlag xmlns="" xmlns:m="http://schemas.openxmlformats.org/officeDocument/2006/math" xmlns:a14="http://schemas.microsoft.com/office/drawing/2010/main" xmlns:ma14="http://schemas.microsoft.com/office/mac/drawingml/2011/main" val="1"/>
             </a:ext>
           </a:extLst>
         </p:spPr>
@@ -14578,7 +14716,7 @@
           </a:ln>
           <a:extLst>
             <a:ext uri="{C572A759-6A51-4108-AA02-DFA0A04FC94B}">
-              <ma14:wrappingTextBoxFlag xmlns:ma14="http://schemas.microsoft.com/office/mac/drawingml/2011/main" xmlns:a14="http://schemas.microsoft.com/office/drawing/2010/main" xmlns:m="http://schemas.openxmlformats.org/officeDocument/2006/math" xmlns="" val="1"/>
+              <ma14:wrappingTextBoxFlag xmlns="" xmlns:m="http://schemas.openxmlformats.org/officeDocument/2006/math" xmlns:a14="http://schemas.microsoft.com/office/drawing/2010/main" xmlns:ma14="http://schemas.microsoft.com/office/mac/drawingml/2011/main" val="1"/>
             </a:ext>
           </a:extLst>
         </p:spPr>
@@ -14794,7 +14932,7 @@
           </a:ln>
           <a:extLst>
             <a:ext uri="{C572A759-6A51-4108-AA02-DFA0A04FC94B}">
-              <ma14:wrappingTextBoxFlag xmlns:ma14="http://schemas.microsoft.com/office/mac/drawingml/2011/main" xmlns:a14="http://schemas.microsoft.com/office/drawing/2010/main" xmlns:m="http://schemas.openxmlformats.org/officeDocument/2006/math" xmlns="" val="1"/>
+              <ma14:wrappingTextBoxFlag xmlns="" xmlns:m="http://schemas.openxmlformats.org/officeDocument/2006/math" xmlns:a14="http://schemas.microsoft.com/office/drawing/2010/main" xmlns:ma14="http://schemas.microsoft.com/office/mac/drawingml/2011/main" val="1"/>
             </a:ext>
           </a:extLst>
         </p:spPr>
@@ -14829,7 +14967,7 @@
           </a:ln>
           <a:extLst>
             <a:ext uri="{C572A759-6A51-4108-AA02-DFA0A04FC94B}">
-              <ma14:wrappingTextBoxFlag xmlns:ma14="http://schemas.microsoft.com/office/mac/drawingml/2011/main" xmlns:a14="http://schemas.microsoft.com/office/drawing/2010/main" xmlns:m="http://schemas.openxmlformats.org/officeDocument/2006/math" xmlns="" val="1"/>
+              <ma14:wrappingTextBoxFlag xmlns="" xmlns:m="http://schemas.openxmlformats.org/officeDocument/2006/math" xmlns:a14="http://schemas.microsoft.com/office/drawing/2010/main" xmlns:ma14="http://schemas.microsoft.com/office/mac/drawingml/2011/main" val="1"/>
             </a:ext>
           </a:extLst>
         </p:spPr>
@@ -14998,7 +15136,7 @@
           </a:ln>
           <a:extLst>
             <a:ext uri="{C572A759-6A51-4108-AA02-DFA0A04FC94B}">
-              <ma14:wrappingTextBoxFlag xmlns:ma14="http://schemas.microsoft.com/office/mac/drawingml/2011/main" xmlns:a14="http://schemas.microsoft.com/office/drawing/2010/main" xmlns:m="http://schemas.openxmlformats.org/officeDocument/2006/math" xmlns="" val="1"/>
+              <ma14:wrappingTextBoxFlag xmlns="" xmlns:m="http://schemas.openxmlformats.org/officeDocument/2006/math" xmlns:a14="http://schemas.microsoft.com/office/drawing/2010/main" xmlns:ma14="http://schemas.microsoft.com/office/mac/drawingml/2011/main" val="1"/>
             </a:ext>
           </a:extLst>
         </p:spPr>
@@ -15092,7 +15230,7 @@
           </a:ln>
           <a:extLst>
             <a:ext uri="{C572A759-6A51-4108-AA02-DFA0A04FC94B}">
-              <ma14:wrappingTextBoxFlag xmlns:ma14="http://schemas.microsoft.com/office/mac/drawingml/2011/main" xmlns:a14="http://schemas.microsoft.com/office/drawing/2010/main" xmlns:m="http://schemas.openxmlformats.org/officeDocument/2006/math" xmlns="" val="1"/>
+              <ma14:wrappingTextBoxFlag xmlns="" xmlns:m="http://schemas.openxmlformats.org/officeDocument/2006/math" xmlns:a14="http://schemas.microsoft.com/office/drawing/2010/main" xmlns:ma14="http://schemas.microsoft.com/office/mac/drawingml/2011/main" val="1"/>
             </a:ext>
           </a:extLst>
         </p:spPr>
@@ -15134,7 +15272,7 @@
           </a:ln>
           <a:extLst>
             <a:ext uri="{C572A759-6A51-4108-AA02-DFA0A04FC94B}">
-              <ma14:wrappingTextBoxFlag xmlns:ma14="http://schemas.microsoft.com/office/mac/drawingml/2011/main" xmlns:a14="http://schemas.microsoft.com/office/drawing/2010/main" xmlns:m="http://schemas.openxmlformats.org/officeDocument/2006/math" xmlns="" val="1"/>
+              <ma14:wrappingTextBoxFlag xmlns="" xmlns:m="http://schemas.openxmlformats.org/officeDocument/2006/math" xmlns:a14="http://schemas.microsoft.com/office/drawing/2010/main" xmlns:ma14="http://schemas.microsoft.com/office/mac/drawingml/2011/main" val="1"/>
             </a:ext>
           </a:extLst>
         </p:spPr>
@@ -15181,7 +15319,7 @@
           </a:ln>
           <a:extLst>
             <a:ext uri="{C572A759-6A51-4108-AA02-DFA0A04FC94B}">
-              <ma14:wrappingTextBoxFlag xmlns:ma14="http://schemas.microsoft.com/office/mac/drawingml/2011/main" xmlns:a14="http://schemas.microsoft.com/office/drawing/2010/main" xmlns:m="http://schemas.openxmlformats.org/officeDocument/2006/math" xmlns="" val="1"/>
+              <ma14:wrappingTextBoxFlag xmlns="" xmlns:m="http://schemas.openxmlformats.org/officeDocument/2006/math" xmlns:a14="http://schemas.microsoft.com/office/drawing/2010/main" xmlns:ma14="http://schemas.microsoft.com/office/mac/drawingml/2011/main" val="1"/>
             </a:ext>
           </a:extLst>
         </p:spPr>
@@ -15225,7 +15363,7 @@
           </a:ln>
           <a:extLst>
             <a:ext uri="{C572A759-6A51-4108-AA02-DFA0A04FC94B}">
-              <ma14:wrappingTextBoxFlag xmlns:ma14="http://schemas.microsoft.com/office/mac/drawingml/2011/main" xmlns:a14="http://schemas.microsoft.com/office/drawing/2010/main" xmlns:m="http://schemas.openxmlformats.org/officeDocument/2006/math" xmlns="" val="1"/>
+              <ma14:wrappingTextBoxFlag xmlns="" xmlns:m="http://schemas.openxmlformats.org/officeDocument/2006/math" xmlns:a14="http://schemas.microsoft.com/office/drawing/2010/main" xmlns:ma14="http://schemas.microsoft.com/office/mac/drawingml/2011/main" val="1"/>
             </a:ext>
           </a:extLst>
         </p:spPr>
@@ -15338,7 +15476,7 @@
           </a:ln>
           <a:extLst>
             <a:ext uri="{C572A759-6A51-4108-AA02-DFA0A04FC94B}">
-              <ma14:wrappingTextBoxFlag xmlns:ma14="http://schemas.microsoft.com/office/mac/drawingml/2011/main" xmlns:a14="http://schemas.microsoft.com/office/drawing/2010/main" xmlns:m="http://schemas.openxmlformats.org/officeDocument/2006/math" xmlns="" val="1"/>
+              <ma14:wrappingTextBoxFlag xmlns="" xmlns:m="http://schemas.openxmlformats.org/officeDocument/2006/math" xmlns:a14="http://schemas.microsoft.com/office/drawing/2010/main" xmlns:ma14="http://schemas.microsoft.com/office/mac/drawingml/2011/main" val="1"/>
             </a:ext>
           </a:extLst>
         </p:spPr>
@@ -15507,7 +15645,7 @@
           </a:ln>
           <a:extLst>
             <a:ext uri="{C572A759-6A51-4108-AA02-DFA0A04FC94B}">
-              <ma14:wrappingTextBoxFlag xmlns:ma14="http://schemas.microsoft.com/office/mac/drawingml/2011/main" xmlns:a14="http://schemas.microsoft.com/office/drawing/2010/main" xmlns:m="http://schemas.openxmlformats.org/officeDocument/2006/math" xmlns="" val="1"/>
+              <ma14:wrappingTextBoxFlag xmlns="" xmlns:m="http://schemas.openxmlformats.org/officeDocument/2006/math" xmlns:a14="http://schemas.microsoft.com/office/drawing/2010/main" xmlns:ma14="http://schemas.microsoft.com/office/mac/drawingml/2011/main" val="1"/>
             </a:ext>
           </a:extLst>
         </p:spPr>
@@ -15542,7 +15680,7 @@
           </a:ln>
           <a:extLst>
             <a:ext uri="{C572A759-6A51-4108-AA02-DFA0A04FC94B}">
-              <ma14:wrappingTextBoxFlag xmlns:ma14="http://schemas.microsoft.com/office/mac/drawingml/2011/main" xmlns:a14="http://schemas.microsoft.com/office/drawing/2010/main" xmlns:m="http://schemas.openxmlformats.org/officeDocument/2006/math" xmlns="" val="1"/>
+              <ma14:wrappingTextBoxFlag xmlns="" xmlns:m="http://schemas.openxmlformats.org/officeDocument/2006/math" xmlns:a14="http://schemas.microsoft.com/office/drawing/2010/main" xmlns:ma14="http://schemas.microsoft.com/office/mac/drawingml/2011/main" val="1"/>
             </a:ext>
           </a:extLst>
         </p:spPr>
@@ -15711,7 +15849,7 @@
           </a:ln>
           <a:extLst>
             <a:ext uri="{C572A759-6A51-4108-AA02-DFA0A04FC94B}">
-              <ma14:wrappingTextBoxFlag xmlns:ma14="http://schemas.microsoft.com/office/mac/drawingml/2011/main" xmlns:a14="http://schemas.microsoft.com/office/drawing/2010/main" xmlns:m="http://schemas.openxmlformats.org/officeDocument/2006/math" xmlns="" val="1"/>
+              <ma14:wrappingTextBoxFlag xmlns="" xmlns:m="http://schemas.openxmlformats.org/officeDocument/2006/math" xmlns:a14="http://schemas.microsoft.com/office/drawing/2010/main" xmlns:ma14="http://schemas.microsoft.com/office/mac/drawingml/2011/main" val="1"/>
             </a:ext>
           </a:extLst>
         </p:spPr>
@@ -15805,7 +15943,7 @@
           </a:ln>
           <a:extLst>
             <a:ext uri="{C572A759-6A51-4108-AA02-DFA0A04FC94B}">
-              <ma14:wrappingTextBoxFlag xmlns:ma14="http://schemas.microsoft.com/office/mac/drawingml/2011/main" xmlns:a14="http://schemas.microsoft.com/office/drawing/2010/main" xmlns:m="http://schemas.openxmlformats.org/officeDocument/2006/math" xmlns="" val="1"/>
+              <ma14:wrappingTextBoxFlag xmlns="" xmlns:m="http://schemas.openxmlformats.org/officeDocument/2006/math" xmlns:a14="http://schemas.microsoft.com/office/drawing/2010/main" xmlns:ma14="http://schemas.microsoft.com/office/mac/drawingml/2011/main" val="1"/>
             </a:ext>
           </a:extLst>
         </p:spPr>
@@ -15847,7 +15985,7 @@
           </a:ln>
           <a:extLst>
             <a:ext uri="{C572A759-6A51-4108-AA02-DFA0A04FC94B}">
-              <ma14:wrappingTextBoxFlag xmlns:ma14="http://schemas.microsoft.com/office/mac/drawingml/2011/main" xmlns:a14="http://schemas.microsoft.com/office/drawing/2010/main" xmlns:m="http://schemas.openxmlformats.org/officeDocument/2006/math" xmlns="" val="1"/>
+              <ma14:wrappingTextBoxFlag xmlns="" xmlns:m="http://schemas.openxmlformats.org/officeDocument/2006/math" xmlns:a14="http://schemas.microsoft.com/office/drawing/2010/main" xmlns:ma14="http://schemas.microsoft.com/office/mac/drawingml/2011/main" val="1"/>
             </a:ext>
           </a:extLst>
         </p:spPr>
@@ -15894,7 +16032,7 @@
           </a:ln>
           <a:extLst>
             <a:ext uri="{C572A759-6A51-4108-AA02-DFA0A04FC94B}">
-              <ma14:wrappingTextBoxFlag xmlns:ma14="http://schemas.microsoft.com/office/mac/drawingml/2011/main" xmlns:a14="http://schemas.microsoft.com/office/drawing/2010/main" xmlns:m="http://schemas.openxmlformats.org/officeDocument/2006/math" xmlns="" val="1"/>
+              <ma14:wrappingTextBoxFlag xmlns="" xmlns:m="http://schemas.openxmlformats.org/officeDocument/2006/math" xmlns:a14="http://schemas.microsoft.com/office/drawing/2010/main" xmlns:ma14="http://schemas.microsoft.com/office/mac/drawingml/2011/main" val="1"/>
             </a:ext>
           </a:extLst>
         </p:spPr>
@@ -15980,7 +16118,7 @@
           </a:ln>
           <a:extLst>
             <a:ext uri="{C572A759-6A51-4108-AA02-DFA0A04FC94B}">
-              <ma14:wrappingTextBoxFlag xmlns:ma14="http://schemas.microsoft.com/office/mac/drawingml/2011/main" xmlns:a14="http://schemas.microsoft.com/office/drawing/2010/main" xmlns:m="http://schemas.openxmlformats.org/officeDocument/2006/math" xmlns="" val="1"/>
+              <ma14:wrappingTextBoxFlag xmlns="" xmlns:m="http://schemas.openxmlformats.org/officeDocument/2006/math" xmlns:a14="http://schemas.microsoft.com/office/drawing/2010/main" xmlns:ma14="http://schemas.microsoft.com/office/mac/drawingml/2011/main" val="1"/>
             </a:ext>
           </a:extLst>
         </p:spPr>
@@ -16093,7 +16231,7 @@
           </a:ln>
           <a:extLst>
             <a:ext uri="{C572A759-6A51-4108-AA02-DFA0A04FC94B}">
-              <ma14:wrappingTextBoxFlag xmlns:ma14="http://schemas.microsoft.com/office/mac/drawingml/2011/main" xmlns:a14="http://schemas.microsoft.com/office/drawing/2010/main" xmlns:m="http://schemas.openxmlformats.org/officeDocument/2006/math" xmlns="" val="1"/>
+              <ma14:wrappingTextBoxFlag xmlns="" xmlns:m="http://schemas.openxmlformats.org/officeDocument/2006/math" xmlns:a14="http://schemas.microsoft.com/office/drawing/2010/main" xmlns:ma14="http://schemas.microsoft.com/office/mac/drawingml/2011/main" val="1"/>
             </a:ext>
           </a:extLst>
         </p:spPr>
@@ -16168,7 +16306,7 @@
           </a:ln>
           <a:extLst>
             <a:ext uri="{C572A759-6A51-4108-AA02-DFA0A04FC94B}">
-              <ma14:wrappingTextBoxFlag xmlns:ma14="http://schemas.microsoft.com/office/mac/drawingml/2011/main" xmlns:a14="http://schemas.microsoft.com/office/drawing/2010/main" xmlns:m="http://schemas.openxmlformats.org/officeDocument/2006/math" xmlns="" val="1"/>
+              <ma14:wrappingTextBoxFlag xmlns="" xmlns:m="http://schemas.openxmlformats.org/officeDocument/2006/math" xmlns:a14="http://schemas.microsoft.com/office/drawing/2010/main" xmlns:ma14="http://schemas.microsoft.com/office/mac/drawingml/2011/main" val="1"/>
             </a:ext>
           </a:extLst>
         </p:spPr>
@@ -16187,6 +16325,7 @@
               </a:defRPr>
             </a:pPr>
             <a:r>
+              <a:rPr dirty="0"/>
               <a:t>import json</a:t>
             </a:r>
           </a:p>
@@ -16199,7 +16338,7 @@
                 <a:sym typeface="Courier"/>
               </a:defRPr>
             </a:pPr>
-            <a:endParaRPr/>
+            <a:endParaRPr dirty="0"/>
           </a:p>
           <a:p>
             <a:pPr algn="l" defTabSz="554990">
@@ -16211,13 +16350,42 @@
               </a:defRPr>
             </a:pPr>
             <a:r>
-              <a:rPr>
+              <a:rPr dirty="0">
                 <a:solidFill>
                   <a:srgbClr val="929292"/>
                 </a:solidFill>
               </a:rPr>
-              <a:t># data is a dict, list, etc</a:t>
-            </a:r>
+              <a:t># data is a </a:t>
+            </a:r>
+            <a:r>
+              <a:rPr dirty="0" err="1">
+                <a:solidFill>
+                  <a:srgbClr val="929292"/>
+                </a:solidFill>
+              </a:rPr>
+              <a:t>dict</a:t>
+            </a:r>
+            <a:r>
+              <a:rPr dirty="0">
+                <a:solidFill>
+                  <a:srgbClr val="929292"/>
+                </a:solidFill>
+              </a:rPr>
+              <a:t>, list, </a:t>
+            </a:r>
+            <a:r>
+              <a:rPr dirty="0" err="1">
+                <a:solidFill>
+                  <a:srgbClr val="929292"/>
+                </a:solidFill>
+              </a:rPr>
+              <a:t>etc</a:t>
+            </a:r>
+            <a:endParaRPr dirty="0">
+              <a:solidFill>
+                <a:srgbClr val="929292"/>
+              </a:solidFill>
+            </a:endParaRPr>
           </a:p>
           <a:p>
             <a:pPr algn="l" defTabSz="554990">
@@ -16229,7 +16397,16 @@
               </a:defRPr>
             </a:pPr>
             <a:r>
-              <a:t>def write_json(path, data):</a:t>
+              <a:rPr dirty="0"/>
+              <a:t>def </a:t>
+            </a:r>
+            <a:r>
+              <a:rPr dirty="0" err="1"/>
+              <a:t>write_json</a:t>
+            </a:r>
+            <a:r>
+              <a:rPr dirty="0"/>
+              <a:t>(path, data):</a:t>
             </a:r>
           </a:p>
           <a:p>
@@ -16242,6 +16419,7 @@
               </a:defRPr>
             </a:pPr>
             <a:r>
+              <a:rPr dirty="0"/>
               <a:t>    with open(path, 'w', encoding="utf-8") as f:</a:t>
             </a:r>
           </a:p>
@@ -16255,7 +16433,16 @@
               </a:defRPr>
             </a:pPr>
             <a:r>
-              <a:t>        json.dump(data, f, indent=2)</a:t>
+              <a:rPr dirty="0"/>
+              <a:t>        </a:t>
+            </a:r>
+            <a:r>
+              <a:rPr dirty="0" err="1"/>
+              <a:t>json.dump</a:t>
+            </a:r>
+            <a:r>
+              <a:rPr dirty="0"/>
+              <a:t>(data, f, indent=2)</a:t>
             </a:r>
           </a:p>
         </p:txBody>
@@ -16294,7 +16481,7 @@
           </a:effectLst>
           <a:extLst>
             <a:ext uri="{C572A759-6A51-4108-AA02-DFA0A04FC94B}">
-              <ma14:wrappingTextBoxFlag xmlns:ma14="http://schemas.microsoft.com/office/mac/drawingml/2011/main" xmlns:a14="http://schemas.microsoft.com/office/drawing/2010/main" xmlns:m="http://schemas.openxmlformats.org/officeDocument/2006/math" xmlns="" val="1"/>
+              <ma14:wrappingTextBoxFlag xmlns="" xmlns:m="http://schemas.openxmlformats.org/officeDocument/2006/math" xmlns:a14="http://schemas.microsoft.com/office/drawing/2010/main" xmlns:ma14="http://schemas.microsoft.com/office/mac/drawingml/2011/main" val="1"/>
             </a:ext>
           </a:extLst>
         </p:spPr>
@@ -16351,7 +16538,7 @@
           </a:effectLst>
           <a:extLst>
             <a:ext uri="{C572A759-6A51-4108-AA02-DFA0A04FC94B}">
-              <ma14:wrappingTextBoxFlag xmlns:ma14="http://schemas.microsoft.com/office/mac/drawingml/2011/main" xmlns:a14="http://schemas.microsoft.com/office/drawing/2010/main" xmlns:m="http://schemas.openxmlformats.org/officeDocument/2006/math" xmlns="" val="1"/>
+              <ma14:wrappingTextBoxFlag xmlns="" xmlns:m="http://schemas.openxmlformats.org/officeDocument/2006/math" xmlns:a14="http://schemas.microsoft.com/office/drawing/2010/main" xmlns:ma14="http://schemas.microsoft.com/office/mac/drawingml/2011/main" val="1"/>
             </a:ext>
           </a:extLst>
         </p:spPr>
@@ -16393,7 +16580,7 @@
           </a:ln>
           <a:extLst>
             <a:ext uri="{C572A759-6A51-4108-AA02-DFA0A04FC94B}">
-              <ma14:wrappingTextBoxFlag xmlns:ma14="http://schemas.microsoft.com/office/mac/drawingml/2011/main" xmlns:a14="http://schemas.microsoft.com/office/drawing/2010/main" xmlns:m="http://schemas.openxmlformats.org/officeDocument/2006/math" xmlns="" val="1"/>
+              <ma14:wrappingTextBoxFlag xmlns="" xmlns:m="http://schemas.openxmlformats.org/officeDocument/2006/math" xmlns:a14="http://schemas.microsoft.com/office/drawing/2010/main" xmlns:ma14="http://schemas.microsoft.com/office/mac/drawingml/2011/main" val="1"/>
             </a:ext>
           </a:extLst>
         </p:spPr>
@@ -16432,7 +16619,7 @@
           </a:ln>
           <a:extLst>
             <a:ext uri="{C572A759-6A51-4108-AA02-DFA0A04FC94B}">
-              <ma14:wrappingTextBoxFlag xmlns:ma14="http://schemas.microsoft.com/office/mac/drawingml/2011/main" xmlns:a14="http://schemas.microsoft.com/office/drawing/2010/main" xmlns:m="http://schemas.openxmlformats.org/officeDocument/2006/math" xmlns="" val="1"/>
+              <ma14:wrappingTextBoxFlag xmlns="" xmlns:m="http://schemas.openxmlformats.org/officeDocument/2006/math" xmlns:a14="http://schemas.microsoft.com/office/drawing/2010/main" xmlns:ma14="http://schemas.microsoft.com/office/mac/drawingml/2011/main" val="1"/>
             </a:ext>
           </a:extLst>
         </p:spPr>
@@ -16669,7 +16856,7 @@
           </a:ln>
           <a:extLst>
             <a:ext uri="{C572A759-6A51-4108-AA02-DFA0A04FC94B}">
-              <ma14:wrappingTextBoxFlag xmlns:ma14="http://schemas.microsoft.com/office/mac/drawingml/2011/main" xmlns:a14="http://schemas.microsoft.com/office/drawing/2010/main" xmlns:m="http://schemas.openxmlformats.org/officeDocument/2006/math" xmlns="" val="1"/>
+              <ma14:wrappingTextBoxFlag xmlns="" xmlns:m="http://schemas.openxmlformats.org/officeDocument/2006/math" xmlns:a14="http://schemas.microsoft.com/office/drawing/2010/main" xmlns:ma14="http://schemas.microsoft.com/office/mac/drawingml/2011/main" val="1"/>
             </a:ext>
           </a:extLst>
         </p:spPr>
@@ -16706,7 +16893,7 @@
           </a:ln>
           <a:extLst>
             <a:ext uri="{C572A759-6A51-4108-AA02-DFA0A04FC94B}">
-              <ma14:wrappingTextBoxFlag xmlns:ma14="http://schemas.microsoft.com/office/mac/drawingml/2011/main" xmlns:a14="http://schemas.microsoft.com/office/drawing/2010/main" xmlns:m="http://schemas.openxmlformats.org/officeDocument/2006/math" xmlns="" val="1"/>
+              <ma14:wrappingTextBoxFlag xmlns="" xmlns:m="http://schemas.openxmlformats.org/officeDocument/2006/math" xmlns:a14="http://schemas.microsoft.com/office/drawing/2010/main" xmlns:ma14="http://schemas.microsoft.com/office/mac/drawingml/2011/main" val="1"/>
             </a:ext>
           </a:extLst>
         </p:spPr>
@@ -16932,7 +17119,7 @@
           </a:ln>
           <a:extLst>
             <a:ext uri="{C572A759-6A51-4108-AA02-DFA0A04FC94B}">
-              <ma14:wrappingTextBoxFlag xmlns:ma14="http://schemas.microsoft.com/office/mac/drawingml/2011/main" xmlns:a14="http://schemas.microsoft.com/office/drawing/2010/main" xmlns:m="http://schemas.openxmlformats.org/officeDocument/2006/math" xmlns="" val="1"/>
+              <ma14:wrappingTextBoxFlag xmlns="" xmlns:m="http://schemas.openxmlformats.org/officeDocument/2006/math" xmlns:a14="http://schemas.microsoft.com/office/drawing/2010/main" xmlns:ma14="http://schemas.microsoft.com/office/mac/drawingml/2011/main" val="1"/>
             </a:ext>
           </a:extLst>
         </p:spPr>
@@ -17048,7 +17235,7 @@
           </a:ln>
           <a:extLst>
             <a:ext uri="{C572A759-6A51-4108-AA02-DFA0A04FC94B}">
-              <ma14:wrappingTextBoxFlag xmlns:ma14="http://schemas.microsoft.com/office/mac/drawingml/2011/main" xmlns:a14="http://schemas.microsoft.com/office/drawing/2010/main" xmlns:m="http://schemas.openxmlformats.org/officeDocument/2006/math" xmlns="" val="1"/>
+              <ma14:wrappingTextBoxFlag xmlns="" xmlns:m="http://schemas.openxmlformats.org/officeDocument/2006/math" xmlns:a14="http://schemas.microsoft.com/office/drawing/2010/main" xmlns:ma14="http://schemas.microsoft.com/office/mac/drawingml/2011/main" val="1"/>
             </a:ext>
           </a:extLst>
         </p:spPr>
@@ -17634,7 +17821,7 @@
           </a:ln>
           <a:extLst>
             <a:ext uri="{C572A759-6A51-4108-AA02-DFA0A04FC94B}">
-              <ma14:wrappingTextBoxFlag xmlns:ma14="http://schemas.microsoft.com/office/mac/drawingml/2011/main" xmlns:a14="http://schemas.microsoft.com/office/drawing/2010/main" xmlns:m="http://schemas.openxmlformats.org/officeDocument/2006/math" xmlns="" val="1"/>
+              <ma14:wrappingTextBoxFlag xmlns="" xmlns:m="http://schemas.openxmlformats.org/officeDocument/2006/math" xmlns:a14="http://schemas.microsoft.com/office/drawing/2010/main" xmlns:ma14="http://schemas.microsoft.com/office/mac/drawingml/2011/main" val="1"/>
             </a:ext>
           </a:extLst>
         </p:spPr>
@@ -17802,7 +17989,7 @@
           </a:ln>
           <a:extLst>
             <a:ext uri="{C572A759-6A51-4108-AA02-DFA0A04FC94B}">
-              <ma14:wrappingTextBoxFlag xmlns:ma14="http://schemas.microsoft.com/office/mac/drawingml/2011/main" xmlns:a14="http://schemas.microsoft.com/office/drawing/2010/main" xmlns:m="http://schemas.openxmlformats.org/officeDocument/2006/math" xmlns="" val="1"/>
+              <ma14:wrappingTextBoxFlag xmlns="" xmlns:m="http://schemas.openxmlformats.org/officeDocument/2006/math" xmlns:a14="http://schemas.microsoft.com/office/drawing/2010/main" xmlns:ma14="http://schemas.microsoft.com/office/mac/drawingml/2011/main" val="1"/>
             </a:ext>
           </a:extLst>
         </p:spPr>
@@ -17995,7 +18182,7 @@
           </a:ln>
           <a:extLst>
             <a:ext uri="{C572A759-6A51-4108-AA02-DFA0A04FC94B}">
-              <ma14:wrappingTextBoxFlag xmlns:ma14="http://schemas.microsoft.com/office/mac/drawingml/2011/main" xmlns:a14="http://schemas.microsoft.com/office/drawing/2010/main" xmlns:m="http://schemas.openxmlformats.org/officeDocument/2006/math" xmlns="" val="1"/>
+              <ma14:wrappingTextBoxFlag xmlns="" xmlns:m="http://schemas.openxmlformats.org/officeDocument/2006/math" xmlns:a14="http://schemas.microsoft.com/office/drawing/2010/main" xmlns:ma14="http://schemas.microsoft.com/office/mac/drawingml/2011/main" val="1"/>
             </a:ext>
           </a:extLst>
         </p:spPr>
@@ -18151,7 +18338,7 @@
           </a:ln>
           <a:extLst>
             <a:ext uri="{C572A759-6A51-4108-AA02-DFA0A04FC94B}">
-              <ma14:wrappingTextBoxFlag xmlns:ma14="http://schemas.microsoft.com/office/mac/drawingml/2011/main" xmlns:a14="http://schemas.microsoft.com/office/drawing/2010/main" xmlns:m="http://schemas.openxmlformats.org/officeDocument/2006/math" xmlns="" val="1"/>
+              <ma14:wrappingTextBoxFlag xmlns="" xmlns:m="http://schemas.openxmlformats.org/officeDocument/2006/math" xmlns:a14="http://schemas.microsoft.com/office/drawing/2010/main" xmlns:ma14="http://schemas.microsoft.com/office/mac/drawingml/2011/main" val="1"/>
             </a:ext>
           </a:extLst>
         </p:spPr>
@@ -18186,7 +18373,7 @@
           </a:ln>
           <a:extLst>
             <a:ext uri="{C572A759-6A51-4108-AA02-DFA0A04FC94B}">
-              <ma14:wrappingTextBoxFlag xmlns:ma14="http://schemas.microsoft.com/office/mac/drawingml/2011/main" xmlns:a14="http://schemas.microsoft.com/office/drawing/2010/main" xmlns:m="http://schemas.openxmlformats.org/officeDocument/2006/math" xmlns="" val="1"/>
+              <ma14:wrappingTextBoxFlag xmlns="" xmlns:m="http://schemas.openxmlformats.org/officeDocument/2006/math" xmlns:a14="http://schemas.microsoft.com/office/drawing/2010/main" xmlns:ma14="http://schemas.microsoft.com/office/mac/drawingml/2011/main" val="1"/>
             </a:ext>
           </a:extLst>
         </p:spPr>
@@ -18221,7 +18408,7 @@
           </a:ln>
           <a:extLst>
             <a:ext uri="{C572A759-6A51-4108-AA02-DFA0A04FC94B}">
-              <ma14:wrappingTextBoxFlag xmlns:ma14="http://schemas.microsoft.com/office/mac/drawingml/2011/main" xmlns:a14="http://schemas.microsoft.com/office/drawing/2010/main" xmlns:m="http://schemas.openxmlformats.org/officeDocument/2006/math" xmlns="" val="1"/>
+              <ma14:wrappingTextBoxFlag xmlns="" xmlns:m="http://schemas.openxmlformats.org/officeDocument/2006/math" xmlns:a14="http://schemas.microsoft.com/office/drawing/2010/main" xmlns:ma14="http://schemas.microsoft.com/office/mac/drawingml/2011/main" val="1"/>
             </a:ext>
           </a:extLst>
         </p:spPr>
@@ -18319,7 +18506,7 @@
           </a:ln>
           <a:extLst>
             <a:ext uri="{C572A759-6A51-4108-AA02-DFA0A04FC94B}">
-              <ma14:wrappingTextBoxFlag xmlns:ma14="http://schemas.microsoft.com/office/mac/drawingml/2011/main" xmlns:a14="http://schemas.microsoft.com/office/drawing/2010/main" xmlns:m="http://schemas.openxmlformats.org/officeDocument/2006/math" xmlns="" val="1"/>
+              <ma14:wrappingTextBoxFlag xmlns="" xmlns:m="http://schemas.openxmlformats.org/officeDocument/2006/math" xmlns:a14="http://schemas.microsoft.com/office/drawing/2010/main" xmlns:ma14="http://schemas.microsoft.com/office/mac/drawingml/2011/main" val="1"/>
             </a:ext>
           </a:extLst>
         </p:spPr>
@@ -18388,7 +18575,7 @@
           </a:ln>
           <a:extLst>
             <a:ext uri="{C572A759-6A51-4108-AA02-DFA0A04FC94B}">
-              <ma14:wrappingTextBoxFlag xmlns:ma14="http://schemas.microsoft.com/office/mac/drawingml/2011/main" xmlns:a14="http://schemas.microsoft.com/office/drawing/2010/main" xmlns:m="http://schemas.openxmlformats.org/officeDocument/2006/math" xmlns="" val="1"/>
+              <ma14:wrappingTextBoxFlag xmlns="" xmlns:m="http://schemas.openxmlformats.org/officeDocument/2006/math" xmlns:a14="http://schemas.microsoft.com/office/drawing/2010/main" xmlns:ma14="http://schemas.microsoft.com/office/mac/drawingml/2011/main" val="1"/>
             </a:ext>
           </a:extLst>
         </p:spPr>
@@ -18435,7 +18622,7 @@
           </a:ln>
           <a:extLst>
             <a:ext uri="{C572A759-6A51-4108-AA02-DFA0A04FC94B}">
-              <ma14:wrappingTextBoxFlag xmlns:ma14="http://schemas.microsoft.com/office/mac/drawingml/2011/main" xmlns:a14="http://schemas.microsoft.com/office/drawing/2010/main" xmlns:m="http://schemas.openxmlformats.org/officeDocument/2006/math" xmlns="" val="1"/>
+              <ma14:wrappingTextBoxFlag xmlns="" xmlns:m="http://schemas.openxmlformats.org/officeDocument/2006/math" xmlns:a14="http://schemas.microsoft.com/office/drawing/2010/main" xmlns:ma14="http://schemas.microsoft.com/office/mac/drawingml/2011/main" val="1"/>
             </a:ext>
           </a:extLst>
         </p:spPr>
@@ -18482,7 +18669,7 @@
           </a:ln>
           <a:extLst>
             <a:ext uri="{C572A759-6A51-4108-AA02-DFA0A04FC94B}">
-              <ma14:wrappingTextBoxFlag xmlns:ma14="http://schemas.microsoft.com/office/mac/drawingml/2011/main" xmlns:a14="http://schemas.microsoft.com/office/drawing/2010/main" xmlns:m="http://schemas.openxmlformats.org/officeDocument/2006/math" xmlns="" val="1"/>
+              <ma14:wrappingTextBoxFlag xmlns="" xmlns:m="http://schemas.openxmlformats.org/officeDocument/2006/math" xmlns:a14="http://schemas.microsoft.com/office/drawing/2010/main" xmlns:ma14="http://schemas.microsoft.com/office/mac/drawingml/2011/main" val="1"/>
             </a:ext>
           </a:extLst>
         </p:spPr>
@@ -18624,7 +18811,7 @@
           </a:ln>
           <a:extLst>
             <a:ext uri="{C572A759-6A51-4108-AA02-DFA0A04FC94B}">
-              <ma14:wrappingTextBoxFlag xmlns:ma14="http://schemas.microsoft.com/office/mac/drawingml/2011/main" xmlns:a14="http://schemas.microsoft.com/office/drawing/2010/main" xmlns:m="http://schemas.openxmlformats.org/officeDocument/2006/math" xmlns="" val="1"/>
+              <ma14:wrappingTextBoxFlag xmlns="" xmlns:m="http://schemas.openxmlformats.org/officeDocument/2006/math" xmlns:a14="http://schemas.microsoft.com/office/drawing/2010/main" xmlns:ma14="http://schemas.microsoft.com/office/mac/drawingml/2011/main" val="1"/>
             </a:ext>
           </a:extLst>
         </p:spPr>
@@ -18659,7 +18846,7 @@
           </a:ln>
           <a:extLst>
             <a:ext uri="{C572A759-6A51-4108-AA02-DFA0A04FC94B}">
-              <ma14:wrappingTextBoxFlag xmlns:ma14="http://schemas.microsoft.com/office/mac/drawingml/2011/main" xmlns:a14="http://schemas.microsoft.com/office/drawing/2010/main" xmlns:m="http://schemas.openxmlformats.org/officeDocument/2006/math" xmlns="" val="1"/>
+              <ma14:wrappingTextBoxFlag xmlns="" xmlns:m="http://schemas.openxmlformats.org/officeDocument/2006/math" xmlns:a14="http://schemas.microsoft.com/office/drawing/2010/main" xmlns:ma14="http://schemas.microsoft.com/office/mac/drawingml/2011/main" val="1"/>
             </a:ext>
           </a:extLst>
         </p:spPr>
@@ -18694,7 +18881,7 @@
           </a:ln>
           <a:extLst>
             <a:ext uri="{C572A759-6A51-4108-AA02-DFA0A04FC94B}">
-              <ma14:wrappingTextBoxFlag xmlns:ma14="http://schemas.microsoft.com/office/mac/drawingml/2011/main" xmlns:a14="http://schemas.microsoft.com/office/drawing/2010/main" xmlns:m="http://schemas.openxmlformats.org/officeDocument/2006/math" xmlns="" val="1"/>
+              <ma14:wrappingTextBoxFlag xmlns="" xmlns:m="http://schemas.openxmlformats.org/officeDocument/2006/math" xmlns:a14="http://schemas.microsoft.com/office/drawing/2010/main" xmlns:ma14="http://schemas.microsoft.com/office/mac/drawingml/2011/main" val="1"/>
             </a:ext>
           </a:extLst>
         </p:spPr>
@@ -18792,7 +18979,7 @@
           </a:ln>
           <a:extLst>
             <a:ext uri="{C572A759-6A51-4108-AA02-DFA0A04FC94B}">
-              <ma14:wrappingTextBoxFlag xmlns:ma14="http://schemas.microsoft.com/office/mac/drawingml/2011/main" xmlns:a14="http://schemas.microsoft.com/office/drawing/2010/main" xmlns:m="http://schemas.openxmlformats.org/officeDocument/2006/math" xmlns="" val="1"/>
+              <ma14:wrappingTextBoxFlag xmlns="" xmlns:m="http://schemas.openxmlformats.org/officeDocument/2006/math" xmlns:a14="http://schemas.microsoft.com/office/drawing/2010/main" xmlns:ma14="http://schemas.microsoft.com/office/mac/drawingml/2011/main" val="1"/>
             </a:ext>
           </a:extLst>
         </p:spPr>
@@ -18861,7 +19048,7 @@
           </a:ln>
           <a:extLst>
             <a:ext uri="{C572A759-6A51-4108-AA02-DFA0A04FC94B}">
-              <ma14:wrappingTextBoxFlag xmlns:ma14="http://schemas.microsoft.com/office/mac/drawingml/2011/main" xmlns:a14="http://schemas.microsoft.com/office/drawing/2010/main" xmlns:m="http://schemas.openxmlformats.org/officeDocument/2006/math" xmlns="" val="1"/>
+              <ma14:wrappingTextBoxFlag xmlns="" xmlns:m="http://schemas.openxmlformats.org/officeDocument/2006/math" xmlns:a14="http://schemas.microsoft.com/office/drawing/2010/main" xmlns:ma14="http://schemas.microsoft.com/office/mac/drawingml/2011/main" val="1"/>
             </a:ext>
           </a:extLst>
         </p:spPr>
@@ -18908,7 +19095,7 @@
           </a:ln>
           <a:extLst>
             <a:ext uri="{C572A759-6A51-4108-AA02-DFA0A04FC94B}">
-              <ma14:wrappingTextBoxFlag xmlns:ma14="http://schemas.microsoft.com/office/mac/drawingml/2011/main" xmlns:a14="http://schemas.microsoft.com/office/drawing/2010/main" xmlns:m="http://schemas.openxmlformats.org/officeDocument/2006/math" xmlns="" val="1"/>
+              <ma14:wrappingTextBoxFlag xmlns="" xmlns:m="http://schemas.openxmlformats.org/officeDocument/2006/math" xmlns:a14="http://schemas.microsoft.com/office/drawing/2010/main" xmlns:ma14="http://schemas.microsoft.com/office/mac/drawingml/2011/main" val="1"/>
             </a:ext>
           </a:extLst>
         </p:spPr>
@@ -18955,7 +19142,7 @@
           </a:ln>
           <a:extLst>
             <a:ext uri="{C572A759-6A51-4108-AA02-DFA0A04FC94B}">
-              <ma14:wrappingTextBoxFlag xmlns:ma14="http://schemas.microsoft.com/office/mac/drawingml/2011/main" xmlns:a14="http://schemas.microsoft.com/office/drawing/2010/main" xmlns:m="http://schemas.openxmlformats.org/officeDocument/2006/math" xmlns="" val="1"/>
+              <ma14:wrappingTextBoxFlag xmlns="" xmlns:m="http://schemas.openxmlformats.org/officeDocument/2006/math" xmlns:a14="http://schemas.microsoft.com/office/drawing/2010/main" xmlns:ma14="http://schemas.microsoft.com/office/mac/drawingml/2011/main" val="1"/>
             </a:ext>
           </a:extLst>
         </p:spPr>
@@ -19141,7 +19328,7 @@
           </a:ln>
           <a:extLst>
             <a:ext uri="{C572A759-6A51-4108-AA02-DFA0A04FC94B}">
-              <ma14:wrappingTextBoxFlag xmlns:ma14="http://schemas.microsoft.com/office/mac/drawingml/2011/main" xmlns:a14="http://schemas.microsoft.com/office/drawing/2010/main" xmlns:m="http://schemas.openxmlformats.org/officeDocument/2006/math" xmlns="" val="1"/>
+              <ma14:wrappingTextBoxFlag xmlns="" xmlns:m="http://schemas.openxmlformats.org/officeDocument/2006/math" xmlns:a14="http://schemas.microsoft.com/office/drawing/2010/main" xmlns:ma14="http://schemas.microsoft.com/office/mac/drawingml/2011/main" val="1"/>
             </a:ext>
           </a:extLst>
         </p:spPr>
@@ -19188,7 +19375,7 @@
           </a:ln>
           <a:extLst>
             <a:ext uri="{C572A759-6A51-4108-AA02-DFA0A04FC94B}">
-              <ma14:wrappingTextBoxFlag xmlns:ma14="http://schemas.microsoft.com/office/mac/drawingml/2011/main" xmlns:a14="http://schemas.microsoft.com/office/drawing/2010/main" xmlns:m="http://schemas.openxmlformats.org/officeDocument/2006/math" xmlns="" val="1"/>
+              <ma14:wrappingTextBoxFlag xmlns="" xmlns:m="http://schemas.openxmlformats.org/officeDocument/2006/math" xmlns:a14="http://schemas.microsoft.com/office/drawing/2010/main" xmlns:ma14="http://schemas.microsoft.com/office/mac/drawingml/2011/main" val="1"/>
             </a:ext>
           </a:extLst>
         </p:spPr>
@@ -19377,7 +19564,7 @@
           </a:ln>
           <a:extLst>
             <a:ext uri="{C572A759-6A51-4108-AA02-DFA0A04FC94B}">
-              <ma14:wrappingTextBoxFlag xmlns:ma14="http://schemas.microsoft.com/office/mac/drawingml/2011/main" xmlns:a14="http://schemas.microsoft.com/office/drawing/2010/main" xmlns:m="http://schemas.openxmlformats.org/officeDocument/2006/math" xmlns="" val="1"/>
+              <ma14:wrappingTextBoxFlag xmlns="" xmlns:m="http://schemas.openxmlformats.org/officeDocument/2006/math" xmlns:a14="http://schemas.microsoft.com/office/drawing/2010/main" xmlns:ma14="http://schemas.microsoft.com/office/mac/drawingml/2011/main" val="1"/>
             </a:ext>
           </a:extLst>
         </p:spPr>
@@ -19412,7 +19599,7 @@
           </a:ln>
           <a:extLst>
             <a:ext uri="{C572A759-6A51-4108-AA02-DFA0A04FC94B}">
-              <ma14:wrappingTextBoxFlag xmlns:ma14="http://schemas.microsoft.com/office/mac/drawingml/2011/main" xmlns:a14="http://schemas.microsoft.com/office/drawing/2010/main" xmlns:m="http://schemas.openxmlformats.org/officeDocument/2006/math" xmlns="" val="1"/>
+              <ma14:wrappingTextBoxFlag xmlns="" xmlns:m="http://schemas.openxmlformats.org/officeDocument/2006/math" xmlns:a14="http://schemas.microsoft.com/office/drawing/2010/main" xmlns:ma14="http://schemas.microsoft.com/office/mac/drawingml/2011/main" val="1"/>
             </a:ext>
           </a:extLst>
         </p:spPr>
@@ -19447,7 +19634,7 @@
           </a:ln>
           <a:extLst>
             <a:ext uri="{C572A759-6A51-4108-AA02-DFA0A04FC94B}">
-              <ma14:wrappingTextBoxFlag xmlns:ma14="http://schemas.microsoft.com/office/mac/drawingml/2011/main" xmlns:a14="http://schemas.microsoft.com/office/drawing/2010/main" xmlns:m="http://schemas.openxmlformats.org/officeDocument/2006/math" xmlns="" val="1"/>
+              <ma14:wrappingTextBoxFlag xmlns="" xmlns:m="http://schemas.openxmlformats.org/officeDocument/2006/math" xmlns:a14="http://schemas.microsoft.com/office/drawing/2010/main" xmlns:ma14="http://schemas.microsoft.com/office/mac/drawingml/2011/main" val="1"/>
             </a:ext>
           </a:extLst>
         </p:spPr>
@@ -19545,7 +19732,7 @@
           </a:ln>
           <a:extLst>
             <a:ext uri="{C572A759-6A51-4108-AA02-DFA0A04FC94B}">
-              <ma14:wrappingTextBoxFlag xmlns:ma14="http://schemas.microsoft.com/office/mac/drawingml/2011/main" xmlns:a14="http://schemas.microsoft.com/office/drawing/2010/main" xmlns:m="http://schemas.openxmlformats.org/officeDocument/2006/math" xmlns="" val="1"/>
+              <ma14:wrappingTextBoxFlag xmlns="" xmlns:m="http://schemas.openxmlformats.org/officeDocument/2006/math" xmlns:a14="http://schemas.microsoft.com/office/drawing/2010/main" xmlns:ma14="http://schemas.microsoft.com/office/mac/drawingml/2011/main" val="1"/>
             </a:ext>
           </a:extLst>
         </p:spPr>
@@ -19614,7 +19801,7 @@
           </a:ln>
           <a:extLst>
             <a:ext uri="{C572A759-6A51-4108-AA02-DFA0A04FC94B}">
-              <ma14:wrappingTextBoxFlag xmlns:ma14="http://schemas.microsoft.com/office/mac/drawingml/2011/main" xmlns:a14="http://schemas.microsoft.com/office/drawing/2010/main" xmlns:m="http://schemas.openxmlformats.org/officeDocument/2006/math" xmlns="" val="1"/>
+              <ma14:wrappingTextBoxFlag xmlns="" xmlns:m="http://schemas.openxmlformats.org/officeDocument/2006/math" xmlns:a14="http://schemas.microsoft.com/office/drawing/2010/main" xmlns:ma14="http://schemas.microsoft.com/office/mac/drawingml/2011/main" val="1"/>
             </a:ext>
           </a:extLst>
         </p:spPr>
@@ -19661,7 +19848,7 @@
           </a:ln>
           <a:extLst>
             <a:ext uri="{C572A759-6A51-4108-AA02-DFA0A04FC94B}">
-              <ma14:wrappingTextBoxFlag xmlns:ma14="http://schemas.microsoft.com/office/mac/drawingml/2011/main" xmlns:a14="http://schemas.microsoft.com/office/drawing/2010/main" xmlns:m="http://schemas.openxmlformats.org/officeDocument/2006/math" xmlns="" val="1"/>
+              <ma14:wrappingTextBoxFlag xmlns="" xmlns:m="http://schemas.openxmlformats.org/officeDocument/2006/math" xmlns:a14="http://schemas.microsoft.com/office/drawing/2010/main" xmlns:ma14="http://schemas.microsoft.com/office/mac/drawingml/2011/main" val="1"/>
             </a:ext>
           </a:extLst>
         </p:spPr>
@@ -19708,7 +19895,7 @@
           </a:ln>
           <a:extLst>
             <a:ext uri="{C572A759-6A51-4108-AA02-DFA0A04FC94B}">
-              <ma14:wrappingTextBoxFlag xmlns:ma14="http://schemas.microsoft.com/office/mac/drawingml/2011/main" xmlns:a14="http://schemas.microsoft.com/office/drawing/2010/main" xmlns:m="http://schemas.openxmlformats.org/officeDocument/2006/math" xmlns="" val="1"/>
+              <ma14:wrappingTextBoxFlag xmlns="" xmlns:m="http://schemas.openxmlformats.org/officeDocument/2006/math" xmlns:a14="http://schemas.microsoft.com/office/drawing/2010/main" xmlns:ma14="http://schemas.microsoft.com/office/mac/drawingml/2011/main" val="1"/>
             </a:ext>
           </a:extLst>
         </p:spPr>
@@ -19897,7 +20084,7 @@
           </a:ln>
           <a:extLst>
             <a:ext uri="{C572A759-6A51-4108-AA02-DFA0A04FC94B}">
-              <ma14:wrappingTextBoxFlag xmlns:ma14="http://schemas.microsoft.com/office/mac/drawingml/2011/main" xmlns:a14="http://schemas.microsoft.com/office/drawing/2010/main" xmlns:m="http://schemas.openxmlformats.org/officeDocument/2006/math" xmlns="" val="1"/>
+              <ma14:wrappingTextBoxFlag xmlns="" xmlns:m="http://schemas.openxmlformats.org/officeDocument/2006/math" xmlns:a14="http://schemas.microsoft.com/office/drawing/2010/main" xmlns:ma14="http://schemas.microsoft.com/office/mac/drawingml/2011/main" val="1"/>
             </a:ext>
           </a:extLst>
         </p:spPr>
@@ -20022,7 +20209,7 @@
           </a:ln>
           <a:extLst>
             <a:ext uri="{C572A759-6A51-4108-AA02-DFA0A04FC94B}">
-              <ma14:wrappingTextBoxFlag xmlns:ma14="http://schemas.microsoft.com/office/mac/drawingml/2011/main" xmlns:a14="http://schemas.microsoft.com/office/drawing/2010/main" xmlns:m="http://schemas.openxmlformats.org/officeDocument/2006/math" xmlns="" val="1"/>
+              <ma14:wrappingTextBoxFlag xmlns="" xmlns:m="http://schemas.openxmlformats.org/officeDocument/2006/math" xmlns:a14="http://schemas.microsoft.com/office/drawing/2010/main" xmlns:ma14="http://schemas.microsoft.com/office/mac/drawingml/2011/main" val="1"/>
             </a:ext>
           </a:extLst>
         </p:spPr>
@@ -20069,7 +20256,7 @@
           </a:ln>
           <a:extLst>
             <a:ext uri="{C572A759-6A51-4108-AA02-DFA0A04FC94B}">
-              <ma14:wrappingTextBoxFlag xmlns:ma14="http://schemas.microsoft.com/office/mac/drawingml/2011/main" xmlns:a14="http://schemas.microsoft.com/office/drawing/2010/main" xmlns:m="http://schemas.openxmlformats.org/officeDocument/2006/math" xmlns="" val="1"/>
+              <ma14:wrappingTextBoxFlag xmlns="" xmlns:m="http://schemas.openxmlformats.org/officeDocument/2006/math" xmlns:a14="http://schemas.microsoft.com/office/drawing/2010/main" xmlns:ma14="http://schemas.microsoft.com/office/mac/drawingml/2011/main" val="1"/>
             </a:ext>
           </a:extLst>
         </p:spPr>
@@ -20347,7 +20534,7 @@
           </a:ln>
           <a:extLst>
             <a:ext uri="{C572A759-6A51-4108-AA02-DFA0A04FC94B}">
-              <ma14:wrappingTextBoxFlag xmlns:ma14="http://schemas.microsoft.com/office/mac/drawingml/2011/main" xmlns:a14="http://schemas.microsoft.com/office/drawing/2010/main" xmlns:m="http://schemas.openxmlformats.org/officeDocument/2006/math" xmlns="" val="1"/>
+              <ma14:wrappingTextBoxFlag xmlns="" xmlns:m="http://schemas.openxmlformats.org/officeDocument/2006/math" xmlns:a14="http://schemas.microsoft.com/office/drawing/2010/main" xmlns:ma14="http://schemas.microsoft.com/office/mac/drawingml/2011/main" val="1"/>
             </a:ext>
           </a:extLst>
         </p:spPr>
@@ -20382,7 +20569,7 @@
           </a:ln>
           <a:extLst>
             <a:ext uri="{C572A759-6A51-4108-AA02-DFA0A04FC94B}">
-              <ma14:wrappingTextBoxFlag xmlns:ma14="http://schemas.microsoft.com/office/mac/drawingml/2011/main" xmlns:a14="http://schemas.microsoft.com/office/drawing/2010/main" xmlns:m="http://schemas.openxmlformats.org/officeDocument/2006/math" xmlns="" val="1"/>
+              <ma14:wrappingTextBoxFlag xmlns="" xmlns:m="http://schemas.openxmlformats.org/officeDocument/2006/math" xmlns:a14="http://schemas.microsoft.com/office/drawing/2010/main" xmlns:ma14="http://schemas.microsoft.com/office/mac/drawingml/2011/main" val="1"/>
             </a:ext>
           </a:extLst>
         </p:spPr>
@@ -20417,7 +20604,7 @@
           </a:ln>
           <a:extLst>
             <a:ext uri="{C572A759-6A51-4108-AA02-DFA0A04FC94B}">
-              <ma14:wrappingTextBoxFlag xmlns:ma14="http://schemas.microsoft.com/office/mac/drawingml/2011/main" xmlns:a14="http://schemas.microsoft.com/office/drawing/2010/main" xmlns:m="http://schemas.openxmlformats.org/officeDocument/2006/math" xmlns="" val="1"/>
+              <ma14:wrappingTextBoxFlag xmlns="" xmlns:m="http://schemas.openxmlformats.org/officeDocument/2006/math" xmlns:a14="http://schemas.microsoft.com/office/drawing/2010/main" xmlns:ma14="http://schemas.microsoft.com/office/mac/drawingml/2011/main" val="1"/>
             </a:ext>
           </a:extLst>
         </p:spPr>
@@ -20515,7 +20702,7 @@
           </a:ln>
           <a:extLst>
             <a:ext uri="{C572A759-6A51-4108-AA02-DFA0A04FC94B}">
-              <ma14:wrappingTextBoxFlag xmlns:ma14="http://schemas.microsoft.com/office/mac/drawingml/2011/main" xmlns:a14="http://schemas.microsoft.com/office/drawing/2010/main" xmlns:m="http://schemas.openxmlformats.org/officeDocument/2006/math" xmlns="" val="1"/>
+              <ma14:wrappingTextBoxFlag xmlns="" xmlns:m="http://schemas.openxmlformats.org/officeDocument/2006/math" xmlns:a14="http://schemas.microsoft.com/office/drawing/2010/main" xmlns:ma14="http://schemas.microsoft.com/office/mac/drawingml/2011/main" val="1"/>
             </a:ext>
           </a:extLst>
         </p:spPr>
@@ -20584,7 +20771,7 @@
           </a:ln>
           <a:extLst>
             <a:ext uri="{C572A759-6A51-4108-AA02-DFA0A04FC94B}">
-              <ma14:wrappingTextBoxFlag xmlns:ma14="http://schemas.microsoft.com/office/mac/drawingml/2011/main" xmlns:a14="http://schemas.microsoft.com/office/drawing/2010/main" xmlns:m="http://schemas.openxmlformats.org/officeDocument/2006/math" xmlns="" val="1"/>
+              <ma14:wrappingTextBoxFlag xmlns="" xmlns:m="http://schemas.openxmlformats.org/officeDocument/2006/math" xmlns:a14="http://schemas.microsoft.com/office/drawing/2010/main" xmlns:ma14="http://schemas.microsoft.com/office/mac/drawingml/2011/main" val="1"/>
             </a:ext>
           </a:extLst>
         </p:spPr>
@@ -20631,7 +20818,7 @@
           </a:ln>
           <a:extLst>
             <a:ext uri="{C572A759-6A51-4108-AA02-DFA0A04FC94B}">
-              <ma14:wrappingTextBoxFlag xmlns:ma14="http://schemas.microsoft.com/office/mac/drawingml/2011/main" xmlns:a14="http://schemas.microsoft.com/office/drawing/2010/main" xmlns:m="http://schemas.openxmlformats.org/officeDocument/2006/math" xmlns="" val="1"/>
+              <ma14:wrappingTextBoxFlag xmlns="" xmlns:m="http://schemas.openxmlformats.org/officeDocument/2006/math" xmlns:a14="http://schemas.microsoft.com/office/drawing/2010/main" xmlns:ma14="http://schemas.microsoft.com/office/mac/drawingml/2011/main" val="1"/>
             </a:ext>
           </a:extLst>
         </p:spPr>
@@ -20678,7 +20865,7 @@
           </a:ln>
           <a:extLst>
             <a:ext uri="{C572A759-6A51-4108-AA02-DFA0A04FC94B}">
-              <ma14:wrappingTextBoxFlag xmlns:ma14="http://schemas.microsoft.com/office/mac/drawingml/2011/main" xmlns:a14="http://schemas.microsoft.com/office/drawing/2010/main" xmlns:m="http://schemas.openxmlformats.org/officeDocument/2006/math" xmlns="" val="1"/>
+              <ma14:wrappingTextBoxFlag xmlns="" xmlns:m="http://schemas.openxmlformats.org/officeDocument/2006/math" xmlns:a14="http://schemas.microsoft.com/office/drawing/2010/main" xmlns:ma14="http://schemas.microsoft.com/office/mac/drawingml/2011/main" val="1"/>
             </a:ext>
           </a:extLst>
         </p:spPr>
@@ -20864,7 +21051,7 @@
           </a:ln>
           <a:extLst>
             <a:ext uri="{C572A759-6A51-4108-AA02-DFA0A04FC94B}">
-              <ma14:wrappingTextBoxFlag xmlns:ma14="http://schemas.microsoft.com/office/mac/drawingml/2011/main" xmlns:a14="http://schemas.microsoft.com/office/drawing/2010/main" xmlns:m="http://schemas.openxmlformats.org/officeDocument/2006/math" xmlns="" val="1"/>
+              <ma14:wrappingTextBoxFlag xmlns="" xmlns:m="http://schemas.openxmlformats.org/officeDocument/2006/math" xmlns:a14="http://schemas.microsoft.com/office/drawing/2010/main" xmlns:ma14="http://schemas.microsoft.com/office/mac/drawingml/2011/main" val="1"/>
             </a:ext>
           </a:extLst>
         </p:spPr>
@@ -20956,7 +21143,7 @@
           </a:ln>
           <a:extLst>
             <a:ext uri="{C572A759-6A51-4108-AA02-DFA0A04FC94B}">
-              <ma14:wrappingTextBoxFlag xmlns:ma14="http://schemas.microsoft.com/office/mac/drawingml/2011/main" xmlns:a14="http://schemas.microsoft.com/office/drawing/2010/main" xmlns:m="http://schemas.openxmlformats.org/officeDocument/2006/math" xmlns="" val="1"/>
+              <ma14:wrappingTextBoxFlag xmlns="" xmlns:m="http://schemas.openxmlformats.org/officeDocument/2006/math" xmlns:a14="http://schemas.microsoft.com/office/drawing/2010/main" xmlns:ma14="http://schemas.microsoft.com/office/mac/drawingml/2011/main" val="1"/>
             </a:ext>
           </a:extLst>
         </p:spPr>
@@ -21081,7 +21268,7 @@
           </a:ln>
           <a:extLst>
             <a:ext uri="{C572A759-6A51-4108-AA02-DFA0A04FC94B}">
-              <ma14:wrappingTextBoxFlag xmlns:ma14="http://schemas.microsoft.com/office/mac/drawingml/2011/main" xmlns:a14="http://schemas.microsoft.com/office/drawing/2010/main" xmlns:m="http://schemas.openxmlformats.org/officeDocument/2006/math" xmlns="" val="1"/>
+              <ma14:wrappingTextBoxFlag xmlns="" xmlns:m="http://schemas.openxmlformats.org/officeDocument/2006/math" xmlns:a14="http://schemas.microsoft.com/office/drawing/2010/main" xmlns:ma14="http://schemas.microsoft.com/office/mac/drawingml/2011/main" val="1"/>
             </a:ext>
           </a:extLst>
         </p:spPr>
@@ -21191,7 +21378,7 @@
           </a:ln>
           <a:extLst>
             <a:ext uri="{C572A759-6A51-4108-AA02-DFA0A04FC94B}">
-              <ma14:wrappingTextBoxFlag xmlns:ma14="http://schemas.microsoft.com/office/mac/drawingml/2011/main" xmlns:a14="http://schemas.microsoft.com/office/drawing/2010/main" xmlns:m="http://schemas.openxmlformats.org/officeDocument/2006/math" xmlns="" val="1"/>
+              <ma14:wrappingTextBoxFlag xmlns="" xmlns:m="http://schemas.openxmlformats.org/officeDocument/2006/math" xmlns:a14="http://schemas.microsoft.com/office/drawing/2010/main" xmlns:ma14="http://schemas.microsoft.com/office/mac/drawingml/2011/main" val="1"/>
             </a:ext>
           </a:extLst>
         </p:spPr>
@@ -21414,7 +21601,7 @@
           </a:ln>
           <a:extLst>
             <a:ext uri="{C572A759-6A51-4108-AA02-DFA0A04FC94B}">
-              <ma14:wrappingTextBoxFlag xmlns:ma14="http://schemas.microsoft.com/office/mac/drawingml/2011/main" xmlns:a14="http://schemas.microsoft.com/office/drawing/2010/main" xmlns:m="http://schemas.openxmlformats.org/officeDocument/2006/math" xmlns="" val="1"/>
+              <ma14:wrappingTextBoxFlag xmlns="" xmlns:m="http://schemas.openxmlformats.org/officeDocument/2006/math" xmlns:a14="http://schemas.microsoft.com/office/drawing/2010/main" xmlns:ma14="http://schemas.microsoft.com/office/mac/drawingml/2011/main" val="1"/>
             </a:ext>
           </a:extLst>
         </p:spPr>
@@ -21449,7 +21636,7 @@
           </a:ln>
           <a:extLst>
             <a:ext uri="{C572A759-6A51-4108-AA02-DFA0A04FC94B}">
-              <ma14:wrappingTextBoxFlag xmlns:ma14="http://schemas.microsoft.com/office/mac/drawingml/2011/main" xmlns:a14="http://schemas.microsoft.com/office/drawing/2010/main" xmlns:m="http://schemas.openxmlformats.org/officeDocument/2006/math" xmlns="" val="1"/>
+              <ma14:wrappingTextBoxFlag xmlns="" xmlns:m="http://schemas.openxmlformats.org/officeDocument/2006/math" xmlns:a14="http://schemas.microsoft.com/office/drawing/2010/main" xmlns:ma14="http://schemas.microsoft.com/office/mac/drawingml/2011/main" val="1"/>
             </a:ext>
           </a:extLst>
         </p:spPr>
@@ -21484,7 +21671,7 @@
           </a:ln>
           <a:extLst>
             <a:ext uri="{C572A759-6A51-4108-AA02-DFA0A04FC94B}">
-              <ma14:wrappingTextBoxFlag xmlns:ma14="http://schemas.microsoft.com/office/mac/drawingml/2011/main" xmlns:a14="http://schemas.microsoft.com/office/drawing/2010/main" xmlns:m="http://schemas.openxmlformats.org/officeDocument/2006/math" xmlns="" val="1"/>
+              <ma14:wrappingTextBoxFlag xmlns="" xmlns:m="http://schemas.openxmlformats.org/officeDocument/2006/math" xmlns:a14="http://schemas.microsoft.com/office/drawing/2010/main" xmlns:ma14="http://schemas.microsoft.com/office/mac/drawingml/2011/main" val="1"/>
             </a:ext>
           </a:extLst>
         </p:spPr>
@@ -21582,7 +21769,7 @@
           </a:ln>
           <a:extLst>
             <a:ext uri="{C572A759-6A51-4108-AA02-DFA0A04FC94B}">
-              <ma14:wrappingTextBoxFlag xmlns:ma14="http://schemas.microsoft.com/office/mac/drawingml/2011/main" xmlns:a14="http://schemas.microsoft.com/office/drawing/2010/main" xmlns:m="http://schemas.openxmlformats.org/officeDocument/2006/math" xmlns="" val="1"/>
+              <ma14:wrappingTextBoxFlag xmlns="" xmlns:m="http://schemas.openxmlformats.org/officeDocument/2006/math" xmlns:a14="http://schemas.microsoft.com/office/drawing/2010/main" xmlns:ma14="http://schemas.microsoft.com/office/mac/drawingml/2011/main" val="1"/>
             </a:ext>
           </a:extLst>
         </p:spPr>
@@ -21651,7 +21838,7 @@
           </a:ln>
           <a:extLst>
             <a:ext uri="{C572A759-6A51-4108-AA02-DFA0A04FC94B}">
-              <ma14:wrappingTextBoxFlag xmlns:ma14="http://schemas.microsoft.com/office/mac/drawingml/2011/main" xmlns:a14="http://schemas.microsoft.com/office/drawing/2010/main" xmlns:m="http://schemas.openxmlformats.org/officeDocument/2006/math" xmlns="" val="1"/>
+              <ma14:wrappingTextBoxFlag xmlns="" xmlns:m="http://schemas.openxmlformats.org/officeDocument/2006/math" xmlns:a14="http://schemas.microsoft.com/office/drawing/2010/main" xmlns:ma14="http://schemas.microsoft.com/office/mac/drawingml/2011/main" val="1"/>
             </a:ext>
           </a:extLst>
         </p:spPr>
@@ -21698,7 +21885,7 @@
           </a:ln>
           <a:extLst>
             <a:ext uri="{C572A759-6A51-4108-AA02-DFA0A04FC94B}">
-              <ma14:wrappingTextBoxFlag xmlns:ma14="http://schemas.microsoft.com/office/mac/drawingml/2011/main" xmlns:a14="http://schemas.microsoft.com/office/drawing/2010/main" xmlns:m="http://schemas.openxmlformats.org/officeDocument/2006/math" xmlns="" val="1"/>
+              <ma14:wrappingTextBoxFlag xmlns="" xmlns:m="http://schemas.openxmlformats.org/officeDocument/2006/math" xmlns:a14="http://schemas.microsoft.com/office/drawing/2010/main" xmlns:ma14="http://schemas.microsoft.com/office/mac/drawingml/2011/main" val="1"/>
             </a:ext>
           </a:extLst>
         </p:spPr>
@@ -21745,7 +21932,7 @@
           </a:ln>
           <a:extLst>
             <a:ext uri="{C572A759-6A51-4108-AA02-DFA0A04FC94B}">
-              <ma14:wrappingTextBoxFlag xmlns:ma14="http://schemas.microsoft.com/office/mac/drawingml/2011/main" xmlns:a14="http://schemas.microsoft.com/office/drawing/2010/main" xmlns:m="http://schemas.openxmlformats.org/officeDocument/2006/math" xmlns="" val="1"/>
+              <ma14:wrappingTextBoxFlag xmlns="" xmlns:m="http://schemas.openxmlformats.org/officeDocument/2006/math" xmlns:a14="http://schemas.microsoft.com/office/drawing/2010/main" xmlns:ma14="http://schemas.microsoft.com/office/mac/drawingml/2011/main" val="1"/>
             </a:ext>
           </a:extLst>
         </p:spPr>
@@ -21931,7 +22118,7 @@
           </a:ln>
           <a:extLst>
             <a:ext uri="{C572A759-6A51-4108-AA02-DFA0A04FC94B}">
-              <ma14:wrappingTextBoxFlag xmlns:ma14="http://schemas.microsoft.com/office/mac/drawingml/2011/main" xmlns:a14="http://schemas.microsoft.com/office/drawing/2010/main" xmlns:m="http://schemas.openxmlformats.org/officeDocument/2006/math" xmlns="" val="1"/>
+              <ma14:wrappingTextBoxFlag xmlns="" xmlns:m="http://schemas.openxmlformats.org/officeDocument/2006/math" xmlns:a14="http://schemas.microsoft.com/office/drawing/2010/main" xmlns:ma14="http://schemas.microsoft.com/office/mac/drawingml/2011/main" val="1"/>
             </a:ext>
           </a:extLst>
         </p:spPr>
@@ -22023,7 +22210,7 @@
           </a:ln>
           <a:extLst>
             <a:ext uri="{C572A759-6A51-4108-AA02-DFA0A04FC94B}">
-              <ma14:wrappingTextBoxFlag xmlns:ma14="http://schemas.microsoft.com/office/mac/drawingml/2011/main" xmlns:a14="http://schemas.microsoft.com/office/drawing/2010/main" xmlns:m="http://schemas.openxmlformats.org/officeDocument/2006/math" xmlns="" val="1"/>
+              <ma14:wrappingTextBoxFlag xmlns="" xmlns:m="http://schemas.openxmlformats.org/officeDocument/2006/math" xmlns:a14="http://schemas.microsoft.com/office/drawing/2010/main" xmlns:ma14="http://schemas.microsoft.com/office/mac/drawingml/2011/main" val="1"/>
             </a:ext>
           </a:extLst>
         </p:spPr>
@@ -22148,7 +22335,7 @@
           </a:ln>
           <a:extLst>
             <a:ext uri="{C572A759-6A51-4108-AA02-DFA0A04FC94B}">
-              <ma14:wrappingTextBoxFlag xmlns:ma14="http://schemas.microsoft.com/office/mac/drawingml/2011/main" xmlns:a14="http://schemas.microsoft.com/office/drawing/2010/main" xmlns:m="http://schemas.openxmlformats.org/officeDocument/2006/math" xmlns="" val="1"/>
+              <ma14:wrappingTextBoxFlag xmlns="" xmlns:m="http://schemas.openxmlformats.org/officeDocument/2006/math" xmlns:a14="http://schemas.microsoft.com/office/drawing/2010/main" xmlns:ma14="http://schemas.microsoft.com/office/mac/drawingml/2011/main" val="1"/>
             </a:ext>
           </a:extLst>
         </p:spPr>
@@ -22258,7 +22445,7 @@
           </a:ln>
           <a:extLst>
             <a:ext uri="{C572A759-6A51-4108-AA02-DFA0A04FC94B}">
-              <ma14:wrappingTextBoxFlag xmlns:ma14="http://schemas.microsoft.com/office/mac/drawingml/2011/main" xmlns:a14="http://schemas.microsoft.com/office/drawing/2010/main" xmlns:m="http://schemas.openxmlformats.org/officeDocument/2006/math" xmlns="" val="1"/>
+              <ma14:wrappingTextBoxFlag xmlns="" xmlns:m="http://schemas.openxmlformats.org/officeDocument/2006/math" xmlns:a14="http://schemas.microsoft.com/office/drawing/2010/main" xmlns:ma14="http://schemas.microsoft.com/office/mac/drawingml/2011/main" val="1"/>
             </a:ext>
           </a:extLst>
         </p:spPr>
@@ -22376,7 +22563,7 @@
           </a:ln>
           <a:extLst>
             <a:ext uri="{C572A759-6A51-4108-AA02-DFA0A04FC94B}">
-              <ma14:wrappingTextBoxFlag xmlns:ma14="http://schemas.microsoft.com/office/mac/drawingml/2011/main" xmlns:a14="http://schemas.microsoft.com/office/drawing/2010/main" xmlns:m="http://schemas.openxmlformats.org/officeDocument/2006/math" xmlns="" val="1"/>
+              <ma14:wrappingTextBoxFlag xmlns="" xmlns:m="http://schemas.openxmlformats.org/officeDocument/2006/math" xmlns:a14="http://schemas.microsoft.com/office/drawing/2010/main" xmlns:ma14="http://schemas.microsoft.com/office/mac/drawingml/2011/main" val="1"/>
             </a:ext>
           </a:extLst>
         </p:spPr>
@@ -22608,7 +22795,7 @@
           </a:ln>
           <a:extLst>
             <a:ext uri="{C572A759-6A51-4108-AA02-DFA0A04FC94B}">
-              <ma14:wrappingTextBoxFlag xmlns:ma14="http://schemas.microsoft.com/office/mac/drawingml/2011/main" xmlns:a14="http://schemas.microsoft.com/office/drawing/2010/main" xmlns:m="http://schemas.openxmlformats.org/officeDocument/2006/math" xmlns="" val="1"/>
+              <ma14:wrappingTextBoxFlag xmlns="" xmlns:m="http://schemas.openxmlformats.org/officeDocument/2006/math" xmlns:a14="http://schemas.microsoft.com/office/drawing/2010/main" xmlns:ma14="http://schemas.microsoft.com/office/mac/drawingml/2011/main" val="1"/>
             </a:ext>
           </a:extLst>
         </p:spPr>
@@ -22643,7 +22830,7 @@
           </a:ln>
           <a:extLst>
             <a:ext uri="{C572A759-6A51-4108-AA02-DFA0A04FC94B}">
-              <ma14:wrappingTextBoxFlag xmlns:ma14="http://schemas.microsoft.com/office/mac/drawingml/2011/main" xmlns:a14="http://schemas.microsoft.com/office/drawing/2010/main" xmlns:m="http://schemas.openxmlformats.org/officeDocument/2006/math" xmlns="" val="1"/>
+              <ma14:wrappingTextBoxFlag xmlns="" xmlns:m="http://schemas.openxmlformats.org/officeDocument/2006/math" xmlns:a14="http://schemas.microsoft.com/office/drawing/2010/main" xmlns:ma14="http://schemas.microsoft.com/office/mac/drawingml/2011/main" val="1"/>
             </a:ext>
           </a:extLst>
         </p:spPr>
@@ -22678,7 +22865,7 @@
           </a:ln>
           <a:extLst>
             <a:ext uri="{C572A759-6A51-4108-AA02-DFA0A04FC94B}">
-              <ma14:wrappingTextBoxFlag xmlns:ma14="http://schemas.microsoft.com/office/mac/drawingml/2011/main" xmlns:a14="http://schemas.microsoft.com/office/drawing/2010/main" xmlns:m="http://schemas.openxmlformats.org/officeDocument/2006/math" xmlns="" val="1"/>
+              <ma14:wrappingTextBoxFlag xmlns="" xmlns:m="http://schemas.openxmlformats.org/officeDocument/2006/math" xmlns:a14="http://schemas.microsoft.com/office/drawing/2010/main" xmlns:ma14="http://schemas.microsoft.com/office/mac/drawingml/2011/main" val="1"/>
             </a:ext>
           </a:extLst>
         </p:spPr>
@@ -22776,7 +22963,7 @@
           </a:ln>
           <a:extLst>
             <a:ext uri="{C572A759-6A51-4108-AA02-DFA0A04FC94B}">
-              <ma14:wrappingTextBoxFlag xmlns:ma14="http://schemas.microsoft.com/office/mac/drawingml/2011/main" xmlns:a14="http://schemas.microsoft.com/office/drawing/2010/main" xmlns:m="http://schemas.openxmlformats.org/officeDocument/2006/math" xmlns="" val="1"/>
+              <ma14:wrappingTextBoxFlag xmlns="" xmlns:m="http://schemas.openxmlformats.org/officeDocument/2006/math" xmlns:a14="http://schemas.microsoft.com/office/drawing/2010/main" xmlns:ma14="http://schemas.microsoft.com/office/mac/drawingml/2011/main" val="1"/>
             </a:ext>
           </a:extLst>
         </p:spPr>
@@ -22845,7 +23032,7 @@
           </a:ln>
           <a:extLst>
             <a:ext uri="{C572A759-6A51-4108-AA02-DFA0A04FC94B}">
-              <ma14:wrappingTextBoxFlag xmlns:ma14="http://schemas.microsoft.com/office/mac/drawingml/2011/main" xmlns:a14="http://schemas.microsoft.com/office/drawing/2010/main" xmlns:m="http://schemas.openxmlformats.org/officeDocument/2006/math" xmlns="" val="1"/>
+              <ma14:wrappingTextBoxFlag xmlns="" xmlns:m="http://schemas.openxmlformats.org/officeDocument/2006/math" xmlns:a14="http://schemas.microsoft.com/office/drawing/2010/main" xmlns:ma14="http://schemas.microsoft.com/office/mac/drawingml/2011/main" val="1"/>
             </a:ext>
           </a:extLst>
         </p:spPr>
@@ -22892,7 +23079,7 @@
           </a:ln>
           <a:extLst>
             <a:ext uri="{C572A759-6A51-4108-AA02-DFA0A04FC94B}">
-              <ma14:wrappingTextBoxFlag xmlns:ma14="http://schemas.microsoft.com/office/mac/drawingml/2011/main" xmlns:a14="http://schemas.microsoft.com/office/drawing/2010/main" xmlns:m="http://schemas.openxmlformats.org/officeDocument/2006/math" xmlns="" val="1"/>
+              <ma14:wrappingTextBoxFlag xmlns="" xmlns:m="http://schemas.openxmlformats.org/officeDocument/2006/math" xmlns:a14="http://schemas.microsoft.com/office/drawing/2010/main" xmlns:ma14="http://schemas.microsoft.com/office/mac/drawingml/2011/main" val="1"/>
             </a:ext>
           </a:extLst>
         </p:spPr>
@@ -22939,7 +23126,7 @@
           </a:ln>
           <a:extLst>
             <a:ext uri="{C572A759-6A51-4108-AA02-DFA0A04FC94B}">
-              <ma14:wrappingTextBoxFlag xmlns:ma14="http://schemas.microsoft.com/office/mac/drawingml/2011/main" xmlns:a14="http://schemas.microsoft.com/office/drawing/2010/main" xmlns:m="http://schemas.openxmlformats.org/officeDocument/2006/math" xmlns="" val="1"/>
+              <ma14:wrappingTextBoxFlag xmlns="" xmlns:m="http://schemas.openxmlformats.org/officeDocument/2006/math" xmlns:a14="http://schemas.microsoft.com/office/drawing/2010/main" xmlns:ma14="http://schemas.microsoft.com/office/mac/drawingml/2011/main" val="1"/>
             </a:ext>
           </a:extLst>
         </p:spPr>
@@ -23125,7 +23312,7 @@
           </a:ln>
           <a:extLst>
             <a:ext uri="{C572A759-6A51-4108-AA02-DFA0A04FC94B}">
-              <ma14:wrappingTextBoxFlag xmlns:ma14="http://schemas.microsoft.com/office/mac/drawingml/2011/main" xmlns:a14="http://schemas.microsoft.com/office/drawing/2010/main" xmlns:m="http://schemas.openxmlformats.org/officeDocument/2006/math" xmlns="" val="1"/>
+              <ma14:wrappingTextBoxFlag xmlns="" xmlns:m="http://schemas.openxmlformats.org/officeDocument/2006/math" xmlns:a14="http://schemas.microsoft.com/office/drawing/2010/main" xmlns:ma14="http://schemas.microsoft.com/office/mac/drawingml/2011/main" val="1"/>
             </a:ext>
           </a:extLst>
         </p:spPr>
@@ -23217,7 +23404,7 @@
           </a:ln>
           <a:extLst>
             <a:ext uri="{C572A759-6A51-4108-AA02-DFA0A04FC94B}">
-              <ma14:wrappingTextBoxFlag xmlns:ma14="http://schemas.microsoft.com/office/mac/drawingml/2011/main" xmlns:a14="http://schemas.microsoft.com/office/drawing/2010/main" xmlns:m="http://schemas.openxmlformats.org/officeDocument/2006/math" xmlns="" val="1"/>
+              <ma14:wrappingTextBoxFlag xmlns="" xmlns:m="http://schemas.openxmlformats.org/officeDocument/2006/math" xmlns:a14="http://schemas.microsoft.com/office/drawing/2010/main" xmlns:ma14="http://schemas.microsoft.com/office/mac/drawingml/2011/main" val="1"/>
             </a:ext>
           </a:extLst>
         </p:spPr>
@@ -23342,7 +23529,7 @@
           </a:ln>
           <a:extLst>
             <a:ext uri="{C572A759-6A51-4108-AA02-DFA0A04FC94B}">
-              <ma14:wrappingTextBoxFlag xmlns:ma14="http://schemas.microsoft.com/office/mac/drawingml/2011/main" xmlns:a14="http://schemas.microsoft.com/office/drawing/2010/main" xmlns:m="http://schemas.openxmlformats.org/officeDocument/2006/math" xmlns="" val="1"/>
+              <ma14:wrappingTextBoxFlag xmlns="" xmlns:m="http://schemas.openxmlformats.org/officeDocument/2006/math" xmlns:a14="http://schemas.microsoft.com/office/drawing/2010/main" xmlns:ma14="http://schemas.microsoft.com/office/mac/drawingml/2011/main" val="1"/>
             </a:ext>
           </a:extLst>
         </p:spPr>
@@ -23452,7 +23639,7 @@
           </a:ln>
           <a:extLst>
             <a:ext uri="{C572A759-6A51-4108-AA02-DFA0A04FC94B}">
-              <ma14:wrappingTextBoxFlag xmlns:ma14="http://schemas.microsoft.com/office/mac/drawingml/2011/main" xmlns:a14="http://schemas.microsoft.com/office/drawing/2010/main" xmlns:m="http://schemas.openxmlformats.org/officeDocument/2006/math" xmlns="" val="1"/>
+              <ma14:wrappingTextBoxFlag xmlns="" xmlns:m="http://schemas.openxmlformats.org/officeDocument/2006/math" xmlns:a14="http://schemas.microsoft.com/office/drawing/2010/main" xmlns:ma14="http://schemas.microsoft.com/office/mac/drawingml/2011/main" val="1"/>
             </a:ext>
           </a:extLst>
         </p:spPr>
@@ -23570,7 +23757,7 @@
           </a:ln>
           <a:extLst>
             <a:ext uri="{C572A759-6A51-4108-AA02-DFA0A04FC94B}">
-              <ma14:wrappingTextBoxFlag xmlns:ma14="http://schemas.microsoft.com/office/mac/drawingml/2011/main" xmlns:a14="http://schemas.microsoft.com/office/drawing/2010/main" xmlns:m="http://schemas.openxmlformats.org/officeDocument/2006/math" xmlns="" val="1"/>
+              <ma14:wrappingTextBoxFlag xmlns="" xmlns:m="http://schemas.openxmlformats.org/officeDocument/2006/math" xmlns:a14="http://schemas.microsoft.com/office/drawing/2010/main" xmlns:ma14="http://schemas.microsoft.com/office/mac/drawingml/2011/main" val="1"/>
             </a:ext>
           </a:extLst>
         </p:spPr>

</xml_diff>

<commit_message>
CS 220 Minor tweaks to Lec 20 and 21 slides
</commit_message>
<xml_diff>
--- a/tyler/meena/cs220/s20/materials/lec_20_S20.pptx
+++ b/tyler/meena/cs220/s20/materials/lec_20_S20.pptx
@@ -2158,7 +2158,7 @@
           </a:ln>
           <a:extLst>
             <a:ext uri="{C572A759-6A51-4108-AA02-DFA0A04FC94B}">
-              <ma14:wrappingTextBoxFlag xmlns="" xmlns:m="http://schemas.openxmlformats.org/officeDocument/2006/math" xmlns:a14="http://schemas.microsoft.com/office/drawing/2010/main" xmlns:ma14="http://schemas.microsoft.com/office/mac/drawingml/2011/main" val="1"/>
+              <ma14:wrappingTextBoxFlag xmlns:ma14="http://schemas.microsoft.com/office/mac/drawingml/2011/main" xmlns:a14="http://schemas.microsoft.com/office/drawing/2010/main" xmlns:m="http://schemas.openxmlformats.org/officeDocument/2006/math" xmlns="" val="1"/>
             </a:ext>
           </a:extLst>
         </p:spPr>
@@ -2197,7 +2197,7 @@
           </a:ln>
           <a:extLst>
             <a:ext uri="{C572A759-6A51-4108-AA02-DFA0A04FC94B}">
-              <ma14:wrappingTextBoxFlag xmlns="" xmlns:m="http://schemas.openxmlformats.org/officeDocument/2006/math" xmlns:a14="http://schemas.microsoft.com/office/drawing/2010/main" xmlns:ma14="http://schemas.microsoft.com/office/mac/drawingml/2011/main" val="1"/>
+              <ma14:wrappingTextBoxFlag xmlns:ma14="http://schemas.microsoft.com/office/mac/drawingml/2011/main" xmlns:a14="http://schemas.microsoft.com/office/drawing/2010/main" xmlns:m="http://schemas.openxmlformats.org/officeDocument/2006/math" xmlns="" val="1"/>
             </a:ext>
           </a:extLst>
         </p:spPr>
@@ -3103,7 +3103,7 @@
           </a:ln>
           <a:extLst>
             <a:ext uri="{C572A759-6A51-4108-AA02-DFA0A04FC94B}">
-              <ma14:wrappingTextBoxFlag xmlns:ma14="http://schemas.microsoft.com/office/mac/drawingml/2011/main" xmlns:a14="http://schemas.microsoft.com/office/drawing/2010/main" xmlns:m="http://schemas.openxmlformats.org/officeDocument/2006/math" xmlns="" val="1"/>
+              <ma14:wrappingTextBoxFlag xmlns="" xmlns:m="http://schemas.openxmlformats.org/officeDocument/2006/math" xmlns:a14="http://schemas.microsoft.com/office/drawing/2010/main" xmlns:ma14="http://schemas.microsoft.com/office/mac/drawingml/2011/main" val="1"/>
             </a:ext>
           </a:extLst>
         </p:spPr>
@@ -3632,8 +3632,8 @@
         </p:nvSpPr>
         <p:spPr bwMode="auto">
           <a:xfrm>
-            <a:off x="787400" y="5022481"/>
-            <a:ext cx="4495800" cy="4534575"/>
+            <a:off x="787400" y="5761144"/>
+            <a:ext cx="4495800" cy="3057247"/>
           </a:xfrm>
           <a:prstGeom prst="rect">
             <a:avLst/>
@@ -3776,26 +3776,6 @@
               </a:defRPr>
             </a:lvl9pPr>
           </a:lstStyle>
-          <a:p>
-            <a:pPr marL="457200" indent="-457200" algn="l" eaLnBrk="1">
-              <a:buFont typeface="Arial" panose="020B0604020202020204" pitchFamily="34" charset="0"/>
-              <a:buChar char="•"/>
-            </a:pPr>
-            <a:r>
-              <a:rPr lang="en-US" altLang="en-US" sz="3200" dirty="0">
-                <a:latin typeface="Helvetica Neue" panose="02000503000000020004" pitchFamily="2" charset="0"/>
-                <a:sym typeface="Helvetica Neue" panose="02000503000000020004" pitchFamily="2" charset="0"/>
-              </a:rPr>
-              <a:t>Open Worksheet from Website</a:t>
-            </a:r>
-          </a:p>
-          <a:p>
-            <a:pPr algn="l" eaLnBrk="1"/>
-            <a:endParaRPr lang="en-US" altLang="en-US" sz="3200" dirty="0">
-              <a:latin typeface="Helvetica Neue" panose="02000503000000020004" pitchFamily="2" charset="0"/>
-              <a:sym typeface="Helvetica Neue" panose="02000503000000020004" pitchFamily="2" charset="0"/>
-            </a:endParaRPr>
-          </a:p>
           <a:p>
             <a:pPr marL="457200" indent="-457200" algn="l" eaLnBrk="1">
               <a:buFont typeface="Arial" panose="020B0604020202020204" pitchFamily="34" charset="0"/>
@@ -4002,7 +3982,7 @@
           </a:ln>
           <a:extLst>
             <a:ext uri="{C572A759-6A51-4108-AA02-DFA0A04FC94B}">
-              <ma14:wrappingTextBoxFlag xmlns="" xmlns:m="http://schemas.openxmlformats.org/officeDocument/2006/math" xmlns:a14="http://schemas.microsoft.com/office/drawing/2010/main" xmlns:ma14="http://schemas.microsoft.com/office/mac/drawingml/2011/main" val="1"/>
+              <ma14:wrappingTextBoxFlag xmlns:ma14="http://schemas.microsoft.com/office/mac/drawingml/2011/main" xmlns:a14="http://schemas.microsoft.com/office/drawing/2010/main" xmlns:m="http://schemas.openxmlformats.org/officeDocument/2006/math" xmlns="" val="1"/>
             </a:ext>
           </a:extLst>
         </p:spPr>
@@ -4037,7 +4017,7 @@
           </a:ln>
           <a:extLst>
             <a:ext uri="{C572A759-6A51-4108-AA02-DFA0A04FC94B}">
-              <ma14:wrappingTextBoxFlag xmlns="" xmlns:m="http://schemas.openxmlformats.org/officeDocument/2006/math" xmlns:a14="http://schemas.microsoft.com/office/drawing/2010/main" xmlns:ma14="http://schemas.microsoft.com/office/mac/drawingml/2011/main" val="1"/>
+              <ma14:wrappingTextBoxFlag xmlns:ma14="http://schemas.microsoft.com/office/mac/drawingml/2011/main" xmlns:a14="http://schemas.microsoft.com/office/drawing/2010/main" xmlns:m="http://schemas.openxmlformats.org/officeDocument/2006/math" xmlns="" val="1"/>
             </a:ext>
           </a:extLst>
         </p:spPr>
@@ -4072,7 +4052,7 @@
           </a:ln>
           <a:extLst>
             <a:ext uri="{C572A759-6A51-4108-AA02-DFA0A04FC94B}">
-              <ma14:wrappingTextBoxFlag xmlns="" xmlns:m="http://schemas.openxmlformats.org/officeDocument/2006/math" xmlns:a14="http://schemas.microsoft.com/office/drawing/2010/main" xmlns:ma14="http://schemas.microsoft.com/office/mac/drawingml/2011/main" val="1"/>
+              <ma14:wrappingTextBoxFlag xmlns:ma14="http://schemas.microsoft.com/office/mac/drawingml/2011/main" xmlns:a14="http://schemas.microsoft.com/office/drawing/2010/main" xmlns:m="http://schemas.openxmlformats.org/officeDocument/2006/math" xmlns="" val="1"/>
             </a:ext>
           </a:extLst>
         </p:spPr>
@@ -4170,7 +4150,7 @@
           </a:ln>
           <a:extLst>
             <a:ext uri="{C572A759-6A51-4108-AA02-DFA0A04FC94B}">
-              <ma14:wrappingTextBoxFlag xmlns="" xmlns:m="http://schemas.openxmlformats.org/officeDocument/2006/math" xmlns:a14="http://schemas.microsoft.com/office/drawing/2010/main" xmlns:ma14="http://schemas.microsoft.com/office/mac/drawingml/2011/main" val="1"/>
+              <ma14:wrappingTextBoxFlag xmlns:ma14="http://schemas.microsoft.com/office/mac/drawingml/2011/main" xmlns:a14="http://schemas.microsoft.com/office/drawing/2010/main" xmlns:m="http://schemas.openxmlformats.org/officeDocument/2006/math" xmlns="" val="1"/>
             </a:ext>
           </a:extLst>
         </p:spPr>
@@ -4239,7 +4219,7 @@
           </a:ln>
           <a:extLst>
             <a:ext uri="{C572A759-6A51-4108-AA02-DFA0A04FC94B}">
-              <ma14:wrappingTextBoxFlag xmlns="" xmlns:m="http://schemas.openxmlformats.org/officeDocument/2006/math" xmlns:a14="http://schemas.microsoft.com/office/drawing/2010/main" xmlns:ma14="http://schemas.microsoft.com/office/mac/drawingml/2011/main" val="1"/>
+              <ma14:wrappingTextBoxFlag xmlns:ma14="http://schemas.microsoft.com/office/mac/drawingml/2011/main" xmlns:a14="http://schemas.microsoft.com/office/drawing/2010/main" xmlns:m="http://schemas.openxmlformats.org/officeDocument/2006/math" xmlns="" val="1"/>
             </a:ext>
           </a:extLst>
         </p:spPr>
@@ -4286,7 +4266,7 @@
           </a:ln>
           <a:extLst>
             <a:ext uri="{C572A759-6A51-4108-AA02-DFA0A04FC94B}">
-              <ma14:wrappingTextBoxFlag xmlns="" xmlns:m="http://schemas.openxmlformats.org/officeDocument/2006/math" xmlns:a14="http://schemas.microsoft.com/office/drawing/2010/main" xmlns:ma14="http://schemas.microsoft.com/office/mac/drawingml/2011/main" val="1"/>
+              <ma14:wrappingTextBoxFlag xmlns:ma14="http://schemas.microsoft.com/office/mac/drawingml/2011/main" xmlns:a14="http://schemas.microsoft.com/office/drawing/2010/main" xmlns:m="http://schemas.openxmlformats.org/officeDocument/2006/math" xmlns="" val="1"/>
             </a:ext>
           </a:extLst>
         </p:spPr>
@@ -4333,7 +4313,7 @@
           </a:ln>
           <a:extLst>
             <a:ext uri="{C572A759-6A51-4108-AA02-DFA0A04FC94B}">
-              <ma14:wrappingTextBoxFlag xmlns="" xmlns:m="http://schemas.openxmlformats.org/officeDocument/2006/math" xmlns:a14="http://schemas.microsoft.com/office/drawing/2010/main" xmlns:ma14="http://schemas.microsoft.com/office/mac/drawingml/2011/main" val="1"/>
+              <ma14:wrappingTextBoxFlag xmlns:ma14="http://schemas.microsoft.com/office/mac/drawingml/2011/main" xmlns:a14="http://schemas.microsoft.com/office/drawing/2010/main" xmlns:m="http://schemas.openxmlformats.org/officeDocument/2006/math" xmlns="" val="1"/>
             </a:ext>
           </a:extLst>
         </p:spPr>
@@ -4519,7 +4499,7 @@
           </a:ln>
           <a:extLst>
             <a:ext uri="{C572A759-6A51-4108-AA02-DFA0A04FC94B}">
-              <ma14:wrappingTextBoxFlag xmlns="" xmlns:m="http://schemas.openxmlformats.org/officeDocument/2006/math" xmlns:a14="http://schemas.microsoft.com/office/drawing/2010/main" xmlns:ma14="http://schemas.microsoft.com/office/mac/drawingml/2011/main" val="1"/>
+              <ma14:wrappingTextBoxFlag xmlns:ma14="http://schemas.microsoft.com/office/mac/drawingml/2011/main" xmlns:a14="http://schemas.microsoft.com/office/drawing/2010/main" xmlns:m="http://schemas.openxmlformats.org/officeDocument/2006/math" xmlns="" val="1"/>
             </a:ext>
           </a:extLst>
         </p:spPr>
@@ -4611,7 +4591,7 @@
           </a:ln>
           <a:extLst>
             <a:ext uri="{C572A759-6A51-4108-AA02-DFA0A04FC94B}">
-              <ma14:wrappingTextBoxFlag xmlns="" xmlns:m="http://schemas.openxmlformats.org/officeDocument/2006/math" xmlns:a14="http://schemas.microsoft.com/office/drawing/2010/main" xmlns:ma14="http://schemas.microsoft.com/office/mac/drawingml/2011/main" val="1"/>
+              <ma14:wrappingTextBoxFlag xmlns:ma14="http://schemas.microsoft.com/office/mac/drawingml/2011/main" xmlns:a14="http://schemas.microsoft.com/office/drawing/2010/main" xmlns:m="http://schemas.openxmlformats.org/officeDocument/2006/math" xmlns="" val="1"/>
             </a:ext>
           </a:extLst>
         </p:spPr>
@@ -4736,7 +4716,7 @@
           </a:ln>
           <a:extLst>
             <a:ext uri="{C572A759-6A51-4108-AA02-DFA0A04FC94B}">
-              <ma14:wrappingTextBoxFlag xmlns="" xmlns:m="http://schemas.openxmlformats.org/officeDocument/2006/math" xmlns:a14="http://schemas.microsoft.com/office/drawing/2010/main" xmlns:ma14="http://schemas.microsoft.com/office/mac/drawingml/2011/main" val="1"/>
+              <ma14:wrappingTextBoxFlag xmlns:ma14="http://schemas.microsoft.com/office/mac/drawingml/2011/main" xmlns:a14="http://schemas.microsoft.com/office/drawing/2010/main" xmlns:m="http://schemas.openxmlformats.org/officeDocument/2006/math" xmlns="" val="1"/>
             </a:ext>
           </a:extLst>
         </p:spPr>
@@ -4846,7 +4826,7 @@
           </a:ln>
           <a:extLst>
             <a:ext uri="{C572A759-6A51-4108-AA02-DFA0A04FC94B}">
-              <ma14:wrappingTextBoxFlag xmlns="" xmlns:m="http://schemas.openxmlformats.org/officeDocument/2006/math" xmlns:a14="http://schemas.microsoft.com/office/drawing/2010/main" xmlns:ma14="http://schemas.microsoft.com/office/mac/drawingml/2011/main" val="1"/>
+              <ma14:wrappingTextBoxFlag xmlns:ma14="http://schemas.microsoft.com/office/mac/drawingml/2011/main" xmlns:a14="http://schemas.microsoft.com/office/drawing/2010/main" xmlns:m="http://schemas.openxmlformats.org/officeDocument/2006/math" xmlns="" val="1"/>
             </a:ext>
           </a:extLst>
         </p:spPr>
@@ -4964,7 +4944,7 @@
           </a:ln>
           <a:extLst>
             <a:ext uri="{C572A759-6A51-4108-AA02-DFA0A04FC94B}">
-              <ma14:wrappingTextBoxFlag xmlns="" xmlns:m="http://schemas.openxmlformats.org/officeDocument/2006/math" xmlns:a14="http://schemas.microsoft.com/office/drawing/2010/main" xmlns:ma14="http://schemas.microsoft.com/office/mac/drawingml/2011/main" val="1"/>
+              <ma14:wrappingTextBoxFlag xmlns:ma14="http://schemas.microsoft.com/office/mac/drawingml/2011/main" xmlns:a14="http://schemas.microsoft.com/office/drawing/2010/main" xmlns:m="http://schemas.openxmlformats.org/officeDocument/2006/math" xmlns="" val="1"/>
             </a:ext>
           </a:extLst>
         </p:spPr>
@@ -5156,7 +5136,7 @@
           </a:ln>
           <a:extLst>
             <a:ext uri="{C572A759-6A51-4108-AA02-DFA0A04FC94B}">
-              <ma14:wrappingTextBoxFlag xmlns="" xmlns:m="http://schemas.openxmlformats.org/officeDocument/2006/math" xmlns:a14="http://schemas.microsoft.com/office/drawing/2010/main" xmlns:ma14="http://schemas.microsoft.com/office/mac/drawingml/2011/main" val="1"/>
+              <ma14:wrappingTextBoxFlag xmlns:ma14="http://schemas.microsoft.com/office/mac/drawingml/2011/main" xmlns:a14="http://schemas.microsoft.com/office/drawing/2010/main" xmlns:m="http://schemas.openxmlformats.org/officeDocument/2006/math" xmlns="" val="1"/>
             </a:ext>
           </a:extLst>
         </p:spPr>
@@ -5191,7 +5171,7 @@
           </a:ln>
           <a:extLst>
             <a:ext uri="{C572A759-6A51-4108-AA02-DFA0A04FC94B}">
-              <ma14:wrappingTextBoxFlag xmlns="" xmlns:m="http://schemas.openxmlformats.org/officeDocument/2006/math" xmlns:a14="http://schemas.microsoft.com/office/drawing/2010/main" xmlns:ma14="http://schemas.microsoft.com/office/mac/drawingml/2011/main" val="1"/>
+              <ma14:wrappingTextBoxFlag xmlns:ma14="http://schemas.microsoft.com/office/mac/drawingml/2011/main" xmlns:a14="http://schemas.microsoft.com/office/drawing/2010/main" xmlns:m="http://schemas.openxmlformats.org/officeDocument/2006/math" xmlns="" val="1"/>
             </a:ext>
           </a:extLst>
         </p:spPr>
@@ -5226,7 +5206,7 @@
           </a:ln>
           <a:extLst>
             <a:ext uri="{C572A759-6A51-4108-AA02-DFA0A04FC94B}">
-              <ma14:wrappingTextBoxFlag xmlns="" xmlns:m="http://schemas.openxmlformats.org/officeDocument/2006/math" xmlns:a14="http://schemas.microsoft.com/office/drawing/2010/main" xmlns:ma14="http://schemas.microsoft.com/office/mac/drawingml/2011/main" val="1"/>
+              <ma14:wrappingTextBoxFlag xmlns:ma14="http://schemas.microsoft.com/office/mac/drawingml/2011/main" xmlns:a14="http://schemas.microsoft.com/office/drawing/2010/main" xmlns:m="http://schemas.openxmlformats.org/officeDocument/2006/math" xmlns="" val="1"/>
             </a:ext>
           </a:extLst>
         </p:spPr>
@@ -5324,7 +5304,7 @@
           </a:ln>
           <a:extLst>
             <a:ext uri="{C572A759-6A51-4108-AA02-DFA0A04FC94B}">
-              <ma14:wrappingTextBoxFlag xmlns="" xmlns:m="http://schemas.openxmlformats.org/officeDocument/2006/math" xmlns:a14="http://schemas.microsoft.com/office/drawing/2010/main" xmlns:ma14="http://schemas.microsoft.com/office/mac/drawingml/2011/main" val="1"/>
+              <ma14:wrappingTextBoxFlag xmlns:ma14="http://schemas.microsoft.com/office/mac/drawingml/2011/main" xmlns:a14="http://schemas.microsoft.com/office/drawing/2010/main" xmlns:m="http://schemas.openxmlformats.org/officeDocument/2006/math" xmlns="" val="1"/>
             </a:ext>
           </a:extLst>
         </p:spPr>
@@ -5393,7 +5373,7 @@
           </a:ln>
           <a:extLst>
             <a:ext uri="{C572A759-6A51-4108-AA02-DFA0A04FC94B}">
-              <ma14:wrappingTextBoxFlag xmlns="" xmlns:m="http://schemas.openxmlformats.org/officeDocument/2006/math" xmlns:a14="http://schemas.microsoft.com/office/drawing/2010/main" xmlns:ma14="http://schemas.microsoft.com/office/mac/drawingml/2011/main" val="1"/>
+              <ma14:wrappingTextBoxFlag xmlns:ma14="http://schemas.microsoft.com/office/mac/drawingml/2011/main" xmlns:a14="http://schemas.microsoft.com/office/drawing/2010/main" xmlns:m="http://schemas.openxmlformats.org/officeDocument/2006/math" xmlns="" val="1"/>
             </a:ext>
           </a:extLst>
         </p:spPr>
@@ -5440,7 +5420,7 @@
           </a:ln>
           <a:extLst>
             <a:ext uri="{C572A759-6A51-4108-AA02-DFA0A04FC94B}">
-              <ma14:wrappingTextBoxFlag xmlns="" xmlns:m="http://schemas.openxmlformats.org/officeDocument/2006/math" xmlns:a14="http://schemas.microsoft.com/office/drawing/2010/main" xmlns:ma14="http://schemas.microsoft.com/office/mac/drawingml/2011/main" val="1"/>
+              <ma14:wrappingTextBoxFlag xmlns:ma14="http://schemas.microsoft.com/office/mac/drawingml/2011/main" xmlns:a14="http://schemas.microsoft.com/office/drawing/2010/main" xmlns:m="http://schemas.openxmlformats.org/officeDocument/2006/math" xmlns="" val="1"/>
             </a:ext>
           </a:extLst>
         </p:spPr>
@@ -5487,7 +5467,7 @@
           </a:ln>
           <a:extLst>
             <a:ext uri="{C572A759-6A51-4108-AA02-DFA0A04FC94B}">
-              <ma14:wrappingTextBoxFlag xmlns="" xmlns:m="http://schemas.openxmlformats.org/officeDocument/2006/math" xmlns:a14="http://schemas.microsoft.com/office/drawing/2010/main" xmlns:ma14="http://schemas.microsoft.com/office/mac/drawingml/2011/main" val="1"/>
+              <ma14:wrappingTextBoxFlag xmlns:ma14="http://schemas.microsoft.com/office/mac/drawingml/2011/main" xmlns:a14="http://schemas.microsoft.com/office/drawing/2010/main" xmlns:m="http://schemas.openxmlformats.org/officeDocument/2006/math" xmlns="" val="1"/>
             </a:ext>
           </a:extLst>
         </p:spPr>
@@ -5673,7 +5653,7 @@
           </a:ln>
           <a:extLst>
             <a:ext uri="{C572A759-6A51-4108-AA02-DFA0A04FC94B}">
-              <ma14:wrappingTextBoxFlag xmlns="" xmlns:m="http://schemas.openxmlformats.org/officeDocument/2006/math" xmlns:a14="http://schemas.microsoft.com/office/drawing/2010/main" xmlns:ma14="http://schemas.microsoft.com/office/mac/drawingml/2011/main" val="1"/>
+              <ma14:wrappingTextBoxFlag xmlns:ma14="http://schemas.microsoft.com/office/mac/drawingml/2011/main" xmlns:a14="http://schemas.microsoft.com/office/drawing/2010/main" xmlns:m="http://schemas.openxmlformats.org/officeDocument/2006/math" xmlns="" val="1"/>
             </a:ext>
           </a:extLst>
         </p:spPr>
@@ -5765,7 +5745,7 @@
           </a:ln>
           <a:extLst>
             <a:ext uri="{C572A759-6A51-4108-AA02-DFA0A04FC94B}">
-              <ma14:wrappingTextBoxFlag xmlns="" xmlns:m="http://schemas.openxmlformats.org/officeDocument/2006/math" xmlns:a14="http://schemas.microsoft.com/office/drawing/2010/main" xmlns:ma14="http://schemas.microsoft.com/office/mac/drawingml/2011/main" val="1"/>
+              <ma14:wrappingTextBoxFlag xmlns:ma14="http://schemas.microsoft.com/office/mac/drawingml/2011/main" xmlns:a14="http://schemas.microsoft.com/office/drawing/2010/main" xmlns:m="http://schemas.openxmlformats.org/officeDocument/2006/math" xmlns="" val="1"/>
             </a:ext>
           </a:extLst>
         </p:spPr>
@@ -5890,7 +5870,7 @@
           </a:ln>
           <a:extLst>
             <a:ext uri="{C572A759-6A51-4108-AA02-DFA0A04FC94B}">
-              <ma14:wrappingTextBoxFlag xmlns="" xmlns:m="http://schemas.openxmlformats.org/officeDocument/2006/math" xmlns:a14="http://schemas.microsoft.com/office/drawing/2010/main" xmlns:ma14="http://schemas.microsoft.com/office/mac/drawingml/2011/main" val="1"/>
+              <ma14:wrappingTextBoxFlag xmlns:ma14="http://schemas.microsoft.com/office/mac/drawingml/2011/main" xmlns:a14="http://schemas.microsoft.com/office/drawing/2010/main" xmlns:m="http://schemas.openxmlformats.org/officeDocument/2006/math" xmlns="" val="1"/>
             </a:ext>
           </a:extLst>
         </p:spPr>
@@ -6000,7 +5980,7 @@
           </a:ln>
           <a:extLst>
             <a:ext uri="{C572A759-6A51-4108-AA02-DFA0A04FC94B}">
-              <ma14:wrappingTextBoxFlag xmlns="" xmlns:m="http://schemas.openxmlformats.org/officeDocument/2006/math" xmlns:a14="http://schemas.microsoft.com/office/drawing/2010/main" xmlns:ma14="http://schemas.microsoft.com/office/mac/drawingml/2011/main" val="1"/>
+              <ma14:wrappingTextBoxFlag xmlns:ma14="http://schemas.microsoft.com/office/mac/drawingml/2011/main" xmlns:a14="http://schemas.microsoft.com/office/drawing/2010/main" xmlns:m="http://schemas.openxmlformats.org/officeDocument/2006/math" xmlns="" val="1"/>
             </a:ext>
           </a:extLst>
         </p:spPr>
@@ -6118,7 +6098,7 @@
           </a:ln>
           <a:extLst>
             <a:ext uri="{C572A759-6A51-4108-AA02-DFA0A04FC94B}">
-              <ma14:wrappingTextBoxFlag xmlns="" xmlns:m="http://schemas.openxmlformats.org/officeDocument/2006/math" xmlns:a14="http://schemas.microsoft.com/office/drawing/2010/main" xmlns:ma14="http://schemas.microsoft.com/office/mac/drawingml/2011/main" val="1"/>
+              <ma14:wrappingTextBoxFlag xmlns:ma14="http://schemas.microsoft.com/office/mac/drawingml/2011/main" xmlns:a14="http://schemas.microsoft.com/office/drawing/2010/main" xmlns:m="http://schemas.openxmlformats.org/officeDocument/2006/math" xmlns="" val="1"/>
             </a:ext>
           </a:extLst>
         </p:spPr>
@@ -6310,7 +6290,7 @@
           </a:ln>
           <a:extLst>
             <a:ext uri="{C572A759-6A51-4108-AA02-DFA0A04FC94B}">
-              <ma14:wrappingTextBoxFlag xmlns="" xmlns:m="http://schemas.openxmlformats.org/officeDocument/2006/math" xmlns:a14="http://schemas.microsoft.com/office/drawing/2010/main" xmlns:ma14="http://schemas.microsoft.com/office/mac/drawingml/2011/main" val="1"/>
+              <ma14:wrappingTextBoxFlag xmlns:ma14="http://schemas.microsoft.com/office/mac/drawingml/2011/main" xmlns:a14="http://schemas.microsoft.com/office/drawing/2010/main" xmlns:m="http://schemas.openxmlformats.org/officeDocument/2006/math" xmlns="" val="1"/>
             </a:ext>
           </a:extLst>
         </p:spPr>
@@ -6345,7 +6325,7 @@
           </a:ln>
           <a:extLst>
             <a:ext uri="{C572A759-6A51-4108-AA02-DFA0A04FC94B}">
-              <ma14:wrappingTextBoxFlag xmlns="" xmlns:m="http://schemas.openxmlformats.org/officeDocument/2006/math" xmlns:a14="http://schemas.microsoft.com/office/drawing/2010/main" xmlns:ma14="http://schemas.microsoft.com/office/mac/drawingml/2011/main" val="1"/>
+              <ma14:wrappingTextBoxFlag xmlns:ma14="http://schemas.microsoft.com/office/mac/drawingml/2011/main" xmlns:a14="http://schemas.microsoft.com/office/drawing/2010/main" xmlns:m="http://schemas.openxmlformats.org/officeDocument/2006/math" xmlns="" val="1"/>
             </a:ext>
           </a:extLst>
         </p:spPr>
@@ -6380,7 +6360,7 @@
           </a:ln>
           <a:extLst>
             <a:ext uri="{C572A759-6A51-4108-AA02-DFA0A04FC94B}">
-              <ma14:wrappingTextBoxFlag xmlns="" xmlns:m="http://schemas.openxmlformats.org/officeDocument/2006/math" xmlns:a14="http://schemas.microsoft.com/office/drawing/2010/main" xmlns:ma14="http://schemas.microsoft.com/office/mac/drawingml/2011/main" val="1"/>
+              <ma14:wrappingTextBoxFlag xmlns:ma14="http://schemas.microsoft.com/office/mac/drawingml/2011/main" xmlns:a14="http://schemas.microsoft.com/office/drawing/2010/main" xmlns:m="http://schemas.openxmlformats.org/officeDocument/2006/math" xmlns="" val="1"/>
             </a:ext>
           </a:extLst>
         </p:spPr>
@@ -6478,7 +6458,7 @@
           </a:ln>
           <a:extLst>
             <a:ext uri="{C572A759-6A51-4108-AA02-DFA0A04FC94B}">
-              <ma14:wrappingTextBoxFlag xmlns="" xmlns:m="http://schemas.openxmlformats.org/officeDocument/2006/math" xmlns:a14="http://schemas.microsoft.com/office/drawing/2010/main" xmlns:ma14="http://schemas.microsoft.com/office/mac/drawingml/2011/main" val="1"/>
+              <ma14:wrappingTextBoxFlag xmlns:ma14="http://schemas.microsoft.com/office/mac/drawingml/2011/main" xmlns:a14="http://schemas.microsoft.com/office/drawing/2010/main" xmlns:m="http://schemas.openxmlformats.org/officeDocument/2006/math" xmlns="" val="1"/>
             </a:ext>
           </a:extLst>
         </p:spPr>
@@ -6547,7 +6527,7 @@
           </a:ln>
           <a:extLst>
             <a:ext uri="{C572A759-6A51-4108-AA02-DFA0A04FC94B}">
-              <ma14:wrappingTextBoxFlag xmlns="" xmlns:m="http://schemas.openxmlformats.org/officeDocument/2006/math" xmlns:a14="http://schemas.microsoft.com/office/drawing/2010/main" xmlns:ma14="http://schemas.microsoft.com/office/mac/drawingml/2011/main" val="1"/>
+              <ma14:wrappingTextBoxFlag xmlns:ma14="http://schemas.microsoft.com/office/mac/drawingml/2011/main" xmlns:a14="http://schemas.microsoft.com/office/drawing/2010/main" xmlns:m="http://schemas.openxmlformats.org/officeDocument/2006/math" xmlns="" val="1"/>
             </a:ext>
           </a:extLst>
         </p:spPr>
@@ -6594,7 +6574,7 @@
           </a:ln>
           <a:extLst>
             <a:ext uri="{C572A759-6A51-4108-AA02-DFA0A04FC94B}">
-              <ma14:wrappingTextBoxFlag xmlns="" xmlns:m="http://schemas.openxmlformats.org/officeDocument/2006/math" xmlns:a14="http://schemas.microsoft.com/office/drawing/2010/main" xmlns:ma14="http://schemas.microsoft.com/office/mac/drawingml/2011/main" val="1"/>
+              <ma14:wrappingTextBoxFlag xmlns:ma14="http://schemas.microsoft.com/office/mac/drawingml/2011/main" xmlns:a14="http://schemas.microsoft.com/office/drawing/2010/main" xmlns:m="http://schemas.openxmlformats.org/officeDocument/2006/math" xmlns="" val="1"/>
             </a:ext>
           </a:extLst>
         </p:spPr>
@@ -6641,7 +6621,7 @@
           </a:ln>
           <a:extLst>
             <a:ext uri="{C572A759-6A51-4108-AA02-DFA0A04FC94B}">
-              <ma14:wrappingTextBoxFlag xmlns="" xmlns:m="http://schemas.openxmlformats.org/officeDocument/2006/math" xmlns:a14="http://schemas.microsoft.com/office/drawing/2010/main" xmlns:ma14="http://schemas.microsoft.com/office/mac/drawingml/2011/main" val="1"/>
+              <ma14:wrappingTextBoxFlag xmlns:ma14="http://schemas.microsoft.com/office/mac/drawingml/2011/main" xmlns:a14="http://schemas.microsoft.com/office/drawing/2010/main" xmlns:m="http://schemas.openxmlformats.org/officeDocument/2006/math" xmlns="" val="1"/>
             </a:ext>
           </a:extLst>
         </p:spPr>
@@ -6827,7 +6807,7 @@
           </a:ln>
           <a:extLst>
             <a:ext uri="{C572A759-6A51-4108-AA02-DFA0A04FC94B}">
-              <ma14:wrappingTextBoxFlag xmlns="" xmlns:m="http://schemas.openxmlformats.org/officeDocument/2006/math" xmlns:a14="http://schemas.microsoft.com/office/drawing/2010/main" xmlns:ma14="http://schemas.microsoft.com/office/mac/drawingml/2011/main" val="1"/>
+              <ma14:wrappingTextBoxFlag xmlns:ma14="http://schemas.microsoft.com/office/mac/drawingml/2011/main" xmlns:a14="http://schemas.microsoft.com/office/drawing/2010/main" xmlns:m="http://schemas.openxmlformats.org/officeDocument/2006/math" xmlns="" val="1"/>
             </a:ext>
           </a:extLst>
         </p:spPr>
@@ -6919,7 +6899,7 @@
           </a:ln>
           <a:extLst>
             <a:ext uri="{C572A759-6A51-4108-AA02-DFA0A04FC94B}">
-              <ma14:wrappingTextBoxFlag xmlns="" xmlns:m="http://schemas.openxmlformats.org/officeDocument/2006/math" xmlns:a14="http://schemas.microsoft.com/office/drawing/2010/main" xmlns:ma14="http://schemas.microsoft.com/office/mac/drawingml/2011/main" val="1"/>
+              <ma14:wrappingTextBoxFlag xmlns:ma14="http://schemas.microsoft.com/office/mac/drawingml/2011/main" xmlns:a14="http://schemas.microsoft.com/office/drawing/2010/main" xmlns:m="http://schemas.openxmlformats.org/officeDocument/2006/math" xmlns="" val="1"/>
             </a:ext>
           </a:extLst>
         </p:spPr>
@@ -7044,7 +7024,7 @@
           </a:ln>
           <a:extLst>
             <a:ext uri="{C572A759-6A51-4108-AA02-DFA0A04FC94B}">
-              <ma14:wrappingTextBoxFlag xmlns="" xmlns:m="http://schemas.openxmlformats.org/officeDocument/2006/math" xmlns:a14="http://schemas.microsoft.com/office/drawing/2010/main" xmlns:ma14="http://schemas.microsoft.com/office/mac/drawingml/2011/main" val="1"/>
+              <ma14:wrappingTextBoxFlag xmlns:ma14="http://schemas.microsoft.com/office/mac/drawingml/2011/main" xmlns:a14="http://schemas.microsoft.com/office/drawing/2010/main" xmlns:m="http://schemas.openxmlformats.org/officeDocument/2006/math" xmlns="" val="1"/>
             </a:ext>
           </a:extLst>
         </p:spPr>
@@ -7154,7 +7134,7 @@
           </a:ln>
           <a:extLst>
             <a:ext uri="{C572A759-6A51-4108-AA02-DFA0A04FC94B}">
-              <ma14:wrappingTextBoxFlag xmlns="" xmlns:m="http://schemas.openxmlformats.org/officeDocument/2006/math" xmlns:a14="http://schemas.microsoft.com/office/drawing/2010/main" xmlns:ma14="http://schemas.microsoft.com/office/mac/drawingml/2011/main" val="1"/>
+              <ma14:wrappingTextBoxFlag xmlns:ma14="http://schemas.microsoft.com/office/mac/drawingml/2011/main" xmlns:a14="http://schemas.microsoft.com/office/drawing/2010/main" xmlns:m="http://schemas.openxmlformats.org/officeDocument/2006/math" xmlns="" val="1"/>
             </a:ext>
           </a:extLst>
         </p:spPr>
@@ -7272,7 +7252,7 @@
           </a:ln>
           <a:extLst>
             <a:ext uri="{C572A759-6A51-4108-AA02-DFA0A04FC94B}">
-              <ma14:wrappingTextBoxFlag xmlns="" xmlns:m="http://schemas.openxmlformats.org/officeDocument/2006/math" xmlns:a14="http://schemas.microsoft.com/office/drawing/2010/main" xmlns:ma14="http://schemas.microsoft.com/office/mac/drawingml/2011/main" val="1"/>
+              <ma14:wrappingTextBoxFlag xmlns:ma14="http://schemas.microsoft.com/office/mac/drawingml/2011/main" xmlns:a14="http://schemas.microsoft.com/office/drawing/2010/main" xmlns:m="http://schemas.openxmlformats.org/officeDocument/2006/math" xmlns="" val="1"/>
             </a:ext>
           </a:extLst>
         </p:spPr>
@@ -7961,7 +7941,7 @@
           </a:ln>
           <a:extLst>
             <a:ext uri="{C572A759-6A51-4108-AA02-DFA0A04FC94B}">
-              <ma14:wrappingTextBoxFlag xmlns="" xmlns:m="http://schemas.openxmlformats.org/officeDocument/2006/math" xmlns:a14="http://schemas.microsoft.com/office/drawing/2010/main" xmlns:ma14="http://schemas.microsoft.com/office/mac/drawingml/2011/main" val="1"/>
+              <ma14:wrappingTextBoxFlag xmlns:ma14="http://schemas.microsoft.com/office/mac/drawingml/2011/main" xmlns:a14="http://schemas.microsoft.com/office/drawing/2010/main" xmlns:m="http://schemas.openxmlformats.org/officeDocument/2006/math" xmlns="" val="1"/>
             </a:ext>
           </a:extLst>
         </p:spPr>
@@ -8120,7 +8100,7 @@
           </a:ln>
           <a:extLst>
             <a:ext uri="{C572A759-6A51-4108-AA02-DFA0A04FC94B}">
-              <ma14:wrappingTextBoxFlag xmlns="" xmlns:m="http://schemas.openxmlformats.org/officeDocument/2006/math" xmlns:a14="http://schemas.microsoft.com/office/drawing/2010/main" xmlns:ma14="http://schemas.microsoft.com/office/mac/drawingml/2011/main" val="1"/>
+              <ma14:wrappingTextBoxFlag xmlns:ma14="http://schemas.microsoft.com/office/mac/drawingml/2011/main" xmlns:a14="http://schemas.microsoft.com/office/drawing/2010/main" xmlns:m="http://schemas.openxmlformats.org/officeDocument/2006/math" xmlns="" val="1"/>
             </a:ext>
           </a:extLst>
         </p:spPr>
@@ -8155,7 +8135,7 @@
           </a:ln>
           <a:extLst>
             <a:ext uri="{C572A759-6A51-4108-AA02-DFA0A04FC94B}">
-              <ma14:wrappingTextBoxFlag xmlns="" xmlns:m="http://schemas.openxmlformats.org/officeDocument/2006/math" xmlns:a14="http://schemas.microsoft.com/office/drawing/2010/main" xmlns:ma14="http://schemas.microsoft.com/office/mac/drawingml/2011/main" val="1"/>
+              <ma14:wrappingTextBoxFlag xmlns:ma14="http://schemas.microsoft.com/office/mac/drawingml/2011/main" xmlns:a14="http://schemas.microsoft.com/office/drawing/2010/main" xmlns:m="http://schemas.openxmlformats.org/officeDocument/2006/math" xmlns="" val="1"/>
             </a:ext>
           </a:extLst>
         </p:spPr>
@@ -8324,7 +8304,7 @@
           </a:ln>
           <a:extLst>
             <a:ext uri="{C572A759-6A51-4108-AA02-DFA0A04FC94B}">
-              <ma14:wrappingTextBoxFlag xmlns="" xmlns:m="http://schemas.openxmlformats.org/officeDocument/2006/math" xmlns:a14="http://schemas.microsoft.com/office/drawing/2010/main" xmlns:ma14="http://schemas.microsoft.com/office/mac/drawingml/2011/main" val="1"/>
+              <ma14:wrappingTextBoxFlag xmlns:ma14="http://schemas.microsoft.com/office/mac/drawingml/2011/main" xmlns:a14="http://schemas.microsoft.com/office/drawing/2010/main" xmlns:m="http://schemas.openxmlformats.org/officeDocument/2006/math" xmlns="" val="1"/>
             </a:ext>
           </a:extLst>
         </p:spPr>
@@ -8421,7 +8401,7 @@
           </a:ln>
           <a:extLst>
             <a:ext uri="{C572A759-6A51-4108-AA02-DFA0A04FC94B}">
-              <ma14:wrappingTextBoxFlag xmlns="" xmlns:m="http://schemas.openxmlformats.org/officeDocument/2006/math" xmlns:a14="http://schemas.microsoft.com/office/drawing/2010/main" xmlns:ma14="http://schemas.microsoft.com/office/mac/drawingml/2011/main" val="1"/>
+              <ma14:wrappingTextBoxFlag xmlns:ma14="http://schemas.microsoft.com/office/mac/drawingml/2011/main" xmlns:a14="http://schemas.microsoft.com/office/drawing/2010/main" xmlns:m="http://schemas.openxmlformats.org/officeDocument/2006/math" xmlns="" val="1"/>
             </a:ext>
           </a:extLst>
         </p:spPr>
@@ -8463,7 +8443,7 @@
           </a:ln>
           <a:extLst>
             <a:ext uri="{C572A759-6A51-4108-AA02-DFA0A04FC94B}">
-              <ma14:wrappingTextBoxFlag xmlns="" xmlns:m="http://schemas.openxmlformats.org/officeDocument/2006/math" xmlns:a14="http://schemas.microsoft.com/office/drawing/2010/main" xmlns:ma14="http://schemas.microsoft.com/office/mac/drawingml/2011/main" val="1"/>
+              <ma14:wrappingTextBoxFlag xmlns:ma14="http://schemas.microsoft.com/office/mac/drawingml/2011/main" xmlns:a14="http://schemas.microsoft.com/office/drawing/2010/main" xmlns:m="http://schemas.openxmlformats.org/officeDocument/2006/math" xmlns="" val="1"/>
             </a:ext>
           </a:extLst>
         </p:spPr>
@@ -8510,7 +8490,7 @@
           </a:ln>
           <a:extLst>
             <a:ext uri="{C572A759-6A51-4108-AA02-DFA0A04FC94B}">
-              <ma14:wrappingTextBoxFlag xmlns="" xmlns:m="http://schemas.openxmlformats.org/officeDocument/2006/math" xmlns:a14="http://schemas.microsoft.com/office/drawing/2010/main" xmlns:ma14="http://schemas.microsoft.com/office/mac/drawingml/2011/main" val="1"/>
+              <ma14:wrappingTextBoxFlag xmlns:ma14="http://schemas.microsoft.com/office/mac/drawingml/2011/main" xmlns:a14="http://schemas.microsoft.com/office/drawing/2010/main" xmlns:m="http://schemas.openxmlformats.org/officeDocument/2006/math" xmlns="" val="1"/>
             </a:ext>
           </a:extLst>
         </p:spPr>
@@ -8599,7 +8579,7 @@
           </a:ln>
           <a:extLst>
             <a:ext uri="{C572A759-6A51-4108-AA02-DFA0A04FC94B}">
-              <ma14:wrappingTextBoxFlag xmlns="" xmlns:m="http://schemas.openxmlformats.org/officeDocument/2006/math" xmlns:a14="http://schemas.microsoft.com/office/drawing/2010/main" xmlns:ma14="http://schemas.microsoft.com/office/mac/drawingml/2011/main" val="1"/>
+              <ma14:wrappingTextBoxFlag xmlns:ma14="http://schemas.microsoft.com/office/mac/drawingml/2011/main" xmlns:a14="http://schemas.microsoft.com/office/drawing/2010/main" xmlns:m="http://schemas.openxmlformats.org/officeDocument/2006/math" xmlns="" val="1"/>
             </a:ext>
           </a:extLst>
         </p:spPr>
@@ -8674,7 +8654,7 @@
           </a:ln>
           <a:extLst>
             <a:ext uri="{C572A759-6A51-4108-AA02-DFA0A04FC94B}">
-              <ma14:wrappingTextBoxFlag xmlns="" xmlns:m="http://schemas.openxmlformats.org/officeDocument/2006/math" xmlns:a14="http://schemas.microsoft.com/office/drawing/2010/main" xmlns:ma14="http://schemas.microsoft.com/office/mac/drawingml/2011/main" val="1"/>
+              <ma14:wrappingTextBoxFlag xmlns:ma14="http://schemas.microsoft.com/office/mac/drawingml/2011/main" xmlns:a14="http://schemas.microsoft.com/office/drawing/2010/main" xmlns:m="http://schemas.openxmlformats.org/officeDocument/2006/math" xmlns="" val="1"/>
             </a:ext>
           </a:extLst>
         </p:spPr>
@@ -8716,7 +8696,7 @@
           </a:ln>
           <a:extLst>
             <a:ext uri="{C572A759-6A51-4108-AA02-DFA0A04FC94B}">
-              <ma14:wrappingTextBoxFlag xmlns="" xmlns:m="http://schemas.openxmlformats.org/officeDocument/2006/math" xmlns:a14="http://schemas.microsoft.com/office/drawing/2010/main" xmlns:ma14="http://schemas.microsoft.com/office/mac/drawingml/2011/main" val="1"/>
+              <ma14:wrappingTextBoxFlag xmlns:ma14="http://schemas.microsoft.com/office/mac/drawingml/2011/main" xmlns:a14="http://schemas.microsoft.com/office/drawing/2010/main" xmlns:m="http://schemas.openxmlformats.org/officeDocument/2006/math" xmlns="" val="1"/>
             </a:ext>
           </a:extLst>
         </p:spPr>
@@ -8946,7 +8926,7 @@
           </a:ln>
           <a:extLst>
             <a:ext uri="{C572A759-6A51-4108-AA02-DFA0A04FC94B}">
-              <ma14:wrappingTextBoxFlag xmlns="" xmlns:m="http://schemas.openxmlformats.org/officeDocument/2006/math" xmlns:a14="http://schemas.microsoft.com/office/drawing/2010/main" xmlns:ma14="http://schemas.microsoft.com/office/mac/drawingml/2011/main" val="1"/>
+              <ma14:wrappingTextBoxFlag xmlns:ma14="http://schemas.microsoft.com/office/mac/drawingml/2011/main" xmlns:a14="http://schemas.microsoft.com/office/drawing/2010/main" xmlns:m="http://schemas.openxmlformats.org/officeDocument/2006/math" xmlns="" val="1"/>
             </a:ext>
           </a:extLst>
         </p:spPr>
@@ -8981,7 +8961,7 @@
           </a:ln>
           <a:extLst>
             <a:ext uri="{C572A759-6A51-4108-AA02-DFA0A04FC94B}">
-              <ma14:wrappingTextBoxFlag xmlns="" xmlns:m="http://schemas.openxmlformats.org/officeDocument/2006/math" xmlns:a14="http://schemas.microsoft.com/office/drawing/2010/main" xmlns:ma14="http://schemas.microsoft.com/office/mac/drawingml/2011/main" val="1"/>
+              <ma14:wrappingTextBoxFlag xmlns:ma14="http://schemas.microsoft.com/office/mac/drawingml/2011/main" xmlns:a14="http://schemas.microsoft.com/office/drawing/2010/main" xmlns:m="http://schemas.openxmlformats.org/officeDocument/2006/math" xmlns="" val="1"/>
             </a:ext>
           </a:extLst>
         </p:spPr>
@@ -9150,7 +9130,7 @@
           </a:ln>
           <a:extLst>
             <a:ext uri="{C572A759-6A51-4108-AA02-DFA0A04FC94B}">
-              <ma14:wrappingTextBoxFlag xmlns="" xmlns:m="http://schemas.openxmlformats.org/officeDocument/2006/math" xmlns:a14="http://schemas.microsoft.com/office/drawing/2010/main" xmlns:ma14="http://schemas.microsoft.com/office/mac/drawingml/2011/main" val="1"/>
+              <ma14:wrappingTextBoxFlag xmlns:ma14="http://schemas.microsoft.com/office/mac/drawingml/2011/main" xmlns:a14="http://schemas.microsoft.com/office/drawing/2010/main" xmlns:m="http://schemas.openxmlformats.org/officeDocument/2006/math" xmlns="" val="1"/>
             </a:ext>
           </a:extLst>
         </p:spPr>
@@ -9247,7 +9227,7 @@
           </a:ln>
           <a:extLst>
             <a:ext uri="{C572A759-6A51-4108-AA02-DFA0A04FC94B}">
-              <ma14:wrappingTextBoxFlag xmlns="" xmlns:m="http://schemas.openxmlformats.org/officeDocument/2006/math" xmlns:a14="http://schemas.microsoft.com/office/drawing/2010/main" xmlns:ma14="http://schemas.microsoft.com/office/mac/drawingml/2011/main" val="1"/>
+              <ma14:wrappingTextBoxFlag xmlns:ma14="http://schemas.microsoft.com/office/mac/drawingml/2011/main" xmlns:a14="http://schemas.microsoft.com/office/drawing/2010/main" xmlns:m="http://schemas.openxmlformats.org/officeDocument/2006/math" xmlns="" val="1"/>
             </a:ext>
           </a:extLst>
         </p:spPr>
@@ -9289,7 +9269,7 @@
           </a:ln>
           <a:extLst>
             <a:ext uri="{C572A759-6A51-4108-AA02-DFA0A04FC94B}">
-              <ma14:wrappingTextBoxFlag xmlns="" xmlns:m="http://schemas.openxmlformats.org/officeDocument/2006/math" xmlns:a14="http://schemas.microsoft.com/office/drawing/2010/main" xmlns:ma14="http://schemas.microsoft.com/office/mac/drawingml/2011/main" val="1"/>
+              <ma14:wrappingTextBoxFlag xmlns:ma14="http://schemas.microsoft.com/office/mac/drawingml/2011/main" xmlns:a14="http://schemas.microsoft.com/office/drawing/2010/main" xmlns:m="http://schemas.openxmlformats.org/officeDocument/2006/math" xmlns="" val="1"/>
             </a:ext>
           </a:extLst>
         </p:spPr>
@@ -9336,7 +9316,7 @@
           </a:ln>
           <a:extLst>
             <a:ext uri="{C572A759-6A51-4108-AA02-DFA0A04FC94B}">
-              <ma14:wrappingTextBoxFlag xmlns="" xmlns:m="http://schemas.openxmlformats.org/officeDocument/2006/math" xmlns:a14="http://schemas.microsoft.com/office/drawing/2010/main" xmlns:ma14="http://schemas.microsoft.com/office/mac/drawingml/2011/main" val="1"/>
+              <ma14:wrappingTextBoxFlag xmlns:ma14="http://schemas.microsoft.com/office/mac/drawingml/2011/main" xmlns:a14="http://schemas.microsoft.com/office/drawing/2010/main" xmlns:m="http://schemas.openxmlformats.org/officeDocument/2006/math" xmlns="" val="1"/>
             </a:ext>
           </a:extLst>
         </p:spPr>
@@ -9425,7 +9405,7 @@
           </a:ln>
           <a:extLst>
             <a:ext uri="{C572A759-6A51-4108-AA02-DFA0A04FC94B}">
-              <ma14:wrappingTextBoxFlag xmlns="" xmlns:m="http://schemas.openxmlformats.org/officeDocument/2006/math" xmlns:a14="http://schemas.microsoft.com/office/drawing/2010/main" xmlns:ma14="http://schemas.microsoft.com/office/mac/drawingml/2011/main" val="1"/>
+              <ma14:wrappingTextBoxFlag xmlns:ma14="http://schemas.microsoft.com/office/mac/drawingml/2011/main" xmlns:a14="http://schemas.microsoft.com/office/drawing/2010/main" xmlns:m="http://schemas.openxmlformats.org/officeDocument/2006/math" xmlns="" val="1"/>
             </a:ext>
           </a:extLst>
         </p:spPr>
@@ -9542,7 +9522,7 @@
           </a:ln>
           <a:extLst>
             <a:ext uri="{C572A759-6A51-4108-AA02-DFA0A04FC94B}">
-              <ma14:wrappingTextBoxFlag xmlns="" xmlns:m="http://schemas.openxmlformats.org/officeDocument/2006/math" xmlns:a14="http://schemas.microsoft.com/office/drawing/2010/main" xmlns:ma14="http://schemas.microsoft.com/office/mac/drawingml/2011/main" val="1"/>
+              <ma14:wrappingTextBoxFlag xmlns:ma14="http://schemas.microsoft.com/office/mac/drawingml/2011/main" xmlns:a14="http://schemas.microsoft.com/office/drawing/2010/main" xmlns:m="http://schemas.openxmlformats.org/officeDocument/2006/math" xmlns="" val="1"/>
             </a:ext>
           </a:extLst>
         </p:spPr>
@@ -9584,7 +9564,7 @@
           </a:ln>
           <a:extLst>
             <a:ext uri="{C572A759-6A51-4108-AA02-DFA0A04FC94B}">
-              <ma14:wrappingTextBoxFlag xmlns="" xmlns:m="http://schemas.openxmlformats.org/officeDocument/2006/math" xmlns:a14="http://schemas.microsoft.com/office/drawing/2010/main" xmlns:ma14="http://schemas.microsoft.com/office/mac/drawingml/2011/main" val="1"/>
+              <ma14:wrappingTextBoxFlag xmlns:ma14="http://schemas.microsoft.com/office/mac/drawingml/2011/main" xmlns:a14="http://schemas.microsoft.com/office/drawing/2010/main" xmlns:m="http://schemas.openxmlformats.org/officeDocument/2006/math" xmlns="" val="1"/>
             </a:ext>
           </a:extLst>
         </p:spPr>
@@ -9694,7 +9674,7 @@
           </a:ln>
           <a:extLst>
             <a:ext uri="{C572A759-6A51-4108-AA02-DFA0A04FC94B}">
-              <ma14:wrappingTextBoxFlag xmlns="" xmlns:m="http://schemas.openxmlformats.org/officeDocument/2006/math" xmlns:a14="http://schemas.microsoft.com/office/drawing/2010/main" xmlns:ma14="http://schemas.microsoft.com/office/mac/drawingml/2011/main" val="1"/>
+              <ma14:wrappingTextBoxFlag xmlns:ma14="http://schemas.microsoft.com/office/mac/drawingml/2011/main" xmlns:a14="http://schemas.microsoft.com/office/drawing/2010/main" xmlns:m="http://schemas.openxmlformats.org/officeDocument/2006/math" xmlns="" val="1"/>
             </a:ext>
           </a:extLst>
         </p:spPr>
@@ -9810,7 +9790,7 @@
           </a:effectLst>
           <a:extLst>
             <a:ext uri="{C572A759-6A51-4108-AA02-DFA0A04FC94B}">
-              <ma14:wrappingTextBoxFlag xmlns="" xmlns:m="http://schemas.openxmlformats.org/officeDocument/2006/math" xmlns:a14="http://schemas.microsoft.com/office/drawing/2010/main" xmlns:ma14="http://schemas.microsoft.com/office/mac/drawingml/2011/main" val="1"/>
+              <ma14:wrappingTextBoxFlag xmlns:ma14="http://schemas.microsoft.com/office/mac/drawingml/2011/main" xmlns:a14="http://schemas.microsoft.com/office/drawing/2010/main" xmlns:m="http://schemas.openxmlformats.org/officeDocument/2006/math" xmlns="" val="1"/>
             </a:ext>
           </a:extLst>
         </p:spPr>
@@ -9867,7 +9847,7 @@
           </a:effectLst>
           <a:extLst>
             <a:ext uri="{C572A759-6A51-4108-AA02-DFA0A04FC94B}">
-              <ma14:wrappingTextBoxFlag xmlns="" xmlns:m="http://schemas.openxmlformats.org/officeDocument/2006/math" xmlns:a14="http://schemas.microsoft.com/office/drawing/2010/main" xmlns:ma14="http://schemas.microsoft.com/office/mac/drawingml/2011/main" val="1"/>
+              <ma14:wrappingTextBoxFlag xmlns:ma14="http://schemas.microsoft.com/office/mac/drawingml/2011/main" xmlns:a14="http://schemas.microsoft.com/office/drawing/2010/main" xmlns:m="http://schemas.openxmlformats.org/officeDocument/2006/math" xmlns="" val="1"/>
             </a:ext>
           </a:extLst>
         </p:spPr>
@@ -9909,7 +9889,7 @@
           </a:ln>
           <a:extLst>
             <a:ext uri="{C572A759-6A51-4108-AA02-DFA0A04FC94B}">
-              <ma14:wrappingTextBoxFlag xmlns="" xmlns:m="http://schemas.openxmlformats.org/officeDocument/2006/math" xmlns:a14="http://schemas.microsoft.com/office/drawing/2010/main" xmlns:ma14="http://schemas.microsoft.com/office/mac/drawingml/2011/main" val="1"/>
+              <ma14:wrappingTextBoxFlag xmlns:ma14="http://schemas.microsoft.com/office/mac/drawingml/2011/main" xmlns:a14="http://schemas.microsoft.com/office/drawing/2010/main" xmlns:m="http://schemas.openxmlformats.org/officeDocument/2006/math" xmlns="" val="1"/>
             </a:ext>
           </a:extLst>
         </p:spPr>
@@ -9948,7 +9928,7 @@
           </a:ln>
           <a:extLst>
             <a:ext uri="{C572A759-6A51-4108-AA02-DFA0A04FC94B}">
-              <ma14:wrappingTextBoxFlag xmlns="" xmlns:m="http://schemas.openxmlformats.org/officeDocument/2006/math" xmlns:a14="http://schemas.microsoft.com/office/drawing/2010/main" xmlns:ma14="http://schemas.microsoft.com/office/mac/drawingml/2011/main" val="1"/>
+              <ma14:wrappingTextBoxFlag xmlns:ma14="http://schemas.microsoft.com/office/mac/drawingml/2011/main" xmlns:a14="http://schemas.microsoft.com/office/drawing/2010/main" xmlns:m="http://schemas.openxmlformats.org/officeDocument/2006/math" xmlns="" val="1"/>
             </a:ext>
           </a:extLst>
         </p:spPr>
@@ -10114,7 +10094,7 @@
           </a:ln>
           <a:extLst>
             <a:ext uri="{C572A759-6A51-4108-AA02-DFA0A04FC94B}">
-              <ma14:wrappingTextBoxFlag xmlns="" xmlns:m="http://schemas.openxmlformats.org/officeDocument/2006/math" xmlns:a14="http://schemas.microsoft.com/office/drawing/2010/main" xmlns:ma14="http://schemas.microsoft.com/office/mac/drawingml/2011/main" val="1"/>
+              <ma14:wrappingTextBoxFlag xmlns:ma14="http://schemas.microsoft.com/office/mac/drawingml/2011/main" xmlns:a14="http://schemas.microsoft.com/office/drawing/2010/main" xmlns:m="http://schemas.openxmlformats.org/officeDocument/2006/math" xmlns="" val="1"/>
             </a:ext>
           </a:extLst>
         </p:spPr>
@@ -10149,7 +10129,7 @@
           </a:ln>
           <a:extLst>
             <a:ext uri="{C572A759-6A51-4108-AA02-DFA0A04FC94B}">
-              <ma14:wrappingTextBoxFlag xmlns="" xmlns:m="http://schemas.openxmlformats.org/officeDocument/2006/math" xmlns:a14="http://schemas.microsoft.com/office/drawing/2010/main" xmlns:ma14="http://schemas.microsoft.com/office/mac/drawingml/2011/main" val="1"/>
+              <ma14:wrappingTextBoxFlag xmlns:ma14="http://schemas.microsoft.com/office/mac/drawingml/2011/main" xmlns:a14="http://schemas.microsoft.com/office/drawing/2010/main" xmlns:m="http://schemas.openxmlformats.org/officeDocument/2006/math" xmlns="" val="1"/>
             </a:ext>
           </a:extLst>
         </p:spPr>
@@ -10318,7 +10298,7 @@
           </a:ln>
           <a:extLst>
             <a:ext uri="{C572A759-6A51-4108-AA02-DFA0A04FC94B}">
-              <ma14:wrappingTextBoxFlag xmlns="" xmlns:m="http://schemas.openxmlformats.org/officeDocument/2006/math" xmlns:a14="http://schemas.microsoft.com/office/drawing/2010/main" xmlns:ma14="http://schemas.microsoft.com/office/mac/drawingml/2011/main" val="1"/>
+              <ma14:wrappingTextBoxFlag xmlns:ma14="http://schemas.microsoft.com/office/mac/drawingml/2011/main" xmlns:a14="http://schemas.microsoft.com/office/drawing/2010/main" xmlns:m="http://schemas.openxmlformats.org/officeDocument/2006/math" xmlns="" val="1"/>
             </a:ext>
           </a:extLst>
         </p:spPr>
@@ -10415,7 +10395,7 @@
           </a:ln>
           <a:extLst>
             <a:ext uri="{C572A759-6A51-4108-AA02-DFA0A04FC94B}">
-              <ma14:wrappingTextBoxFlag xmlns="" xmlns:m="http://schemas.openxmlformats.org/officeDocument/2006/math" xmlns:a14="http://schemas.microsoft.com/office/drawing/2010/main" xmlns:ma14="http://schemas.microsoft.com/office/mac/drawingml/2011/main" val="1"/>
+              <ma14:wrappingTextBoxFlag xmlns:ma14="http://schemas.microsoft.com/office/mac/drawingml/2011/main" xmlns:a14="http://schemas.microsoft.com/office/drawing/2010/main" xmlns:m="http://schemas.openxmlformats.org/officeDocument/2006/math" xmlns="" val="1"/>
             </a:ext>
           </a:extLst>
         </p:spPr>
@@ -10457,7 +10437,7 @@
           </a:ln>
           <a:extLst>
             <a:ext uri="{C572A759-6A51-4108-AA02-DFA0A04FC94B}">
-              <ma14:wrappingTextBoxFlag xmlns="" xmlns:m="http://schemas.openxmlformats.org/officeDocument/2006/math" xmlns:a14="http://schemas.microsoft.com/office/drawing/2010/main" xmlns:ma14="http://schemas.microsoft.com/office/mac/drawingml/2011/main" val="1"/>
+              <ma14:wrappingTextBoxFlag xmlns:ma14="http://schemas.microsoft.com/office/mac/drawingml/2011/main" xmlns:a14="http://schemas.microsoft.com/office/drawing/2010/main" xmlns:m="http://schemas.openxmlformats.org/officeDocument/2006/math" xmlns="" val="1"/>
             </a:ext>
           </a:extLst>
         </p:spPr>
@@ -10504,7 +10484,7 @@
           </a:ln>
           <a:extLst>
             <a:ext uri="{C572A759-6A51-4108-AA02-DFA0A04FC94B}">
-              <ma14:wrappingTextBoxFlag xmlns="" xmlns:m="http://schemas.openxmlformats.org/officeDocument/2006/math" xmlns:a14="http://schemas.microsoft.com/office/drawing/2010/main" xmlns:ma14="http://schemas.microsoft.com/office/mac/drawingml/2011/main" val="1"/>
+              <ma14:wrappingTextBoxFlag xmlns:ma14="http://schemas.microsoft.com/office/mac/drawingml/2011/main" xmlns:a14="http://schemas.microsoft.com/office/drawing/2010/main" xmlns:m="http://schemas.openxmlformats.org/officeDocument/2006/math" xmlns="" val="1"/>
             </a:ext>
           </a:extLst>
         </p:spPr>
@@ -10593,7 +10573,7 @@
           </a:ln>
           <a:extLst>
             <a:ext uri="{C572A759-6A51-4108-AA02-DFA0A04FC94B}">
-              <ma14:wrappingTextBoxFlag xmlns="" xmlns:m="http://schemas.openxmlformats.org/officeDocument/2006/math" xmlns:a14="http://schemas.microsoft.com/office/drawing/2010/main" xmlns:ma14="http://schemas.microsoft.com/office/mac/drawingml/2011/main" val="1"/>
+              <ma14:wrappingTextBoxFlag xmlns:ma14="http://schemas.microsoft.com/office/mac/drawingml/2011/main" xmlns:a14="http://schemas.microsoft.com/office/drawing/2010/main" xmlns:m="http://schemas.openxmlformats.org/officeDocument/2006/math" xmlns="" val="1"/>
             </a:ext>
           </a:extLst>
         </p:spPr>
@@ -10710,7 +10690,7 @@
           </a:ln>
           <a:extLst>
             <a:ext uri="{C572A759-6A51-4108-AA02-DFA0A04FC94B}">
-              <ma14:wrappingTextBoxFlag xmlns="" xmlns:m="http://schemas.openxmlformats.org/officeDocument/2006/math" xmlns:a14="http://schemas.microsoft.com/office/drawing/2010/main" xmlns:ma14="http://schemas.microsoft.com/office/mac/drawingml/2011/main" val="1"/>
+              <ma14:wrappingTextBoxFlag xmlns:ma14="http://schemas.microsoft.com/office/mac/drawingml/2011/main" xmlns:a14="http://schemas.microsoft.com/office/drawing/2010/main" xmlns:m="http://schemas.openxmlformats.org/officeDocument/2006/math" xmlns="" val="1"/>
             </a:ext>
           </a:extLst>
         </p:spPr>
@@ -10752,7 +10732,7 @@
           </a:ln>
           <a:extLst>
             <a:ext uri="{C572A759-6A51-4108-AA02-DFA0A04FC94B}">
-              <ma14:wrappingTextBoxFlag xmlns="" xmlns:m="http://schemas.openxmlformats.org/officeDocument/2006/math" xmlns:a14="http://schemas.microsoft.com/office/drawing/2010/main" xmlns:ma14="http://schemas.microsoft.com/office/mac/drawingml/2011/main" val="1"/>
+              <ma14:wrappingTextBoxFlag xmlns:ma14="http://schemas.microsoft.com/office/mac/drawingml/2011/main" xmlns:a14="http://schemas.microsoft.com/office/drawing/2010/main" xmlns:m="http://schemas.openxmlformats.org/officeDocument/2006/math" xmlns="" val="1"/>
             </a:ext>
           </a:extLst>
         </p:spPr>
@@ -10862,7 +10842,7 @@
           </a:ln>
           <a:extLst>
             <a:ext uri="{C572A759-6A51-4108-AA02-DFA0A04FC94B}">
-              <ma14:wrappingTextBoxFlag xmlns="" xmlns:m="http://schemas.openxmlformats.org/officeDocument/2006/math" xmlns:a14="http://schemas.microsoft.com/office/drawing/2010/main" xmlns:ma14="http://schemas.microsoft.com/office/mac/drawingml/2011/main" val="1"/>
+              <ma14:wrappingTextBoxFlag xmlns:ma14="http://schemas.microsoft.com/office/mac/drawingml/2011/main" xmlns:a14="http://schemas.microsoft.com/office/drawing/2010/main" xmlns:m="http://schemas.openxmlformats.org/officeDocument/2006/math" xmlns="" val="1"/>
             </a:ext>
           </a:extLst>
         </p:spPr>
@@ -11012,7 +10992,7 @@
           </a:ln>
           <a:extLst>
             <a:ext uri="{C572A759-6A51-4108-AA02-DFA0A04FC94B}">
-              <ma14:wrappingTextBoxFlag xmlns="" xmlns:m="http://schemas.openxmlformats.org/officeDocument/2006/math" xmlns:a14="http://schemas.microsoft.com/office/drawing/2010/main" xmlns:ma14="http://schemas.microsoft.com/office/mac/drawingml/2011/main" val="1"/>
+              <ma14:wrappingTextBoxFlag xmlns:ma14="http://schemas.microsoft.com/office/mac/drawingml/2011/main" xmlns:a14="http://schemas.microsoft.com/office/drawing/2010/main" xmlns:m="http://schemas.openxmlformats.org/officeDocument/2006/math" xmlns="" val="1"/>
             </a:ext>
           </a:extLst>
         </p:spPr>
@@ -11074,7 +11054,7 @@
           </a:effectLst>
           <a:extLst>
             <a:ext uri="{C572A759-6A51-4108-AA02-DFA0A04FC94B}">
-              <ma14:wrappingTextBoxFlag xmlns="" xmlns:m="http://schemas.openxmlformats.org/officeDocument/2006/math" xmlns:a14="http://schemas.microsoft.com/office/drawing/2010/main" xmlns:ma14="http://schemas.microsoft.com/office/mac/drawingml/2011/main" val="1"/>
+              <ma14:wrappingTextBoxFlag xmlns:ma14="http://schemas.microsoft.com/office/mac/drawingml/2011/main" xmlns:a14="http://schemas.microsoft.com/office/drawing/2010/main" xmlns:m="http://schemas.openxmlformats.org/officeDocument/2006/math" xmlns="" val="1"/>
             </a:ext>
           </a:extLst>
         </p:spPr>
@@ -11131,7 +11111,7 @@
           </a:effectLst>
           <a:extLst>
             <a:ext uri="{C572A759-6A51-4108-AA02-DFA0A04FC94B}">
-              <ma14:wrappingTextBoxFlag xmlns="" xmlns:m="http://schemas.openxmlformats.org/officeDocument/2006/math" xmlns:a14="http://schemas.microsoft.com/office/drawing/2010/main" xmlns:ma14="http://schemas.microsoft.com/office/mac/drawingml/2011/main" val="1"/>
+              <ma14:wrappingTextBoxFlag xmlns:ma14="http://schemas.microsoft.com/office/mac/drawingml/2011/main" xmlns:a14="http://schemas.microsoft.com/office/drawing/2010/main" xmlns:m="http://schemas.openxmlformats.org/officeDocument/2006/math" xmlns="" val="1"/>
             </a:ext>
           </a:extLst>
         </p:spPr>
@@ -11173,7 +11153,7 @@
           </a:ln>
           <a:extLst>
             <a:ext uri="{C572A759-6A51-4108-AA02-DFA0A04FC94B}">
-              <ma14:wrappingTextBoxFlag xmlns="" xmlns:m="http://schemas.openxmlformats.org/officeDocument/2006/math" xmlns:a14="http://schemas.microsoft.com/office/drawing/2010/main" xmlns:ma14="http://schemas.microsoft.com/office/mac/drawingml/2011/main" val="1"/>
+              <ma14:wrappingTextBoxFlag xmlns:ma14="http://schemas.microsoft.com/office/mac/drawingml/2011/main" xmlns:a14="http://schemas.microsoft.com/office/drawing/2010/main" xmlns:m="http://schemas.openxmlformats.org/officeDocument/2006/math" xmlns="" val="1"/>
             </a:ext>
           </a:extLst>
         </p:spPr>
@@ -11212,7 +11192,7 @@
           </a:ln>
           <a:extLst>
             <a:ext uri="{C572A759-6A51-4108-AA02-DFA0A04FC94B}">
-              <ma14:wrappingTextBoxFlag xmlns="" xmlns:m="http://schemas.openxmlformats.org/officeDocument/2006/math" xmlns:a14="http://schemas.microsoft.com/office/drawing/2010/main" xmlns:ma14="http://schemas.microsoft.com/office/mac/drawingml/2011/main" val="1"/>
+              <ma14:wrappingTextBoxFlag xmlns:ma14="http://schemas.microsoft.com/office/mac/drawingml/2011/main" xmlns:a14="http://schemas.microsoft.com/office/drawing/2010/main" xmlns:m="http://schemas.openxmlformats.org/officeDocument/2006/math" xmlns="" val="1"/>
             </a:ext>
           </a:extLst>
         </p:spPr>
@@ -11325,7 +11305,7 @@
           </a:ln>
           <a:extLst>
             <a:ext uri="{C572A759-6A51-4108-AA02-DFA0A04FC94B}">
-              <ma14:wrappingTextBoxFlag xmlns="" xmlns:m="http://schemas.openxmlformats.org/officeDocument/2006/math" xmlns:a14="http://schemas.microsoft.com/office/drawing/2010/main" xmlns:ma14="http://schemas.microsoft.com/office/mac/drawingml/2011/main" val="1"/>
+              <ma14:wrappingTextBoxFlag xmlns:ma14="http://schemas.microsoft.com/office/mac/drawingml/2011/main" xmlns:a14="http://schemas.microsoft.com/office/drawing/2010/main" xmlns:m="http://schemas.openxmlformats.org/officeDocument/2006/math" xmlns="" val="1"/>
             </a:ext>
           </a:extLst>
         </p:spPr>
@@ -11390,7 +11370,7 @@
           </a:ln>
           <a:extLst>
             <a:ext uri="{C572A759-6A51-4108-AA02-DFA0A04FC94B}">
-              <ma14:wrappingTextBoxFlag xmlns="" xmlns:m="http://schemas.openxmlformats.org/officeDocument/2006/math" xmlns:a14="http://schemas.microsoft.com/office/drawing/2010/main" xmlns:ma14="http://schemas.microsoft.com/office/mac/drawingml/2011/main" val="1"/>
+              <ma14:wrappingTextBoxFlag xmlns:ma14="http://schemas.microsoft.com/office/mac/drawingml/2011/main" xmlns:a14="http://schemas.microsoft.com/office/drawing/2010/main" xmlns:m="http://schemas.openxmlformats.org/officeDocument/2006/math" xmlns="" val="1"/>
             </a:ext>
           </a:extLst>
         </p:spPr>
@@ -11568,7 +11548,7 @@
           </a:ln>
           <a:extLst>
             <a:ext uri="{C572A759-6A51-4108-AA02-DFA0A04FC94B}">
-              <ma14:wrappingTextBoxFlag xmlns="" xmlns:m="http://schemas.openxmlformats.org/officeDocument/2006/math" xmlns:a14="http://schemas.microsoft.com/office/drawing/2010/main" xmlns:ma14="http://schemas.microsoft.com/office/mac/drawingml/2011/main" val="1"/>
+              <ma14:wrappingTextBoxFlag xmlns:ma14="http://schemas.microsoft.com/office/mac/drawingml/2011/main" xmlns:a14="http://schemas.microsoft.com/office/drawing/2010/main" xmlns:m="http://schemas.openxmlformats.org/officeDocument/2006/math" xmlns="" val="1"/>
             </a:ext>
           </a:extLst>
         </p:spPr>
@@ -11603,7 +11583,7 @@
           </a:ln>
           <a:extLst>
             <a:ext uri="{C572A759-6A51-4108-AA02-DFA0A04FC94B}">
-              <ma14:wrappingTextBoxFlag xmlns="" xmlns:m="http://schemas.openxmlformats.org/officeDocument/2006/math" xmlns:a14="http://schemas.microsoft.com/office/drawing/2010/main" xmlns:ma14="http://schemas.microsoft.com/office/mac/drawingml/2011/main" val="1"/>
+              <ma14:wrappingTextBoxFlag xmlns:ma14="http://schemas.microsoft.com/office/mac/drawingml/2011/main" xmlns:a14="http://schemas.microsoft.com/office/drawing/2010/main" xmlns:m="http://schemas.openxmlformats.org/officeDocument/2006/math" xmlns="" val="1"/>
             </a:ext>
           </a:extLst>
         </p:spPr>
@@ -11638,7 +11618,7 @@
           </a:ln>
           <a:extLst>
             <a:ext uri="{C572A759-6A51-4108-AA02-DFA0A04FC94B}">
-              <ma14:wrappingTextBoxFlag xmlns="" xmlns:m="http://schemas.openxmlformats.org/officeDocument/2006/math" xmlns:a14="http://schemas.microsoft.com/office/drawing/2010/main" xmlns:ma14="http://schemas.microsoft.com/office/mac/drawingml/2011/main" val="1"/>
+              <ma14:wrappingTextBoxFlag xmlns:ma14="http://schemas.microsoft.com/office/mac/drawingml/2011/main" xmlns:a14="http://schemas.microsoft.com/office/drawing/2010/main" xmlns:m="http://schemas.openxmlformats.org/officeDocument/2006/math" xmlns="" val="1"/>
             </a:ext>
           </a:extLst>
         </p:spPr>
@@ -11677,7 +11657,7 @@
           </a:ln>
           <a:extLst>
             <a:ext uri="{C572A759-6A51-4108-AA02-DFA0A04FC94B}">
-              <ma14:wrappingTextBoxFlag xmlns="" xmlns:m="http://schemas.openxmlformats.org/officeDocument/2006/math" xmlns:a14="http://schemas.microsoft.com/office/drawing/2010/main" xmlns:ma14="http://schemas.microsoft.com/office/mac/drawingml/2011/main" val="1"/>
+              <ma14:wrappingTextBoxFlag xmlns:ma14="http://schemas.microsoft.com/office/mac/drawingml/2011/main" xmlns:a14="http://schemas.microsoft.com/office/drawing/2010/main" xmlns:m="http://schemas.openxmlformats.org/officeDocument/2006/math" xmlns="" val="1"/>
             </a:ext>
           </a:extLst>
         </p:spPr>
@@ -11724,7 +11704,7 @@
           </a:ln>
           <a:extLst>
             <a:ext uri="{C572A759-6A51-4108-AA02-DFA0A04FC94B}">
-              <ma14:wrappingTextBoxFlag xmlns="" xmlns:m="http://schemas.openxmlformats.org/officeDocument/2006/math" xmlns:a14="http://schemas.microsoft.com/office/drawing/2010/main" xmlns:ma14="http://schemas.microsoft.com/office/mac/drawingml/2011/main" val="1"/>
+              <ma14:wrappingTextBoxFlag xmlns:ma14="http://schemas.microsoft.com/office/mac/drawingml/2011/main" xmlns:a14="http://schemas.microsoft.com/office/drawing/2010/main" xmlns:m="http://schemas.openxmlformats.org/officeDocument/2006/math" xmlns="" val="1"/>
             </a:ext>
           </a:extLst>
         </p:spPr>
@@ -11763,7 +11743,7 @@
           </a:ln>
           <a:extLst>
             <a:ext uri="{C572A759-6A51-4108-AA02-DFA0A04FC94B}">
-              <ma14:wrappingTextBoxFlag xmlns="" xmlns:m="http://schemas.openxmlformats.org/officeDocument/2006/math" xmlns:a14="http://schemas.microsoft.com/office/drawing/2010/main" xmlns:ma14="http://schemas.microsoft.com/office/mac/drawingml/2011/main" val="1"/>
+              <ma14:wrappingTextBoxFlag xmlns:ma14="http://schemas.microsoft.com/office/mac/drawingml/2011/main" xmlns:a14="http://schemas.microsoft.com/office/drawing/2010/main" xmlns:m="http://schemas.openxmlformats.org/officeDocument/2006/math" xmlns="" val="1"/>
             </a:ext>
           </a:extLst>
         </p:spPr>
@@ -11869,7 +11849,7 @@
           </a:ln>
           <a:extLst>
             <a:ext uri="{C572A759-6A51-4108-AA02-DFA0A04FC94B}">
-              <ma14:wrappingTextBoxFlag xmlns="" xmlns:m="http://schemas.openxmlformats.org/officeDocument/2006/math" xmlns:a14="http://schemas.microsoft.com/office/drawing/2010/main" xmlns:ma14="http://schemas.microsoft.com/office/mac/drawingml/2011/main" val="1"/>
+              <ma14:wrappingTextBoxFlag xmlns:ma14="http://schemas.microsoft.com/office/mac/drawingml/2011/main" xmlns:a14="http://schemas.microsoft.com/office/drawing/2010/main" xmlns:m="http://schemas.openxmlformats.org/officeDocument/2006/math" xmlns="" val="1"/>
             </a:ext>
           </a:extLst>
         </p:spPr>
@@ -11944,7 +11924,7 @@
           </a:ln>
           <a:extLst>
             <a:ext uri="{C572A759-6A51-4108-AA02-DFA0A04FC94B}">
-              <ma14:wrappingTextBoxFlag xmlns="" xmlns:m="http://schemas.openxmlformats.org/officeDocument/2006/math" xmlns:a14="http://schemas.microsoft.com/office/drawing/2010/main" xmlns:ma14="http://schemas.microsoft.com/office/mac/drawingml/2011/main" val="1"/>
+              <ma14:wrappingTextBoxFlag xmlns:ma14="http://schemas.microsoft.com/office/mac/drawingml/2011/main" xmlns:a14="http://schemas.microsoft.com/office/drawing/2010/main" xmlns:m="http://schemas.openxmlformats.org/officeDocument/2006/math" xmlns="" val="1"/>
             </a:ext>
           </a:extLst>
         </p:spPr>
@@ -12038,7 +12018,7 @@
           </a:ln>
           <a:extLst>
             <a:ext uri="{C572A759-6A51-4108-AA02-DFA0A04FC94B}">
-              <ma14:wrappingTextBoxFlag xmlns="" xmlns:m="http://schemas.openxmlformats.org/officeDocument/2006/math" xmlns:a14="http://schemas.microsoft.com/office/drawing/2010/main" xmlns:ma14="http://schemas.microsoft.com/office/mac/drawingml/2011/main" val="1"/>
+              <ma14:wrappingTextBoxFlag xmlns:ma14="http://schemas.microsoft.com/office/mac/drawingml/2011/main" xmlns:a14="http://schemas.microsoft.com/office/drawing/2010/main" xmlns:m="http://schemas.openxmlformats.org/officeDocument/2006/math" xmlns="" val="1"/>
             </a:ext>
           </a:extLst>
         </p:spPr>
@@ -12080,7 +12060,7 @@
           </a:ln>
           <a:extLst>
             <a:ext uri="{C572A759-6A51-4108-AA02-DFA0A04FC94B}">
-              <ma14:wrappingTextBoxFlag xmlns="" xmlns:m="http://schemas.openxmlformats.org/officeDocument/2006/math" xmlns:a14="http://schemas.microsoft.com/office/drawing/2010/main" xmlns:ma14="http://schemas.microsoft.com/office/mac/drawingml/2011/main" val="1"/>
+              <ma14:wrappingTextBoxFlag xmlns:ma14="http://schemas.microsoft.com/office/mac/drawingml/2011/main" xmlns:a14="http://schemas.microsoft.com/office/drawing/2010/main" xmlns:m="http://schemas.openxmlformats.org/officeDocument/2006/math" xmlns="" val="1"/>
             </a:ext>
           </a:extLst>
         </p:spPr>
@@ -12186,7 +12166,7 @@
           </a:ln>
           <a:extLst>
             <a:ext uri="{C572A759-6A51-4108-AA02-DFA0A04FC94B}">
-              <ma14:wrappingTextBoxFlag xmlns="" xmlns:m="http://schemas.openxmlformats.org/officeDocument/2006/math" xmlns:a14="http://schemas.microsoft.com/office/drawing/2010/main" xmlns:ma14="http://schemas.microsoft.com/office/mac/drawingml/2011/main" val="1"/>
+              <ma14:wrappingTextBoxFlag xmlns:ma14="http://schemas.microsoft.com/office/mac/drawingml/2011/main" xmlns:a14="http://schemas.microsoft.com/office/drawing/2010/main" xmlns:m="http://schemas.openxmlformats.org/officeDocument/2006/math" xmlns="" val="1"/>
             </a:ext>
           </a:extLst>
         </p:spPr>
@@ -12261,7 +12241,7 @@
           </a:ln>
           <a:extLst>
             <a:ext uri="{C572A759-6A51-4108-AA02-DFA0A04FC94B}">
-              <ma14:wrappingTextBoxFlag xmlns="" xmlns:m="http://schemas.openxmlformats.org/officeDocument/2006/math" xmlns:a14="http://schemas.microsoft.com/office/drawing/2010/main" xmlns:ma14="http://schemas.microsoft.com/office/mac/drawingml/2011/main" val="1"/>
+              <ma14:wrappingTextBoxFlag xmlns:ma14="http://schemas.microsoft.com/office/mac/drawingml/2011/main" xmlns:a14="http://schemas.microsoft.com/office/drawing/2010/main" xmlns:m="http://schemas.openxmlformats.org/officeDocument/2006/math" xmlns="" val="1"/>
             </a:ext>
           </a:extLst>
         </p:spPr>
@@ -12355,7 +12335,7 @@
           </a:ln>
           <a:extLst>
             <a:ext uri="{C572A759-6A51-4108-AA02-DFA0A04FC94B}">
-              <ma14:wrappingTextBoxFlag xmlns="" xmlns:m="http://schemas.openxmlformats.org/officeDocument/2006/math" xmlns:a14="http://schemas.microsoft.com/office/drawing/2010/main" xmlns:ma14="http://schemas.microsoft.com/office/mac/drawingml/2011/main" val="1"/>
+              <ma14:wrappingTextBoxFlag xmlns:ma14="http://schemas.microsoft.com/office/mac/drawingml/2011/main" xmlns:a14="http://schemas.microsoft.com/office/drawing/2010/main" xmlns:m="http://schemas.openxmlformats.org/officeDocument/2006/math" xmlns="" val="1"/>
             </a:ext>
           </a:extLst>
         </p:spPr>
@@ -12397,7 +12377,7 @@
           </a:ln>
           <a:extLst>
             <a:ext uri="{C572A759-6A51-4108-AA02-DFA0A04FC94B}">
-              <ma14:wrappingTextBoxFlag xmlns="" xmlns:m="http://schemas.openxmlformats.org/officeDocument/2006/math" xmlns:a14="http://schemas.microsoft.com/office/drawing/2010/main" xmlns:ma14="http://schemas.microsoft.com/office/mac/drawingml/2011/main" val="1"/>
+              <ma14:wrappingTextBoxFlag xmlns:ma14="http://schemas.microsoft.com/office/mac/drawingml/2011/main" xmlns:a14="http://schemas.microsoft.com/office/drawing/2010/main" xmlns:m="http://schemas.openxmlformats.org/officeDocument/2006/math" xmlns="" val="1"/>
             </a:ext>
           </a:extLst>
         </p:spPr>
@@ -12444,7 +12424,7 @@
           </a:ln>
           <a:extLst>
             <a:ext uri="{C572A759-6A51-4108-AA02-DFA0A04FC94B}">
-              <ma14:wrappingTextBoxFlag xmlns="" xmlns:m="http://schemas.openxmlformats.org/officeDocument/2006/math" xmlns:a14="http://schemas.microsoft.com/office/drawing/2010/main" xmlns:ma14="http://schemas.microsoft.com/office/mac/drawingml/2011/main" val="1"/>
+              <ma14:wrappingTextBoxFlag xmlns:ma14="http://schemas.microsoft.com/office/mac/drawingml/2011/main" xmlns:a14="http://schemas.microsoft.com/office/drawing/2010/main" xmlns:m="http://schemas.openxmlformats.org/officeDocument/2006/math" xmlns="" val="1"/>
             </a:ext>
           </a:extLst>
         </p:spPr>
@@ -12557,7 +12537,7 @@
           </a:ln>
           <a:extLst>
             <a:ext uri="{C572A759-6A51-4108-AA02-DFA0A04FC94B}">
-              <ma14:wrappingTextBoxFlag xmlns="" xmlns:m="http://schemas.openxmlformats.org/officeDocument/2006/math" xmlns:a14="http://schemas.microsoft.com/office/drawing/2010/main" xmlns:ma14="http://schemas.microsoft.com/office/mac/drawingml/2011/main" val="1"/>
+              <ma14:wrappingTextBoxFlag xmlns:ma14="http://schemas.microsoft.com/office/mac/drawingml/2011/main" xmlns:a14="http://schemas.microsoft.com/office/drawing/2010/main" xmlns:m="http://schemas.openxmlformats.org/officeDocument/2006/math" xmlns="" val="1"/>
             </a:ext>
           </a:extLst>
         </p:spPr>
@@ -12639,7 +12619,7 @@
           </a:ln>
           <a:extLst>
             <a:ext uri="{C572A759-6A51-4108-AA02-DFA0A04FC94B}">
-              <ma14:wrappingTextBoxFlag xmlns="" xmlns:m="http://schemas.openxmlformats.org/officeDocument/2006/math" xmlns:a14="http://schemas.microsoft.com/office/drawing/2010/main" xmlns:ma14="http://schemas.microsoft.com/office/mac/drawingml/2011/main" val="1"/>
+              <ma14:wrappingTextBoxFlag xmlns:ma14="http://schemas.microsoft.com/office/mac/drawingml/2011/main" xmlns:a14="http://schemas.microsoft.com/office/drawing/2010/main" xmlns:m="http://schemas.openxmlformats.org/officeDocument/2006/math" xmlns="" val="1"/>
             </a:ext>
           </a:extLst>
         </p:spPr>
@@ -12721,7 +12701,7 @@
           </a:ln>
           <a:extLst>
             <a:ext uri="{C572A759-6A51-4108-AA02-DFA0A04FC94B}">
-              <ma14:wrappingTextBoxFlag xmlns="" xmlns:m="http://schemas.openxmlformats.org/officeDocument/2006/math" xmlns:a14="http://schemas.microsoft.com/office/drawing/2010/main" xmlns:ma14="http://schemas.microsoft.com/office/mac/drawingml/2011/main" val="1"/>
+              <ma14:wrappingTextBoxFlag xmlns:ma14="http://schemas.microsoft.com/office/mac/drawingml/2011/main" xmlns:a14="http://schemas.microsoft.com/office/drawing/2010/main" xmlns:m="http://schemas.openxmlformats.org/officeDocument/2006/math" xmlns="" val="1"/>
             </a:ext>
           </a:extLst>
         </p:spPr>
@@ -12760,7 +12740,7 @@
           </a:ln>
           <a:extLst>
             <a:ext uri="{C572A759-6A51-4108-AA02-DFA0A04FC94B}">
-              <ma14:wrappingTextBoxFlag xmlns="" xmlns:m="http://schemas.openxmlformats.org/officeDocument/2006/math" xmlns:a14="http://schemas.microsoft.com/office/drawing/2010/main" xmlns:ma14="http://schemas.microsoft.com/office/mac/drawingml/2011/main" val="1"/>
+              <ma14:wrappingTextBoxFlag xmlns:ma14="http://schemas.microsoft.com/office/mac/drawingml/2011/main" xmlns:a14="http://schemas.microsoft.com/office/drawing/2010/main" xmlns:m="http://schemas.openxmlformats.org/officeDocument/2006/math" xmlns="" val="1"/>
             </a:ext>
           </a:extLst>
         </p:spPr>
@@ -12885,7 +12865,7 @@
           </a:ln>
           <a:extLst>
             <a:ext uri="{C572A759-6A51-4108-AA02-DFA0A04FC94B}">
-              <ma14:wrappingTextBoxFlag xmlns="" xmlns:m="http://schemas.openxmlformats.org/officeDocument/2006/math" xmlns:a14="http://schemas.microsoft.com/office/drawing/2010/main" xmlns:ma14="http://schemas.microsoft.com/office/mac/drawingml/2011/main" val="1"/>
+              <ma14:wrappingTextBoxFlag xmlns:ma14="http://schemas.microsoft.com/office/mac/drawingml/2011/main" xmlns:a14="http://schemas.microsoft.com/office/drawing/2010/main" xmlns:m="http://schemas.openxmlformats.org/officeDocument/2006/math" xmlns="" val="1"/>
             </a:ext>
           </a:extLst>
         </p:spPr>
@@ -12924,7 +12904,7 @@
           </a:ln>
           <a:extLst>
             <a:ext uri="{C572A759-6A51-4108-AA02-DFA0A04FC94B}">
-              <ma14:wrappingTextBoxFlag xmlns="" xmlns:m="http://schemas.openxmlformats.org/officeDocument/2006/math" xmlns:a14="http://schemas.microsoft.com/office/drawing/2010/main" xmlns:ma14="http://schemas.microsoft.com/office/mac/drawingml/2011/main" val="1"/>
+              <ma14:wrappingTextBoxFlag xmlns:ma14="http://schemas.microsoft.com/office/mac/drawingml/2011/main" xmlns:a14="http://schemas.microsoft.com/office/drawing/2010/main" xmlns:m="http://schemas.openxmlformats.org/officeDocument/2006/math" xmlns="" val="1"/>
             </a:ext>
           </a:extLst>
         </p:spPr>
@@ -13012,7 +12992,7 @@
           </a:ln>
           <a:extLst>
             <a:ext uri="{C572A759-6A51-4108-AA02-DFA0A04FC94B}">
-              <ma14:wrappingTextBoxFlag xmlns="" xmlns:m="http://schemas.openxmlformats.org/officeDocument/2006/math" xmlns:a14="http://schemas.microsoft.com/office/drawing/2010/main" xmlns:ma14="http://schemas.microsoft.com/office/mac/drawingml/2011/main" val="1"/>
+              <ma14:wrappingTextBoxFlag xmlns:ma14="http://schemas.microsoft.com/office/mac/drawingml/2011/main" xmlns:a14="http://schemas.microsoft.com/office/drawing/2010/main" xmlns:m="http://schemas.openxmlformats.org/officeDocument/2006/math" xmlns="" val="1"/>
             </a:ext>
           </a:extLst>
         </p:spPr>
@@ -13055,7 +13035,7 @@
           </a:ln>
           <a:extLst>
             <a:ext uri="{C572A759-6A51-4108-AA02-DFA0A04FC94B}">
-              <ma14:wrappingTextBoxFlag xmlns="" xmlns:m="http://schemas.openxmlformats.org/officeDocument/2006/math" xmlns:a14="http://schemas.microsoft.com/office/drawing/2010/main" xmlns:ma14="http://schemas.microsoft.com/office/mac/drawingml/2011/main" val="1"/>
+              <ma14:wrappingTextBoxFlag xmlns:ma14="http://schemas.microsoft.com/office/mac/drawingml/2011/main" xmlns:a14="http://schemas.microsoft.com/office/drawing/2010/main" xmlns:m="http://schemas.openxmlformats.org/officeDocument/2006/math" xmlns="" val="1"/>
             </a:ext>
           </a:extLst>
         </p:spPr>
@@ -13098,7 +13078,7 @@
           </a:ln>
           <a:extLst>
             <a:ext uri="{C572A759-6A51-4108-AA02-DFA0A04FC94B}">
-              <ma14:wrappingTextBoxFlag xmlns="" xmlns:m="http://schemas.openxmlformats.org/officeDocument/2006/math" xmlns:a14="http://schemas.microsoft.com/office/drawing/2010/main" xmlns:ma14="http://schemas.microsoft.com/office/mac/drawingml/2011/main" val="1"/>
+              <ma14:wrappingTextBoxFlag xmlns:ma14="http://schemas.microsoft.com/office/mac/drawingml/2011/main" xmlns:a14="http://schemas.microsoft.com/office/drawing/2010/main" xmlns:m="http://schemas.openxmlformats.org/officeDocument/2006/math" xmlns="" val="1"/>
             </a:ext>
           </a:extLst>
         </p:spPr>
@@ -13141,7 +13121,7 @@
           </a:ln>
           <a:extLst>
             <a:ext uri="{C572A759-6A51-4108-AA02-DFA0A04FC94B}">
-              <ma14:wrappingTextBoxFlag xmlns="" xmlns:m="http://schemas.openxmlformats.org/officeDocument/2006/math" xmlns:a14="http://schemas.microsoft.com/office/drawing/2010/main" xmlns:ma14="http://schemas.microsoft.com/office/mac/drawingml/2011/main" val="1"/>
+              <ma14:wrappingTextBoxFlag xmlns:ma14="http://schemas.microsoft.com/office/mac/drawingml/2011/main" xmlns:a14="http://schemas.microsoft.com/office/drawing/2010/main" xmlns:m="http://schemas.openxmlformats.org/officeDocument/2006/math" xmlns="" val="1"/>
             </a:ext>
           </a:extLst>
         </p:spPr>
@@ -13184,7 +13164,7 @@
           </a:ln>
           <a:extLst>
             <a:ext uri="{C572A759-6A51-4108-AA02-DFA0A04FC94B}">
-              <ma14:wrappingTextBoxFlag xmlns="" xmlns:m="http://schemas.openxmlformats.org/officeDocument/2006/math" xmlns:a14="http://schemas.microsoft.com/office/drawing/2010/main" xmlns:ma14="http://schemas.microsoft.com/office/mac/drawingml/2011/main" val="1"/>
+              <ma14:wrappingTextBoxFlag xmlns:ma14="http://schemas.microsoft.com/office/mac/drawingml/2011/main" xmlns:a14="http://schemas.microsoft.com/office/drawing/2010/main" xmlns:m="http://schemas.openxmlformats.org/officeDocument/2006/math" xmlns="" val="1"/>
             </a:ext>
           </a:extLst>
         </p:spPr>
@@ -13227,7 +13207,7 @@
           </a:ln>
           <a:extLst>
             <a:ext uri="{C572A759-6A51-4108-AA02-DFA0A04FC94B}">
-              <ma14:wrappingTextBoxFlag xmlns="" xmlns:m="http://schemas.openxmlformats.org/officeDocument/2006/math" xmlns:a14="http://schemas.microsoft.com/office/drawing/2010/main" xmlns:ma14="http://schemas.microsoft.com/office/mac/drawingml/2011/main" val="1"/>
+              <ma14:wrappingTextBoxFlag xmlns:ma14="http://schemas.microsoft.com/office/mac/drawingml/2011/main" xmlns:a14="http://schemas.microsoft.com/office/drawing/2010/main" xmlns:m="http://schemas.openxmlformats.org/officeDocument/2006/math" xmlns="" val="1"/>
             </a:ext>
           </a:extLst>
         </p:spPr>
@@ -13270,7 +13250,7 @@
           </a:ln>
           <a:extLst>
             <a:ext uri="{C572A759-6A51-4108-AA02-DFA0A04FC94B}">
-              <ma14:wrappingTextBoxFlag xmlns="" xmlns:m="http://schemas.openxmlformats.org/officeDocument/2006/math" xmlns:a14="http://schemas.microsoft.com/office/drawing/2010/main" xmlns:ma14="http://schemas.microsoft.com/office/mac/drawingml/2011/main" val="1"/>
+              <ma14:wrappingTextBoxFlag xmlns:ma14="http://schemas.microsoft.com/office/mac/drawingml/2011/main" xmlns:a14="http://schemas.microsoft.com/office/drawing/2010/main" xmlns:m="http://schemas.openxmlformats.org/officeDocument/2006/math" xmlns="" val="1"/>
             </a:ext>
           </a:extLst>
         </p:spPr>
@@ -13307,7 +13287,7 @@
           </a:ln>
           <a:extLst>
             <a:ext uri="{C572A759-6A51-4108-AA02-DFA0A04FC94B}">
-              <ma14:wrappingTextBoxFlag xmlns="" xmlns:m="http://schemas.openxmlformats.org/officeDocument/2006/math" xmlns:a14="http://schemas.microsoft.com/office/drawing/2010/main" xmlns:ma14="http://schemas.microsoft.com/office/mac/drawingml/2011/main" val="1"/>
+              <ma14:wrappingTextBoxFlag xmlns:ma14="http://schemas.microsoft.com/office/mac/drawingml/2011/main" xmlns:a14="http://schemas.microsoft.com/office/drawing/2010/main" xmlns:m="http://schemas.openxmlformats.org/officeDocument/2006/math" xmlns="" val="1"/>
             </a:ext>
           </a:extLst>
         </p:spPr>
@@ -13346,7 +13326,7 @@
           </a:ln>
           <a:extLst>
             <a:ext uri="{C572A759-6A51-4108-AA02-DFA0A04FC94B}">
-              <ma14:wrappingTextBoxFlag xmlns="" xmlns:m="http://schemas.openxmlformats.org/officeDocument/2006/math" xmlns:a14="http://schemas.microsoft.com/office/drawing/2010/main" xmlns:ma14="http://schemas.microsoft.com/office/mac/drawingml/2011/main" val="1"/>
+              <ma14:wrappingTextBoxFlag xmlns:ma14="http://schemas.microsoft.com/office/mac/drawingml/2011/main" xmlns:a14="http://schemas.microsoft.com/office/drawing/2010/main" xmlns:m="http://schemas.openxmlformats.org/officeDocument/2006/math" xmlns="" val="1"/>
             </a:ext>
           </a:extLst>
         </p:spPr>
@@ -13391,7 +13371,7 @@
           </a:ln>
           <a:extLst>
             <a:ext uri="{C572A759-6A51-4108-AA02-DFA0A04FC94B}">
-              <ma14:wrappingTextBoxFlag xmlns="" xmlns:m="http://schemas.openxmlformats.org/officeDocument/2006/math" xmlns:a14="http://schemas.microsoft.com/office/drawing/2010/main" xmlns:ma14="http://schemas.microsoft.com/office/mac/drawingml/2011/main" val="1"/>
+              <ma14:wrappingTextBoxFlag xmlns:ma14="http://schemas.microsoft.com/office/mac/drawingml/2011/main" xmlns:a14="http://schemas.microsoft.com/office/drawing/2010/main" xmlns:m="http://schemas.openxmlformats.org/officeDocument/2006/math" xmlns="" val="1"/>
             </a:ext>
           </a:extLst>
         </p:spPr>
@@ -13434,7 +13414,7 @@
           </a:ln>
           <a:extLst>
             <a:ext uri="{C572A759-6A51-4108-AA02-DFA0A04FC94B}">
-              <ma14:wrappingTextBoxFlag xmlns="" xmlns:m="http://schemas.openxmlformats.org/officeDocument/2006/math" xmlns:a14="http://schemas.microsoft.com/office/drawing/2010/main" xmlns:ma14="http://schemas.microsoft.com/office/mac/drawingml/2011/main" val="1"/>
+              <ma14:wrappingTextBoxFlag xmlns:ma14="http://schemas.microsoft.com/office/mac/drawingml/2011/main" xmlns:a14="http://schemas.microsoft.com/office/drawing/2010/main" xmlns:m="http://schemas.openxmlformats.org/officeDocument/2006/math" xmlns="" val="1"/>
             </a:ext>
           </a:extLst>
         </p:spPr>
@@ -13541,7 +13521,7 @@
           </a:ln>
           <a:extLst>
             <a:ext uri="{C572A759-6A51-4108-AA02-DFA0A04FC94B}">
-              <ma14:wrappingTextBoxFlag xmlns="" xmlns:m="http://schemas.openxmlformats.org/officeDocument/2006/math" xmlns:a14="http://schemas.microsoft.com/office/drawing/2010/main" xmlns:ma14="http://schemas.microsoft.com/office/mac/drawingml/2011/main" val="1"/>
+              <ma14:wrappingTextBoxFlag xmlns:ma14="http://schemas.microsoft.com/office/mac/drawingml/2011/main" xmlns:a14="http://schemas.microsoft.com/office/drawing/2010/main" xmlns:m="http://schemas.openxmlformats.org/officeDocument/2006/math" xmlns="" val="1"/>
             </a:ext>
           </a:extLst>
         </p:spPr>
@@ -13580,7 +13560,7 @@
           </a:ln>
           <a:extLst>
             <a:ext uri="{C572A759-6A51-4108-AA02-DFA0A04FC94B}">
-              <ma14:wrappingTextBoxFlag xmlns="" xmlns:m="http://schemas.openxmlformats.org/officeDocument/2006/math" xmlns:a14="http://schemas.microsoft.com/office/drawing/2010/main" xmlns:ma14="http://schemas.microsoft.com/office/mac/drawingml/2011/main" val="1"/>
+              <ma14:wrappingTextBoxFlag xmlns:ma14="http://schemas.microsoft.com/office/mac/drawingml/2011/main" xmlns:a14="http://schemas.microsoft.com/office/drawing/2010/main" xmlns:m="http://schemas.openxmlformats.org/officeDocument/2006/math" xmlns="" val="1"/>
             </a:ext>
           </a:extLst>
         </p:spPr>
@@ -13619,7 +13599,7 @@
           </a:ln>
           <a:extLst>
             <a:ext uri="{C572A759-6A51-4108-AA02-DFA0A04FC94B}">
-              <ma14:wrappingTextBoxFlag xmlns="" xmlns:m="http://schemas.openxmlformats.org/officeDocument/2006/math" xmlns:a14="http://schemas.microsoft.com/office/drawing/2010/main" xmlns:ma14="http://schemas.microsoft.com/office/mac/drawingml/2011/main" val="1"/>
+              <ma14:wrappingTextBoxFlag xmlns:ma14="http://schemas.microsoft.com/office/mac/drawingml/2011/main" xmlns:a14="http://schemas.microsoft.com/office/drawing/2010/main" xmlns:m="http://schemas.openxmlformats.org/officeDocument/2006/math" xmlns="" val="1"/>
             </a:ext>
           </a:extLst>
         </p:spPr>
@@ -14235,7 +14215,7 @@
           </a:ln>
           <a:extLst>
             <a:ext uri="{C572A759-6A51-4108-AA02-DFA0A04FC94B}">
-              <ma14:wrappingTextBoxFlag xmlns="" xmlns:m="http://schemas.openxmlformats.org/officeDocument/2006/math" xmlns:a14="http://schemas.microsoft.com/office/drawing/2010/main" xmlns:ma14="http://schemas.microsoft.com/office/mac/drawingml/2011/main" val="1"/>
+              <ma14:wrappingTextBoxFlag xmlns:ma14="http://schemas.microsoft.com/office/mac/drawingml/2011/main" xmlns:a14="http://schemas.microsoft.com/office/drawing/2010/main" xmlns:m="http://schemas.openxmlformats.org/officeDocument/2006/math" xmlns="" val="1"/>
             </a:ext>
           </a:extLst>
         </p:spPr>
@@ -14278,7 +14258,7 @@
           </a:ln>
           <a:extLst>
             <a:ext uri="{C572A759-6A51-4108-AA02-DFA0A04FC94B}">
-              <ma14:wrappingTextBoxFlag xmlns="" xmlns:m="http://schemas.openxmlformats.org/officeDocument/2006/math" xmlns:a14="http://schemas.microsoft.com/office/drawing/2010/main" xmlns:ma14="http://schemas.microsoft.com/office/mac/drawingml/2011/main" val="1"/>
+              <ma14:wrappingTextBoxFlag xmlns:ma14="http://schemas.microsoft.com/office/mac/drawingml/2011/main" xmlns:a14="http://schemas.microsoft.com/office/drawing/2010/main" xmlns:m="http://schemas.openxmlformats.org/officeDocument/2006/math" xmlns="" val="1"/>
             </a:ext>
           </a:extLst>
         </p:spPr>
@@ -14321,7 +14301,7 @@
           </a:ln>
           <a:extLst>
             <a:ext uri="{C572A759-6A51-4108-AA02-DFA0A04FC94B}">
-              <ma14:wrappingTextBoxFlag xmlns="" xmlns:m="http://schemas.openxmlformats.org/officeDocument/2006/math" xmlns:a14="http://schemas.microsoft.com/office/drawing/2010/main" xmlns:ma14="http://schemas.microsoft.com/office/mac/drawingml/2011/main" val="1"/>
+              <ma14:wrappingTextBoxFlag xmlns:ma14="http://schemas.microsoft.com/office/mac/drawingml/2011/main" xmlns:a14="http://schemas.microsoft.com/office/drawing/2010/main" xmlns:m="http://schemas.openxmlformats.org/officeDocument/2006/math" xmlns="" val="1"/>
             </a:ext>
           </a:extLst>
         </p:spPr>
@@ -14364,7 +14344,7 @@
           </a:ln>
           <a:extLst>
             <a:ext uri="{C572A759-6A51-4108-AA02-DFA0A04FC94B}">
-              <ma14:wrappingTextBoxFlag xmlns="" xmlns:m="http://schemas.openxmlformats.org/officeDocument/2006/math" xmlns:a14="http://schemas.microsoft.com/office/drawing/2010/main" xmlns:ma14="http://schemas.microsoft.com/office/mac/drawingml/2011/main" val="1"/>
+              <ma14:wrappingTextBoxFlag xmlns:ma14="http://schemas.microsoft.com/office/mac/drawingml/2011/main" xmlns:a14="http://schemas.microsoft.com/office/drawing/2010/main" xmlns:m="http://schemas.openxmlformats.org/officeDocument/2006/math" xmlns="" val="1"/>
             </a:ext>
           </a:extLst>
         </p:spPr>
@@ -14407,7 +14387,7 @@
           </a:ln>
           <a:extLst>
             <a:ext uri="{C572A759-6A51-4108-AA02-DFA0A04FC94B}">
-              <ma14:wrappingTextBoxFlag xmlns="" xmlns:m="http://schemas.openxmlformats.org/officeDocument/2006/math" xmlns:a14="http://schemas.microsoft.com/office/drawing/2010/main" xmlns:ma14="http://schemas.microsoft.com/office/mac/drawingml/2011/main" val="1"/>
+              <ma14:wrappingTextBoxFlag xmlns:ma14="http://schemas.microsoft.com/office/mac/drawingml/2011/main" xmlns:a14="http://schemas.microsoft.com/office/drawing/2010/main" xmlns:m="http://schemas.openxmlformats.org/officeDocument/2006/math" xmlns="" val="1"/>
             </a:ext>
           </a:extLst>
         </p:spPr>
@@ -14450,7 +14430,7 @@
           </a:ln>
           <a:extLst>
             <a:ext uri="{C572A759-6A51-4108-AA02-DFA0A04FC94B}">
-              <ma14:wrappingTextBoxFlag xmlns="" xmlns:m="http://schemas.openxmlformats.org/officeDocument/2006/math" xmlns:a14="http://schemas.microsoft.com/office/drawing/2010/main" xmlns:ma14="http://schemas.microsoft.com/office/mac/drawingml/2011/main" val="1"/>
+              <ma14:wrappingTextBoxFlag xmlns:ma14="http://schemas.microsoft.com/office/mac/drawingml/2011/main" xmlns:a14="http://schemas.microsoft.com/office/drawing/2010/main" xmlns:m="http://schemas.openxmlformats.org/officeDocument/2006/math" xmlns="" val="1"/>
             </a:ext>
           </a:extLst>
         </p:spPr>
@@ -14583,7 +14563,7 @@
           </a:ln>
           <a:extLst>
             <a:ext uri="{C572A759-6A51-4108-AA02-DFA0A04FC94B}">
-              <ma14:wrappingTextBoxFlag xmlns="" xmlns:m="http://schemas.openxmlformats.org/officeDocument/2006/math" xmlns:a14="http://schemas.microsoft.com/office/drawing/2010/main" xmlns:ma14="http://schemas.microsoft.com/office/mac/drawingml/2011/main" val="1"/>
+              <ma14:wrappingTextBoxFlag xmlns:ma14="http://schemas.microsoft.com/office/mac/drawingml/2011/main" xmlns:a14="http://schemas.microsoft.com/office/drawing/2010/main" xmlns:m="http://schemas.openxmlformats.org/officeDocument/2006/math" xmlns="" val="1"/>
             </a:ext>
           </a:extLst>
         </p:spPr>
@@ -14716,7 +14696,7 @@
           </a:ln>
           <a:extLst>
             <a:ext uri="{C572A759-6A51-4108-AA02-DFA0A04FC94B}">
-              <ma14:wrappingTextBoxFlag xmlns="" xmlns:m="http://schemas.openxmlformats.org/officeDocument/2006/math" xmlns:a14="http://schemas.microsoft.com/office/drawing/2010/main" xmlns:ma14="http://schemas.microsoft.com/office/mac/drawingml/2011/main" val="1"/>
+              <ma14:wrappingTextBoxFlag xmlns:ma14="http://schemas.microsoft.com/office/mac/drawingml/2011/main" xmlns:a14="http://schemas.microsoft.com/office/drawing/2010/main" xmlns:m="http://schemas.openxmlformats.org/officeDocument/2006/math" xmlns="" val="1"/>
             </a:ext>
           </a:extLst>
         </p:spPr>
@@ -14932,7 +14912,7 @@
           </a:ln>
           <a:extLst>
             <a:ext uri="{C572A759-6A51-4108-AA02-DFA0A04FC94B}">
-              <ma14:wrappingTextBoxFlag xmlns="" xmlns:m="http://schemas.openxmlformats.org/officeDocument/2006/math" xmlns:a14="http://schemas.microsoft.com/office/drawing/2010/main" xmlns:ma14="http://schemas.microsoft.com/office/mac/drawingml/2011/main" val="1"/>
+              <ma14:wrappingTextBoxFlag xmlns:ma14="http://schemas.microsoft.com/office/mac/drawingml/2011/main" xmlns:a14="http://schemas.microsoft.com/office/drawing/2010/main" xmlns:m="http://schemas.openxmlformats.org/officeDocument/2006/math" xmlns="" val="1"/>
             </a:ext>
           </a:extLst>
         </p:spPr>
@@ -14967,7 +14947,7 @@
           </a:ln>
           <a:extLst>
             <a:ext uri="{C572A759-6A51-4108-AA02-DFA0A04FC94B}">
-              <ma14:wrappingTextBoxFlag xmlns="" xmlns:m="http://schemas.openxmlformats.org/officeDocument/2006/math" xmlns:a14="http://schemas.microsoft.com/office/drawing/2010/main" xmlns:ma14="http://schemas.microsoft.com/office/mac/drawingml/2011/main" val="1"/>
+              <ma14:wrappingTextBoxFlag xmlns:ma14="http://schemas.microsoft.com/office/mac/drawingml/2011/main" xmlns:a14="http://schemas.microsoft.com/office/drawing/2010/main" xmlns:m="http://schemas.openxmlformats.org/officeDocument/2006/math" xmlns="" val="1"/>
             </a:ext>
           </a:extLst>
         </p:spPr>
@@ -15136,7 +15116,7 @@
           </a:ln>
           <a:extLst>
             <a:ext uri="{C572A759-6A51-4108-AA02-DFA0A04FC94B}">
-              <ma14:wrappingTextBoxFlag xmlns="" xmlns:m="http://schemas.openxmlformats.org/officeDocument/2006/math" xmlns:a14="http://schemas.microsoft.com/office/drawing/2010/main" xmlns:ma14="http://schemas.microsoft.com/office/mac/drawingml/2011/main" val="1"/>
+              <ma14:wrappingTextBoxFlag xmlns:ma14="http://schemas.microsoft.com/office/mac/drawingml/2011/main" xmlns:a14="http://schemas.microsoft.com/office/drawing/2010/main" xmlns:m="http://schemas.openxmlformats.org/officeDocument/2006/math" xmlns="" val="1"/>
             </a:ext>
           </a:extLst>
         </p:spPr>
@@ -15230,7 +15210,7 @@
           </a:ln>
           <a:extLst>
             <a:ext uri="{C572A759-6A51-4108-AA02-DFA0A04FC94B}">
-              <ma14:wrappingTextBoxFlag xmlns="" xmlns:m="http://schemas.openxmlformats.org/officeDocument/2006/math" xmlns:a14="http://schemas.microsoft.com/office/drawing/2010/main" xmlns:ma14="http://schemas.microsoft.com/office/mac/drawingml/2011/main" val="1"/>
+              <ma14:wrappingTextBoxFlag xmlns:ma14="http://schemas.microsoft.com/office/mac/drawingml/2011/main" xmlns:a14="http://schemas.microsoft.com/office/drawing/2010/main" xmlns:m="http://schemas.openxmlformats.org/officeDocument/2006/math" xmlns="" val="1"/>
             </a:ext>
           </a:extLst>
         </p:spPr>
@@ -15272,7 +15252,7 @@
           </a:ln>
           <a:extLst>
             <a:ext uri="{C572A759-6A51-4108-AA02-DFA0A04FC94B}">
-              <ma14:wrappingTextBoxFlag xmlns="" xmlns:m="http://schemas.openxmlformats.org/officeDocument/2006/math" xmlns:a14="http://schemas.microsoft.com/office/drawing/2010/main" xmlns:ma14="http://schemas.microsoft.com/office/mac/drawingml/2011/main" val="1"/>
+              <ma14:wrappingTextBoxFlag xmlns:ma14="http://schemas.microsoft.com/office/mac/drawingml/2011/main" xmlns:a14="http://schemas.microsoft.com/office/drawing/2010/main" xmlns:m="http://schemas.openxmlformats.org/officeDocument/2006/math" xmlns="" val="1"/>
             </a:ext>
           </a:extLst>
         </p:spPr>
@@ -15319,7 +15299,7 @@
           </a:ln>
           <a:extLst>
             <a:ext uri="{C572A759-6A51-4108-AA02-DFA0A04FC94B}">
-              <ma14:wrappingTextBoxFlag xmlns="" xmlns:m="http://schemas.openxmlformats.org/officeDocument/2006/math" xmlns:a14="http://schemas.microsoft.com/office/drawing/2010/main" xmlns:ma14="http://schemas.microsoft.com/office/mac/drawingml/2011/main" val="1"/>
+              <ma14:wrappingTextBoxFlag xmlns:ma14="http://schemas.microsoft.com/office/mac/drawingml/2011/main" xmlns:a14="http://schemas.microsoft.com/office/drawing/2010/main" xmlns:m="http://schemas.openxmlformats.org/officeDocument/2006/math" xmlns="" val="1"/>
             </a:ext>
           </a:extLst>
         </p:spPr>
@@ -15363,7 +15343,7 @@
           </a:ln>
           <a:extLst>
             <a:ext uri="{C572A759-6A51-4108-AA02-DFA0A04FC94B}">
-              <ma14:wrappingTextBoxFlag xmlns="" xmlns:m="http://schemas.openxmlformats.org/officeDocument/2006/math" xmlns:a14="http://schemas.microsoft.com/office/drawing/2010/main" xmlns:ma14="http://schemas.microsoft.com/office/mac/drawingml/2011/main" val="1"/>
+              <ma14:wrappingTextBoxFlag xmlns:ma14="http://schemas.microsoft.com/office/mac/drawingml/2011/main" xmlns:a14="http://schemas.microsoft.com/office/drawing/2010/main" xmlns:m="http://schemas.openxmlformats.org/officeDocument/2006/math" xmlns="" val="1"/>
             </a:ext>
           </a:extLst>
         </p:spPr>
@@ -15476,7 +15456,7 @@
           </a:ln>
           <a:extLst>
             <a:ext uri="{C572A759-6A51-4108-AA02-DFA0A04FC94B}">
-              <ma14:wrappingTextBoxFlag xmlns="" xmlns:m="http://schemas.openxmlformats.org/officeDocument/2006/math" xmlns:a14="http://schemas.microsoft.com/office/drawing/2010/main" xmlns:ma14="http://schemas.microsoft.com/office/mac/drawingml/2011/main" val="1"/>
+              <ma14:wrappingTextBoxFlag xmlns:ma14="http://schemas.microsoft.com/office/mac/drawingml/2011/main" xmlns:a14="http://schemas.microsoft.com/office/drawing/2010/main" xmlns:m="http://schemas.openxmlformats.org/officeDocument/2006/math" xmlns="" val="1"/>
             </a:ext>
           </a:extLst>
         </p:spPr>
@@ -15645,7 +15625,7 @@
           </a:ln>
           <a:extLst>
             <a:ext uri="{C572A759-6A51-4108-AA02-DFA0A04FC94B}">
-              <ma14:wrappingTextBoxFlag xmlns="" xmlns:m="http://schemas.openxmlformats.org/officeDocument/2006/math" xmlns:a14="http://schemas.microsoft.com/office/drawing/2010/main" xmlns:ma14="http://schemas.microsoft.com/office/mac/drawingml/2011/main" val="1"/>
+              <ma14:wrappingTextBoxFlag xmlns:ma14="http://schemas.microsoft.com/office/mac/drawingml/2011/main" xmlns:a14="http://schemas.microsoft.com/office/drawing/2010/main" xmlns:m="http://schemas.openxmlformats.org/officeDocument/2006/math" xmlns="" val="1"/>
             </a:ext>
           </a:extLst>
         </p:spPr>
@@ -15680,7 +15660,7 @@
           </a:ln>
           <a:extLst>
             <a:ext uri="{C572A759-6A51-4108-AA02-DFA0A04FC94B}">
-              <ma14:wrappingTextBoxFlag xmlns="" xmlns:m="http://schemas.openxmlformats.org/officeDocument/2006/math" xmlns:a14="http://schemas.microsoft.com/office/drawing/2010/main" xmlns:ma14="http://schemas.microsoft.com/office/mac/drawingml/2011/main" val="1"/>
+              <ma14:wrappingTextBoxFlag xmlns:ma14="http://schemas.microsoft.com/office/mac/drawingml/2011/main" xmlns:a14="http://schemas.microsoft.com/office/drawing/2010/main" xmlns:m="http://schemas.openxmlformats.org/officeDocument/2006/math" xmlns="" val="1"/>
             </a:ext>
           </a:extLst>
         </p:spPr>
@@ -15849,7 +15829,7 @@
           </a:ln>
           <a:extLst>
             <a:ext uri="{C572A759-6A51-4108-AA02-DFA0A04FC94B}">
-              <ma14:wrappingTextBoxFlag xmlns="" xmlns:m="http://schemas.openxmlformats.org/officeDocument/2006/math" xmlns:a14="http://schemas.microsoft.com/office/drawing/2010/main" xmlns:ma14="http://schemas.microsoft.com/office/mac/drawingml/2011/main" val="1"/>
+              <ma14:wrappingTextBoxFlag xmlns:ma14="http://schemas.microsoft.com/office/mac/drawingml/2011/main" xmlns:a14="http://schemas.microsoft.com/office/drawing/2010/main" xmlns:m="http://schemas.openxmlformats.org/officeDocument/2006/math" xmlns="" val="1"/>
             </a:ext>
           </a:extLst>
         </p:spPr>
@@ -15943,7 +15923,7 @@
           </a:ln>
           <a:extLst>
             <a:ext uri="{C572A759-6A51-4108-AA02-DFA0A04FC94B}">
-              <ma14:wrappingTextBoxFlag xmlns="" xmlns:m="http://schemas.openxmlformats.org/officeDocument/2006/math" xmlns:a14="http://schemas.microsoft.com/office/drawing/2010/main" xmlns:ma14="http://schemas.microsoft.com/office/mac/drawingml/2011/main" val="1"/>
+              <ma14:wrappingTextBoxFlag xmlns:ma14="http://schemas.microsoft.com/office/mac/drawingml/2011/main" xmlns:a14="http://schemas.microsoft.com/office/drawing/2010/main" xmlns:m="http://schemas.openxmlformats.org/officeDocument/2006/math" xmlns="" val="1"/>
             </a:ext>
           </a:extLst>
         </p:spPr>
@@ -15985,7 +15965,7 @@
           </a:ln>
           <a:extLst>
             <a:ext uri="{C572A759-6A51-4108-AA02-DFA0A04FC94B}">
-              <ma14:wrappingTextBoxFlag xmlns="" xmlns:m="http://schemas.openxmlformats.org/officeDocument/2006/math" xmlns:a14="http://schemas.microsoft.com/office/drawing/2010/main" xmlns:ma14="http://schemas.microsoft.com/office/mac/drawingml/2011/main" val="1"/>
+              <ma14:wrappingTextBoxFlag xmlns:ma14="http://schemas.microsoft.com/office/mac/drawingml/2011/main" xmlns:a14="http://schemas.microsoft.com/office/drawing/2010/main" xmlns:m="http://schemas.openxmlformats.org/officeDocument/2006/math" xmlns="" val="1"/>
             </a:ext>
           </a:extLst>
         </p:spPr>
@@ -16032,7 +16012,7 @@
           </a:ln>
           <a:extLst>
             <a:ext uri="{C572A759-6A51-4108-AA02-DFA0A04FC94B}">
-              <ma14:wrappingTextBoxFlag xmlns="" xmlns:m="http://schemas.openxmlformats.org/officeDocument/2006/math" xmlns:a14="http://schemas.microsoft.com/office/drawing/2010/main" xmlns:ma14="http://schemas.microsoft.com/office/mac/drawingml/2011/main" val="1"/>
+              <ma14:wrappingTextBoxFlag xmlns:ma14="http://schemas.microsoft.com/office/mac/drawingml/2011/main" xmlns:a14="http://schemas.microsoft.com/office/drawing/2010/main" xmlns:m="http://schemas.openxmlformats.org/officeDocument/2006/math" xmlns="" val="1"/>
             </a:ext>
           </a:extLst>
         </p:spPr>
@@ -16118,7 +16098,7 @@
           </a:ln>
           <a:extLst>
             <a:ext uri="{C572A759-6A51-4108-AA02-DFA0A04FC94B}">
-              <ma14:wrappingTextBoxFlag xmlns="" xmlns:m="http://schemas.openxmlformats.org/officeDocument/2006/math" xmlns:a14="http://schemas.microsoft.com/office/drawing/2010/main" xmlns:ma14="http://schemas.microsoft.com/office/mac/drawingml/2011/main" val="1"/>
+              <ma14:wrappingTextBoxFlag xmlns:ma14="http://schemas.microsoft.com/office/mac/drawingml/2011/main" xmlns:a14="http://schemas.microsoft.com/office/drawing/2010/main" xmlns:m="http://schemas.openxmlformats.org/officeDocument/2006/math" xmlns="" val="1"/>
             </a:ext>
           </a:extLst>
         </p:spPr>
@@ -16231,7 +16211,7 @@
           </a:ln>
           <a:extLst>
             <a:ext uri="{C572A759-6A51-4108-AA02-DFA0A04FC94B}">
-              <ma14:wrappingTextBoxFlag xmlns="" xmlns:m="http://schemas.openxmlformats.org/officeDocument/2006/math" xmlns:a14="http://schemas.microsoft.com/office/drawing/2010/main" xmlns:ma14="http://schemas.microsoft.com/office/mac/drawingml/2011/main" val="1"/>
+              <ma14:wrappingTextBoxFlag xmlns:ma14="http://schemas.microsoft.com/office/mac/drawingml/2011/main" xmlns:a14="http://schemas.microsoft.com/office/drawing/2010/main" xmlns:m="http://schemas.openxmlformats.org/officeDocument/2006/math" xmlns="" val="1"/>
             </a:ext>
           </a:extLst>
         </p:spPr>
@@ -16306,7 +16286,7 @@
           </a:ln>
           <a:extLst>
             <a:ext uri="{C572A759-6A51-4108-AA02-DFA0A04FC94B}">
-              <ma14:wrappingTextBoxFlag xmlns="" xmlns:m="http://schemas.openxmlformats.org/officeDocument/2006/math" xmlns:a14="http://schemas.microsoft.com/office/drawing/2010/main" xmlns:ma14="http://schemas.microsoft.com/office/mac/drawingml/2011/main" val="1"/>
+              <ma14:wrappingTextBoxFlag xmlns:ma14="http://schemas.microsoft.com/office/mac/drawingml/2011/main" xmlns:a14="http://schemas.microsoft.com/office/drawing/2010/main" xmlns:m="http://schemas.openxmlformats.org/officeDocument/2006/math" xmlns="" val="1"/>
             </a:ext>
           </a:extLst>
         </p:spPr>
@@ -16481,7 +16461,7 @@
           </a:effectLst>
           <a:extLst>
             <a:ext uri="{C572A759-6A51-4108-AA02-DFA0A04FC94B}">
-              <ma14:wrappingTextBoxFlag xmlns="" xmlns:m="http://schemas.openxmlformats.org/officeDocument/2006/math" xmlns:a14="http://schemas.microsoft.com/office/drawing/2010/main" xmlns:ma14="http://schemas.microsoft.com/office/mac/drawingml/2011/main" val="1"/>
+              <ma14:wrappingTextBoxFlag xmlns:ma14="http://schemas.microsoft.com/office/mac/drawingml/2011/main" xmlns:a14="http://schemas.microsoft.com/office/drawing/2010/main" xmlns:m="http://schemas.openxmlformats.org/officeDocument/2006/math" xmlns="" val="1"/>
             </a:ext>
           </a:extLst>
         </p:spPr>
@@ -16538,7 +16518,7 @@
           </a:effectLst>
           <a:extLst>
             <a:ext uri="{C572A759-6A51-4108-AA02-DFA0A04FC94B}">
-              <ma14:wrappingTextBoxFlag xmlns="" xmlns:m="http://schemas.openxmlformats.org/officeDocument/2006/math" xmlns:a14="http://schemas.microsoft.com/office/drawing/2010/main" xmlns:ma14="http://schemas.microsoft.com/office/mac/drawingml/2011/main" val="1"/>
+              <ma14:wrappingTextBoxFlag xmlns:ma14="http://schemas.microsoft.com/office/mac/drawingml/2011/main" xmlns:a14="http://schemas.microsoft.com/office/drawing/2010/main" xmlns:m="http://schemas.openxmlformats.org/officeDocument/2006/math" xmlns="" val="1"/>
             </a:ext>
           </a:extLst>
         </p:spPr>
@@ -16580,7 +16560,7 @@
           </a:ln>
           <a:extLst>
             <a:ext uri="{C572A759-6A51-4108-AA02-DFA0A04FC94B}">
-              <ma14:wrappingTextBoxFlag xmlns="" xmlns:m="http://schemas.openxmlformats.org/officeDocument/2006/math" xmlns:a14="http://schemas.microsoft.com/office/drawing/2010/main" xmlns:ma14="http://schemas.microsoft.com/office/mac/drawingml/2011/main" val="1"/>
+              <ma14:wrappingTextBoxFlag xmlns:ma14="http://schemas.microsoft.com/office/mac/drawingml/2011/main" xmlns:a14="http://schemas.microsoft.com/office/drawing/2010/main" xmlns:m="http://schemas.openxmlformats.org/officeDocument/2006/math" xmlns="" val="1"/>
             </a:ext>
           </a:extLst>
         </p:spPr>
@@ -16619,7 +16599,7 @@
           </a:ln>
           <a:extLst>
             <a:ext uri="{C572A759-6A51-4108-AA02-DFA0A04FC94B}">
-              <ma14:wrappingTextBoxFlag xmlns="" xmlns:m="http://schemas.openxmlformats.org/officeDocument/2006/math" xmlns:a14="http://schemas.microsoft.com/office/drawing/2010/main" xmlns:ma14="http://schemas.microsoft.com/office/mac/drawingml/2011/main" val="1"/>
+              <ma14:wrappingTextBoxFlag xmlns:ma14="http://schemas.microsoft.com/office/mac/drawingml/2011/main" xmlns:a14="http://schemas.microsoft.com/office/drawing/2010/main" xmlns:m="http://schemas.openxmlformats.org/officeDocument/2006/math" xmlns="" val="1"/>
             </a:ext>
           </a:extLst>
         </p:spPr>
@@ -16856,7 +16836,7 @@
           </a:ln>
           <a:extLst>
             <a:ext uri="{C572A759-6A51-4108-AA02-DFA0A04FC94B}">
-              <ma14:wrappingTextBoxFlag xmlns="" xmlns:m="http://schemas.openxmlformats.org/officeDocument/2006/math" xmlns:a14="http://schemas.microsoft.com/office/drawing/2010/main" xmlns:ma14="http://schemas.microsoft.com/office/mac/drawingml/2011/main" val="1"/>
+              <ma14:wrappingTextBoxFlag xmlns:ma14="http://schemas.microsoft.com/office/mac/drawingml/2011/main" xmlns:a14="http://schemas.microsoft.com/office/drawing/2010/main" xmlns:m="http://schemas.openxmlformats.org/officeDocument/2006/math" xmlns="" val="1"/>
             </a:ext>
           </a:extLst>
         </p:spPr>
@@ -16893,7 +16873,7 @@
           </a:ln>
           <a:extLst>
             <a:ext uri="{C572A759-6A51-4108-AA02-DFA0A04FC94B}">
-              <ma14:wrappingTextBoxFlag xmlns="" xmlns:m="http://schemas.openxmlformats.org/officeDocument/2006/math" xmlns:a14="http://schemas.microsoft.com/office/drawing/2010/main" xmlns:ma14="http://schemas.microsoft.com/office/mac/drawingml/2011/main" val="1"/>
+              <ma14:wrappingTextBoxFlag xmlns:ma14="http://schemas.microsoft.com/office/mac/drawingml/2011/main" xmlns:a14="http://schemas.microsoft.com/office/drawing/2010/main" xmlns:m="http://schemas.openxmlformats.org/officeDocument/2006/math" xmlns="" val="1"/>
             </a:ext>
           </a:extLst>
         </p:spPr>
@@ -17119,7 +17099,7 @@
           </a:ln>
           <a:extLst>
             <a:ext uri="{C572A759-6A51-4108-AA02-DFA0A04FC94B}">
-              <ma14:wrappingTextBoxFlag xmlns="" xmlns:m="http://schemas.openxmlformats.org/officeDocument/2006/math" xmlns:a14="http://schemas.microsoft.com/office/drawing/2010/main" xmlns:ma14="http://schemas.microsoft.com/office/mac/drawingml/2011/main" val="1"/>
+              <ma14:wrappingTextBoxFlag xmlns:ma14="http://schemas.microsoft.com/office/mac/drawingml/2011/main" xmlns:a14="http://schemas.microsoft.com/office/drawing/2010/main" xmlns:m="http://schemas.openxmlformats.org/officeDocument/2006/math" xmlns="" val="1"/>
             </a:ext>
           </a:extLst>
         </p:spPr>
@@ -17235,7 +17215,7 @@
           </a:ln>
           <a:extLst>
             <a:ext uri="{C572A759-6A51-4108-AA02-DFA0A04FC94B}">
-              <ma14:wrappingTextBoxFlag xmlns="" xmlns:m="http://schemas.openxmlformats.org/officeDocument/2006/math" xmlns:a14="http://schemas.microsoft.com/office/drawing/2010/main" xmlns:ma14="http://schemas.microsoft.com/office/mac/drawingml/2011/main" val="1"/>
+              <ma14:wrappingTextBoxFlag xmlns:ma14="http://schemas.microsoft.com/office/mac/drawingml/2011/main" xmlns:a14="http://schemas.microsoft.com/office/drawing/2010/main" xmlns:m="http://schemas.openxmlformats.org/officeDocument/2006/math" xmlns="" val="1"/>
             </a:ext>
           </a:extLst>
         </p:spPr>
@@ -17821,7 +17801,7 @@
           </a:ln>
           <a:extLst>
             <a:ext uri="{C572A759-6A51-4108-AA02-DFA0A04FC94B}">
-              <ma14:wrappingTextBoxFlag xmlns="" xmlns:m="http://schemas.openxmlformats.org/officeDocument/2006/math" xmlns:a14="http://schemas.microsoft.com/office/drawing/2010/main" xmlns:ma14="http://schemas.microsoft.com/office/mac/drawingml/2011/main" val="1"/>
+              <ma14:wrappingTextBoxFlag xmlns:ma14="http://schemas.microsoft.com/office/mac/drawingml/2011/main" xmlns:a14="http://schemas.microsoft.com/office/drawing/2010/main" xmlns:m="http://schemas.openxmlformats.org/officeDocument/2006/math" xmlns="" val="1"/>
             </a:ext>
           </a:extLst>
         </p:spPr>
@@ -17989,7 +17969,7 @@
           </a:ln>
           <a:extLst>
             <a:ext uri="{C572A759-6A51-4108-AA02-DFA0A04FC94B}">
-              <ma14:wrappingTextBoxFlag xmlns="" xmlns:m="http://schemas.openxmlformats.org/officeDocument/2006/math" xmlns:a14="http://schemas.microsoft.com/office/drawing/2010/main" xmlns:ma14="http://schemas.microsoft.com/office/mac/drawingml/2011/main" val="1"/>
+              <ma14:wrappingTextBoxFlag xmlns:ma14="http://schemas.microsoft.com/office/mac/drawingml/2011/main" xmlns:a14="http://schemas.microsoft.com/office/drawing/2010/main" xmlns:m="http://schemas.openxmlformats.org/officeDocument/2006/math" xmlns="" val="1"/>
             </a:ext>
           </a:extLst>
         </p:spPr>
@@ -18182,7 +18162,7 @@
           </a:ln>
           <a:extLst>
             <a:ext uri="{C572A759-6A51-4108-AA02-DFA0A04FC94B}">
-              <ma14:wrappingTextBoxFlag xmlns="" xmlns:m="http://schemas.openxmlformats.org/officeDocument/2006/math" xmlns:a14="http://schemas.microsoft.com/office/drawing/2010/main" xmlns:ma14="http://schemas.microsoft.com/office/mac/drawingml/2011/main" val="1"/>
+              <ma14:wrappingTextBoxFlag xmlns:ma14="http://schemas.microsoft.com/office/mac/drawingml/2011/main" xmlns:a14="http://schemas.microsoft.com/office/drawing/2010/main" xmlns:m="http://schemas.openxmlformats.org/officeDocument/2006/math" xmlns="" val="1"/>
             </a:ext>
           </a:extLst>
         </p:spPr>
@@ -18338,7 +18318,7 @@
           </a:ln>
           <a:extLst>
             <a:ext uri="{C572A759-6A51-4108-AA02-DFA0A04FC94B}">
-              <ma14:wrappingTextBoxFlag xmlns="" xmlns:m="http://schemas.openxmlformats.org/officeDocument/2006/math" xmlns:a14="http://schemas.microsoft.com/office/drawing/2010/main" xmlns:ma14="http://schemas.microsoft.com/office/mac/drawingml/2011/main" val="1"/>
+              <ma14:wrappingTextBoxFlag xmlns:ma14="http://schemas.microsoft.com/office/mac/drawingml/2011/main" xmlns:a14="http://schemas.microsoft.com/office/drawing/2010/main" xmlns:m="http://schemas.openxmlformats.org/officeDocument/2006/math" xmlns="" val="1"/>
             </a:ext>
           </a:extLst>
         </p:spPr>
@@ -18373,7 +18353,7 @@
           </a:ln>
           <a:extLst>
             <a:ext uri="{C572A759-6A51-4108-AA02-DFA0A04FC94B}">
-              <ma14:wrappingTextBoxFlag xmlns="" xmlns:m="http://schemas.openxmlformats.org/officeDocument/2006/math" xmlns:a14="http://schemas.microsoft.com/office/drawing/2010/main" xmlns:ma14="http://schemas.microsoft.com/office/mac/drawingml/2011/main" val="1"/>
+              <ma14:wrappingTextBoxFlag xmlns:ma14="http://schemas.microsoft.com/office/mac/drawingml/2011/main" xmlns:a14="http://schemas.microsoft.com/office/drawing/2010/main" xmlns:m="http://schemas.openxmlformats.org/officeDocument/2006/math" xmlns="" val="1"/>
             </a:ext>
           </a:extLst>
         </p:spPr>
@@ -18408,7 +18388,7 @@
           </a:ln>
           <a:extLst>
             <a:ext uri="{C572A759-6A51-4108-AA02-DFA0A04FC94B}">
-              <ma14:wrappingTextBoxFlag xmlns="" xmlns:m="http://schemas.openxmlformats.org/officeDocument/2006/math" xmlns:a14="http://schemas.microsoft.com/office/drawing/2010/main" xmlns:ma14="http://schemas.microsoft.com/office/mac/drawingml/2011/main" val="1"/>
+              <ma14:wrappingTextBoxFlag xmlns:ma14="http://schemas.microsoft.com/office/mac/drawingml/2011/main" xmlns:a14="http://schemas.microsoft.com/office/drawing/2010/main" xmlns:m="http://schemas.openxmlformats.org/officeDocument/2006/math" xmlns="" val="1"/>
             </a:ext>
           </a:extLst>
         </p:spPr>
@@ -18506,7 +18486,7 @@
           </a:ln>
           <a:extLst>
             <a:ext uri="{C572A759-6A51-4108-AA02-DFA0A04FC94B}">
-              <ma14:wrappingTextBoxFlag xmlns="" xmlns:m="http://schemas.openxmlformats.org/officeDocument/2006/math" xmlns:a14="http://schemas.microsoft.com/office/drawing/2010/main" xmlns:ma14="http://schemas.microsoft.com/office/mac/drawingml/2011/main" val="1"/>
+              <ma14:wrappingTextBoxFlag xmlns:ma14="http://schemas.microsoft.com/office/mac/drawingml/2011/main" xmlns:a14="http://schemas.microsoft.com/office/drawing/2010/main" xmlns:m="http://schemas.openxmlformats.org/officeDocument/2006/math" xmlns="" val="1"/>
             </a:ext>
           </a:extLst>
         </p:spPr>
@@ -18575,7 +18555,7 @@
           </a:ln>
           <a:extLst>
             <a:ext uri="{C572A759-6A51-4108-AA02-DFA0A04FC94B}">
-              <ma14:wrappingTextBoxFlag xmlns="" xmlns:m="http://schemas.openxmlformats.org/officeDocument/2006/math" xmlns:a14="http://schemas.microsoft.com/office/drawing/2010/main" xmlns:ma14="http://schemas.microsoft.com/office/mac/drawingml/2011/main" val="1"/>
+              <ma14:wrappingTextBoxFlag xmlns:ma14="http://schemas.microsoft.com/office/mac/drawingml/2011/main" xmlns:a14="http://schemas.microsoft.com/office/drawing/2010/main" xmlns:m="http://schemas.openxmlformats.org/officeDocument/2006/math" xmlns="" val="1"/>
             </a:ext>
           </a:extLst>
         </p:spPr>
@@ -18622,7 +18602,7 @@
           </a:ln>
           <a:extLst>
             <a:ext uri="{C572A759-6A51-4108-AA02-DFA0A04FC94B}">
-              <ma14:wrappingTextBoxFlag xmlns="" xmlns:m="http://schemas.openxmlformats.org/officeDocument/2006/math" xmlns:a14="http://schemas.microsoft.com/office/drawing/2010/main" xmlns:ma14="http://schemas.microsoft.com/office/mac/drawingml/2011/main" val="1"/>
+              <ma14:wrappingTextBoxFlag xmlns:ma14="http://schemas.microsoft.com/office/mac/drawingml/2011/main" xmlns:a14="http://schemas.microsoft.com/office/drawing/2010/main" xmlns:m="http://schemas.openxmlformats.org/officeDocument/2006/math" xmlns="" val="1"/>
             </a:ext>
           </a:extLst>
         </p:spPr>
@@ -18669,7 +18649,7 @@
           </a:ln>
           <a:extLst>
             <a:ext uri="{C572A759-6A51-4108-AA02-DFA0A04FC94B}">
-              <ma14:wrappingTextBoxFlag xmlns="" xmlns:m="http://schemas.openxmlformats.org/officeDocument/2006/math" xmlns:a14="http://schemas.microsoft.com/office/drawing/2010/main" xmlns:ma14="http://schemas.microsoft.com/office/mac/drawingml/2011/main" val="1"/>
+              <ma14:wrappingTextBoxFlag xmlns:ma14="http://schemas.microsoft.com/office/mac/drawingml/2011/main" xmlns:a14="http://schemas.microsoft.com/office/drawing/2010/main" xmlns:m="http://schemas.openxmlformats.org/officeDocument/2006/math" xmlns="" val="1"/>
             </a:ext>
           </a:extLst>
         </p:spPr>
@@ -18811,7 +18791,7 @@
           </a:ln>
           <a:extLst>
             <a:ext uri="{C572A759-6A51-4108-AA02-DFA0A04FC94B}">
-              <ma14:wrappingTextBoxFlag xmlns="" xmlns:m="http://schemas.openxmlformats.org/officeDocument/2006/math" xmlns:a14="http://schemas.microsoft.com/office/drawing/2010/main" xmlns:ma14="http://schemas.microsoft.com/office/mac/drawingml/2011/main" val="1"/>
+              <ma14:wrappingTextBoxFlag xmlns:ma14="http://schemas.microsoft.com/office/mac/drawingml/2011/main" xmlns:a14="http://schemas.microsoft.com/office/drawing/2010/main" xmlns:m="http://schemas.openxmlformats.org/officeDocument/2006/math" xmlns="" val="1"/>
             </a:ext>
           </a:extLst>
         </p:spPr>
@@ -18846,7 +18826,7 @@
           </a:ln>
           <a:extLst>
             <a:ext uri="{C572A759-6A51-4108-AA02-DFA0A04FC94B}">
-              <ma14:wrappingTextBoxFlag xmlns="" xmlns:m="http://schemas.openxmlformats.org/officeDocument/2006/math" xmlns:a14="http://schemas.microsoft.com/office/drawing/2010/main" xmlns:ma14="http://schemas.microsoft.com/office/mac/drawingml/2011/main" val="1"/>
+              <ma14:wrappingTextBoxFlag xmlns:ma14="http://schemas.microsoft.com/office/mac/drawingml/2011/main" xmlns:a14="http://schemas.microsoft.com/office/drawing/2010/main" xmlns:m="http://schemas.openxmlformats.org/officeDocument/2006/math" xmlns="" val="1"/>
             </a:ext>
           </a:extLst>
         </p:spPr>
@@ -18881,7 +18861,7 @@
           </a:ln>
           <a:extLst>
             <a:ext uri="{C572A759-6A51-4108-AA02-DFA0A04FC94B}">
-              <ma14:wrappingTextBoxFlag xmlns="" xmlns:m="http://schemas.openxmlformats.org/officeDocument/2006/math" xmlns:a14="http://schemas.microsoft.com/office/drawing/2010/main" xmlns:ma14="http://schemas.microsoft.com/office/mac/drawingml/2011/main" val="1"/>
+              <ma14:wrappingTextBoxFlag xmlns:ma14="http://schemas.microsoft.com/office/mac/drawingml/2011/main" xmlns:a14="http://schemas.microsoft.com/office/drawing/2010/main" xmlns:m="http://schemas.openxmlformats.org/officeDocument/2006/math" xmlns="" val="1"/>
             </a:ext>
           </a:extLst>
         </p:spPr>
@@ -18979,7 +18959,7 @@
           </a:ln>
           <a:extLst>
             <a:ext uri="{C572A759-6A51-4108-AA02-DFA0A04FC94B}">
-              <ma14:wrappingTextBoxFlag xmlns="" xmlns:m="http://schemas.openxmlformats.org/officeDocument/2006/math" xmlns:a14="http://schemas.microsoft.com/office/drawing/2010/main" xmlns:ma14="http://schemas.microsoft.com/office/mac/drawingml/2011/main" val="1"/>
+              <ma14:wrappingTextBoxFlag xmlns:ma14="http://schemas.microsoft.com/office/mac/drawingml/2011/main" xmlns:a14="http://schemas.microsoft.com/office/drawing/2010/main" xmlns:m="http://schemas.openxmlformats.org/officeDocument/2006/math" xmlns="" val="1"/>
             </a:ext>
           </a:extLst>
         </p:spPr>
@@ -19048,7 +19028,7 @@
           </a:ln>
           <a:extLst>
             <a:ext uri="{C572A759-6A51-4108-AA02-DFA0A04FC94B}">
-              <ma14:wrappingTextBoxFlag xmlns="" xmlns:m="http://schemas.openxmlformats.org/officeDocument/2006/math" xmlns:a14="http://schemas.microsoft.com/office/drawing/2010/main" xmlns:ma14="http://schemas.microsoft.com/office/mac/drawingml/2011/main" val="1"/>
+              <ma14:wrappingTextBoxFlag xmlns:ma14="http://schemas.microsoft.com/office/mac/drawingml/2011/main" xmlns:a14="http://schemas.microsoft.com/office/drawing/2010/main" xmlns:m="http://schemas.openxmlformats.org/officeDocument/2006/math" xmlns="" val="1"/>
             </a:ext>
           </a:extLst>
         </p:spPr>
@@ -19095,7 +19075,7 @@
           </a:ln>
           <a:extLst>
             <a:ext uri="{C572A759-6A51-4108-AA02-DFA0A04FC94B}">
-              <ma14:wrappingTextBoxFlag xmlns="" xmlns:m="http://schemas.openxmlformats.org/officeDocument/2006/math" xmlns:a14="http://schemas.microsoft.com/office/drawing/2010/main" xmlns:ma14="http://schemas.microsoft.com/office/mac/drawingml/2011/main" val="1"/>
+              <ma14:wrappingTextBoxFlag xmlns:ma14="http://schemas.microsoft.com/office/mac/drawingml/2011/main" xmlns:a14="http://schemas.microsoft.com/office/drawing/2010/main" xmlns:m="http://schemas.openxmlformats.org/officeDocument/2006/math" xmlns="" val="1"/>
             </a:ext>
           </a:extLst>
         </p:spPr>
@@ -19142,7 +19122,7 @@
           </a:ln>
           <a:extLst>
             <a:ext uri="{C572A759-6A51-4108-AA02-DFA0A04FC94B}">
-              <ma14:wrappingTextBoxFlag xmlns="" xmlns:m="http://schemas.openxmlformats.org/officeDocument/2006/math" xmlns:a14="http://schemas.microsoft.com/office/drawing/2010/main" xmlns:ma14="http://schemas.microsoft.com/office/mac/drawingml/2011/main" val="1"/>
+              <ma14:wrappingTextBoxFlag xmlns:ma14="http://schemas.microsoft.com/office/mac/drawingml/2011/main" xmlns:a14="http://schemas.microsoft.com/office/drawing/2010/main" xmlns:m="http://schemas.openxmlformats.org/officeDocument/2006/math" xmlns="" val="1"/>
             </a:ext>
           </a:extLst>
         </p:spPr>
@@ -19328,7 +19308,7 @@
           </a:ln>
           <a:extLst>
             <a:ext uri="{C572A759-6A51-4108-AA02-DFA0A04FC94B}">
-              <ma14:wrappingTextBoxFlag xmlns="" xmlns:m="http://schemas.openxmlformats.org/officeDocument/2006/math" xmlns:a14="http://schemas.microsoft.com/office/drawing/2010/main" xmlns:ma14="http://schemas.microsoft.com/office/mac/drawingml/2011/main" val="1"/>
+              <ma14:wrappingTextBoxFlag xmlns:ma14="http://schemas.microsoft.com/office/mac/drawingml/2011/main" xmlns:a14="http://schemas.microsoft.com/office/drawing/2010/main" xmlns:m="http://schemas.openxmlformats.org/officeDocument/2006/math" xmlns="" val="1"/>
             </a:ext>
           </a:extLst>
         </p:spPr>
@@ -19375,7 +19355,7 @@
           </a:ln>
           <a:extLst>
             <a:ext uri="{C572A759-6A51-4108-AA02-DFA0A04FC94B}">
-              <ma14:wrappingTextBoxFlag xmlns="" xmlns:m="http://schemas.openxmlformats.org/officeDocument/2006/math" xmlns:a14="http://schemas.microsoft.com/office/drawing/2010/main" xmlns:ma14="http://schemas.microsoft.com/office/mac/drawingml/2011/main" val="1"/>
+              <ma14:wrappingTextBoxFlag xmlns:ma14="http://schemas.microsoft.com/office/mac/drawingml/2011/main" xmlns:a14="http://schemas.microsoft.com/office/drawing/2010/main" xmlns:m="http://schemas.openxmlformats.org/officeDocument/2006/math" xmlns="" val="1"/>
             </a:ext>
           </a:extLst>
         </p:spPr>
@@ -19564,7 +19544,7 @@
           </a:ln>
           <a:extLst>
             <a:ext uri="{C572A759-6A51-4108-AA02-DFA0A04FC94B}">
-              <ma14:wrappingTextBoxFlag xmlns="" xmlns:m="http://schemas.openxmlformats.org/officeDocument/2006/math" xmlns:a14="http://schemas.microsoft.com/office/drawing/2010/main" xmlns:ma14="http://schemas.microsoft.com/office/mac/drawingml/2011/main" val="1"/>
+              <ma14:wrappingTextBoxFlag xmlns:ma14="http://schemas.microsoft.com/office/mac/drawingml/2011/main" xmlns:a14="http://schemas.microsoft.com/office/drawing/2010/main" xmlns:m="http://schemas.openxmlformats.org/officeDocument/2006/math" xmlns="" val="1"/>
             </a:ext>
           </a:extLst>
         </p:spPr>
@@ -19599,7 +19579,7 @@
           </a:ln>
           <a:extLst>
             <a:ext uri="{C572A759-6A51-4108-AA02-DFA0A04FC94B}">
-              <ma14:wrappingTextBoxFlag xmlns="" xmlns:m="http://schemas.openxmlformats.org/officeDocument/2006/math" xmlns:a14="http://schemas.microsoft.com/office/drawing/2010/main" xmlns:ma14="http://schemas.microsoft.com/office/mac/drawingml/2011/main" val="1"/>
+              <ma14:wrappingTextBoxFlag xmlns:ma14="http://schemas.microsoft.com/office/mac/drawingml/2011/main" xmlns:a14="http://schemas.microsoft.com/office/drawing/2010/main" xmlns:m="http://schemas.openxmlformats.org/officeDocument/2006/math" xmlns="" val="1"/>
             </a:ext>
           </a:extLst>
         </p:spPr>
@@ -19634,7 +19614,7 @@
           </a:ln>
           <a:extLst>
             <a:ext uri="{C572A759-6A51-4108-AA02-DFA0A04FC94B}">
-              <ma14:wrappingTextBoxFlag xmlns="" xmlns:m="http://schemas.openxmlformats.org/officeDocument/2006/math" xmlns:a14="http://schemas.microsoft.com/office/drawing/2010/main" xmlns:ma14="http://schemas.microsoft.com/office/mac/drawingml/2011/main" val="1"/>
+              <ma14:wrappingTextBoxFlag xmlns:ma14="http://schemas.microsoft.com/office/mac/drawingml/2011/main" xmlns:a14="http://schemas.microsoft.com/office/drawing/2010/main" xmlns:m="http://schemas.openxmlformats.org/officeDocument/2006/math" xmlns="" val="1"/>
             </a:ext>
           </a:extLst>
         </p:spPr>
@@ -19732,7 +19712,7 @@
           </a:ln>
           <a:extLst>
             <a:ext uri="{C572A759-6A51-4108-AA02-DFA0A04FC94B}">
-              <ma14:wrappingTextBoxFlag xmlns="" xmlns:m="http://schemas.openxmlformats.org/officeDocument/2006/math" xmlns:a14="http://schemas.microsoft.com/office/drawing/2010/main" xmlns:ma14="http://schemas.microsoft.com/office/mac/drawingml/2011/main" val="1"/>
+              <ma14:wrappingTextBoxFlag xmlns:ma14="http://schemas.microsoft.com/office/mac/drawingml/2011/main" xmlns:a14="http://schemas.microsoft.com/office/drawing/2010/main" xmlns:m="http://schemas.openxmlformats.org/officeDocument/2006/math" xmlns="" val="1"/>
             </a:ext>
           </a:extLst>
         </p:spPr>
@@ -19801,7 +19781,7 @@
           </a:ln>
           <a:extLst>
             <a:ext uri="{C572A759-6A51-4108-AA02-DFA0A04FC94B}">
-              <ma14:wrappingTextBoxFlag xmlns="" xmlns:m="http://schemas.openxmlformats.org/officeDocument/2006/math" xmlns:a14="http://schemas.microsoft.com/office/drawing/2010/main" xmlns:ma14="http://schemas.microsoft.com/office/mac/drawingml/2011/main" val="1"/>
+              <ma14:wrappingTextBoxFlag xmlns:ma14="http://schemas.microsoft.com/office/mac/drawingml/2011/main" xmlns:a14="http://schemas.microsoft.com/office/drawing/2010/main" xmlns:m="http://schemas.openxmlformats.org/officeDocument/2006/math" xmlns="" val="1"/>
             </a:ext>
           </a:extLst>
         </p:spPr>
@@ -19848,7 +19828,7 @@
           </a:ln>
           <a:extLst>
             <a:ext uri="{C572A759-6A51-4108-AA02-DFA0A04FC94B}">
-              <ma14:wrappingTextBoxFlag xmlns="" xmlns:m="http://schemas.openxmlformats.org/officeDocument/2006/math" xmlns:a14="http://schemas.microsoft.com/office/drawing/2010/main" xmlns:ma14="http://schemas.microsoft.com/office/mac/drawingml/2011/main" val="1"/>
+              <ma14:wrappingTextBoxFlag xmlns:ma14="http://schemas.microsoft.com/office/mac/drawingml/2011/main" xmlns:a14="http://schemas.microsoft.com/office/drawing/2010/main" xmlns:m="http://schemas.openxmlformats.org/officeDocument/2006/math" xmlns="" val="1"/>
             </a:ext>
           </a:extLst>
         </p:spPr>
@@ -19895,7 +19875,7 @@
           </a:ln>
           <a:extLst>
             <a:ext uri="{C572A759-6A51-4108-AA02-DFA0A04FC94B}">
-              <ma14:wrappingTextBoxFlag xmlns="" xmlns:m="http://schemas.openxmlformats.org/officeDocument/2006/math" xmlns:a14="http://schemas.microsoft.com/office/drawing/2010/main" xmlns:ma14="http://schemas.microsoft.com/office/mac/drawingml/2011/main" val="1"/>
+              <ma14:wrappingTextBoxFlag xmlns:ma14="http://schemas.microsoft.com/office/mac/drawingml/2011/main" xmlns:a14="http://schemas.microsoft.com/office/drawing/2010/main" xmlns:m="http://schemas.openxmlformats.org/officeDocument/2006/math" xmlns="" val="1"/>
             </a:ext>
           </a:extLst>
         </p:spPr>
@@ -20084,7 +20064,7 @@
           </a:ln>
           <a:extLst>
             <a:ext uri="{C572A759-6A51-4108-AA02-DFA0A04FC94B}">
-              <ma14:wrappingTextBoxFlag xmlns="" xmlns:m="http://schemas.openxmlformats.org/officeDocument/2006/math" xmlns:a14="http://schemas.microsoft.com/office/drawing/2010/main" xmlns:ma14="http://schemas.microsoft.com/office/mac/drawingml/2011/main" val="1"/>
+              <ma14:wrappingTextBoxFlag xmlns:ma14="http://schemas.microsoft.com/office/mac/drawingml/2011/main" xmlns:a14="http://schemas.microsoft.com/office/drawing/2010/main" xmlns:m="http://schemas.openxmlformats.org/officeDocument/2006/math" xmlns="" val="1"/>
             </a:ext>
           </a:extLst>
         </p:spPr>
@@ -20209,7 +20189,7 @@
           </a:ln>
           <a:extLst>
             <a:ext uri="{C572A759-6A51-4108-AA02-DFA0A04FC94B}">
-              <ma14:wrappingTextBoxFlag xmlns="" xmlns:m="http://schemas.openxmlformats.org/officeDocument/2006/math" xmlns:a14="http://schemas.microsoft.com/office/drawing/2010/main" xmlns:ma14="http://schemas.microsoft.com/office/mac/drawingml/2011/main" val="1"/>
+              <ma14:wrappingTextBoxFlag xmlns:ma14="http://schemas.microsoft.com/office/mac/drawingml/2011/main" xmlns:a14="http://schemas.microsoft.com/office/drawing/2010/main" xmlns:m="http://schemas.openxmlformats.org/officeDocument/2006/math" xmlns="" val="1"/>
             </a:ext>
           </a:extLst>
         </p:spPr>
@@ -20256,7 +20236,7 @@
           </a:ln>
           <a:extLst>
             <a:ext uri="{C572A759-6A51-4108-AA02-DFA0A04FC94B}">
-              <ma14:wrappingTextBoxFlag xmlns="" xmlns:m="http://schemas.openxmlformats.org/officeDocument/2006/math" xmlns:a14="http://schemas.microsoft.com/office/drawing/2010/main" xmlns:ma14="http://schemas.microsoft.com/office/mac/drawingml/2011/main" val="1"/>
+              <ma14:wrappingTextBoxFlag xmlns:ma14="http://schemas.microsoft.com/office/mac/drawingml/2011/main" xmlns:a14="http://schemas.microsoft.com/office/drawing/2010/main" xmlns:m="http://schemas.openxmlformats.org/officeDocument/2006/math" xmlns="" val="1"/>
             </a:ext>
           </a:extLst>
         </p:spPr>
@@ -20534,7 +20514,7 @@
           </a:ln>
           <a:extLst>
             <a:ext uri="{C572A759-6A51-4108-AA02-DFA0A04FC94B}">
-              <ma14:wrappingTextBoxFlag xmlns="" xmlns:m="http://schemas.openxmlformats.org/officeDocument/2006/math" xmlns:a14="http://schemas.microsoft.com/office/drawing/2010/main" xmlns:ma14="http://schemas.microsoft.com/office/mac/drawingml/2011/main" val="1"/>
+              <ma14:wrappingTextBoxFlag xmlns:ma14="http://schemas.microsoft.com/office/mac/drawingml/2011/main" xmlns:a14="http://schemas.microsoft.com/office/drawing/2010/main" xmlns:m="http://schemas.openxmlformats.org/officeDocument/2006/math" xmlns="" val="1"/>
             </a:ext>
           </a:extLst>
         </p:spPr>
@@ -20569,7 +20549,7 @@
           </a:ln>
           <a:extLst>
             <a:ext uri="{C572A759-6A51-4108-AA02-DFA0A04FC94B}">
-              <ma14:wrappingTextBoxFlag xmlns="" xmlns:m="http://schemas.openxmlformats.org/officeDocument/2006/math" xmlns:a14="http://schemas.microsoft.com/office/drawing/2010/main" xmlns:ma14="http://schemas.microsoft.com/office/mac/drawingml/2011/main" val="1"/>
+              <ma14:wrappingTextBoxFlag xmlns:ma14="http://schemas.microsoft.com/office/mac/drawingml/2011/main" xmlns:a14="http://schemas.microsoft.com/office/drawing/2010/main" xmlns:m="http://schemas.openxmlformats.org/officeDocument/2006/math" xmlns="" val="1"/>
             </a:ext>
           </a:extLst>
         </p:spPr>
@@ -20604,7 +20584,7 @@
           </a:ln>
           <a:extLst>
             <a:ext uri="{C572A759-6A51-4108-AA02-DFA0A04FC94B}">
-              <ma14:wrappingTextBoxFlag xmlns="" xmlns:m="http://schemas.openxmlformats.org/officeDocument/2006/math" xmlns:a14="http://schemas.microsoft.com/office/drawing/2010/main" xmlns:ma14="http://schemas.microsoft.com/office/mac/drawingml/2011/main" val="1"/>
+              <ma14:wrappingTextBoxFlag xmlns:ma14="http://schemas.microsoft.com/office/mac/drawingml/2011/main" xmlns:a14="http://schemas.microsoft.com/office/drawing/2010/main" xmlns:m="http://schemas.openxmlformats.org/officeDocument/2006/math" xmlns="" val="1"/>
             </a:ext>
           </a:extLst>
         </p:spPr>
@@ -20702,7 +20682,7 @@
           </a:ln>
           <a:extLst>
             <a:ext uri="{C572A759-6A51-4108-AA02-DFA0A04FC94B}">
-              <ma14:wrappingTextBoxFlag xmlns="" xmlns:m="http://schemas.openxmlformats.org/officeDocument/2006/math" xmlns:a14="http://schemas.microsoft.com/office/drawing/2010/main" xmlns:ma14="http://schemas.microsoft.com/office/mac/drawingml/2011/main" val="1"/>
+              <ma14:wrappingTextBoxFlag xmlns:ma14="http://schemas.microsoft.com/office/mac/drawingml/2011/main" xmlns:a14="http://schemas.microsoft.com/office/drawing/2010/main" xmlns:m="http://schemas.openxmlformats.org/officeDocument/2006/math" xmlns="" val="1"/>
             </a:ext>
           </a:extLst>
         </p:spPr>
@@ -20771,7 +20751,7 @@
           </a:ln>
           <a:extLst>
             <a:ext uri="{C572A759-6A51-4108-AA02-DFA0A04FC94B}">
-              <ma14:wrappingTextBoxFlag xmlns="" xmlns:m="http://schemas.openxmlformats.org/officeDocument/2006/math" xmlns:a14="http://schemas.microsoft.com/office/drawing/2010/main" xmlns:ma14="http://schemas.microsoft.com/office/mac/drawingml/2011/main" val="1"/>
+              <ma14:wrappingTextBoxFlag xmlns:ma14="http://schemas.microsoft.com/office/mac/drawingml/2011/main" xmlns:a14="http://schemas.microsoft.com/office/drawing/2010/main" xmlns:m="http://schemas.openxmlformats.org/officeDocument/2006/math" xmlns="" val="1"/>
             </a:ext>
           </a:extLst>
         </p:spPr>
@@ -20818,7 +20798,7 @@
           </a:ln>
           <a:extLst>
             <a:ext uri="{C572A759-6A51-4108-AA02-DFA0A04FC94B}">
-              <ma14:wrappingTextBoxFlag xmlns="" xmlns:m="http://schemas.openxmlformats.org/officeDocument/2006/math" xmlns:a14="http://schemas.microsoft.com/office/drawing/2010/main" xmlns:ma14="http://schemas.microsoft.com/office/mac/drawingml/2011/main" val="1"/>
+              <ma14:wrappingTextBoxFlag xmlns:ma14="http://schemas.microsoft.com/office/mac/drawingml/2011/main" xmlns:a14="http://schemas.microsoft.com/office/drawing/2010/main" xmlns:m="http://schemas.openxmlformats.org/officeDocument/2006/math" xmlns="" val="1"/>
             </a:ext>
           </a:extLst>
         </p:spPr>
@@ -20865,7 +20845,7 @@
           </a:ln>
           <a:extLst>
             <a:ext uri="{C572A759-6A51-4108-AA02-DFA0A04FC94B}">
-              <ma14:wrappingTextBoxFlag xmlns="" xmlns:m="http://schemas.openxmlformats.org/officeDocument/2006/math" xmlns:a14="http://schemas.microsoft.com/office/drawing/2010/main" xmlns:ma14="http://schemas.microsoft.com/office/mac/drawingml/2011/main" val="1"/>
+              <ma14:wrappingTextBoxFlag xmlns:ma14="http://schemas.microsoft.com/office/mac/drawingml/2011/main" xmlns:a14="http://schemas.microsoft.com/office/drawing/2010/main" xmlns:m="http://schemas.openxmlformats.org/officeDocument/2006/math" xmlns="" val="1"/>
             </a:ext>
           </a:extLst>
         </p:spPr>
@@ -21051,7 +21031,7 @@
           </a:ln>
           <a:extLst>
             <a:ext uri="{C572A759-6A51-4108-AA02-DFA0A04FC94B}">
-              <ma14:wrappingTextBoxFlag xmlns="" xmlns:m="http://schemas.openxmlformats.org/officeDocument/2006/math" xmlns:a14="http://schemas.microsoft.com/office/drawing/2010/main" xmlns:ma14="http://schemas.microsoft.com/office/mac/drawingml/2011/main" val="1"/>
+              <ma14:wrappingTextBoxFlag xmlns:ma14="http://schemas.microsoft.com/office/mac/drawingml/2011/main" xmlns:a14="http://schemas.microsoft.com/office/drawing/2010/main" xmlns:m="http://schemas.openxmlformats.org/officeDocument/2006/math" xmlns="" val="1"/>
             </a:ext>
           </a:extLst>
         </p:spPr>
@@ -21143,7 +21123,7 @@
           </a:ln>
           <a:extLst>
             <a:ext uri="{C572A759-6A51-4108-AA02-DFA0A04FC94B}">
-              <ma14:wrappingTextBoxFlag xmlns="" xmlns:m="http://schemas.openxmlformats.org/officeDocument/2006/math" xmlns:a14="http://schemas.microsoft.com/office/drawing/2010/main" xmlns:ma14="http://schemas.microsoft.com/office/mac/drawingml/2011/main" val="1"/>
+              <ma14:wrappingTextBoxFlag xmlns:ma14="http://schemas.microsoft.com/office/mac/drawingml/2011/main" xmlns:a14="http://schemas.microsoft.com/office/drawing/2010/main" xmlns:m="http://schemas.openxmlformats.org/officeDocument/2006/math" xmlns="" val="1"/>
             </a:ext>
           </a:extLst>
         </p:spPr>
@@ -21268,7 +21248,7 @@
           </a:ln>
           <a:extLst>
             <a:ext uri="{C572A759-6A51-4108-AA02-DFA0A04FC94B}">
-              <ma14:wrappingTextBoxFlag xmlns="" xmlns:m="http://schemas.openxmlformats.org/officeDocument/2006/math" xmlns:a14="http://schemas.microsoft.com/office/drawing/2010/main" xmlns:ma14="http://schemas.microsoft.com/office/mac/drawingml/2011/main" val="1"/>
+              <ma14:wrappingTextBoxFlag xmlns:ma14="http://schemas.microsoft.com/office/mac/drawingml/2011/main" xmlns:a14="http://schemas.microsoft.com/office/drawing/2010/main" xmlns:m="http://schemas.openxmlformats.org/officeDocument/2006/math" xmlns="" val="1"/>
             </a:ext>
           </a:extLst>
         </p:spPr>
@@ -21378,7 +21358,7 @@
           </a:ln>
           <a:extLst>
             <a:ext uri="{C572A759-6A51-4108-AA02-DFA0A04FC94B}">
-              <ma14:wrappingTextBoxFlag xmlns="" xmlns:m="http://schemas.openxmlformats.org/officeDocument/2006/math" xmlns:a14="http://schemas.microsoft.com/office/drawing/2010/main" xmlns:ma14="http://schemas.microsoft.com/office/mac/drawingml/2011/main" val="1"/>
+              <ma14:wrappingTextBoxFlag xmlns:ma14="http://schemas.microsoft.com/office/mac/drawingml/2011/main" xmlns:a14="http://schemas.microsoft.com/office/drawing/2010/main" xmlns:m="http://schemas.openxmlformats.org/officeDocument/2006/math" xmlns="" val="1"/>
             </a:ext>
           </a:extLst>
         </p:spPr>
@@ -21601,7 +21581,7 @@
           </a:ln>
           <a:extLst>
             <a:ext uri="{C572A759-6A51-4108-AA02-DFA0A04FC94B}">
-              <ma14:wrappingTextBoxFlag xmlns="" xmlns:m="http://schemas.openxmlformats.org/officeDocument/2006/math" xmlns:a14="http://schemas.microsoft.com/office/drawing/2010/main" xmlns:ma14="http://schemas.microsoft.com/office/mac/drawingml/2011/main" val="1"/>
+              <ma14:wrappingTextBoxFlag xmlns:ma14="http://schemas.microsoft.com/office/mac/drawingml/2011/main" xmlns:a14="http://schemas.microsoft.com/office/drawing/2010/main" xmlns:m="http://schemas.openxmlformats.org/officeDocument/2006/math" xmlns="" val="1"/>
             </a:ext>
           </a:extLst>
         </p:spPr>
@@ -21636,7 +21616,7 @@
           </a:ln>
           <a:extLst>
             <a:ext uri="{C572A759-6A51-4108-AA02-DFA0A04FC94B}">
-              <ma14:wrappingTextBoxFlag xmlns="" xmlns:m="http://schemas.openxmlformats.org/officeDocument/2006/math" xmlns:a14="http://schemas.microsoft.com/office/drawing/2010/main" xmlns:ma14="http://schemas.microsoft.com/office/mac/drawingml/2011/main" val="1"/>
+              <ma14:wrappingTextBoxFlag xmlns:ma14="http://schemas.microsoft.com/office/mac/drawingml/2011/main" xmlns:a14="http://schemas.microsoft.com/office/drawing/2010/main" xmlns:m="http://schemas.openxmlformats.org/officeDocument/2006/math" xmlns="" val="1"/>
             </a:ext>
           </a:extLst>
         </p:spPr>
@@ -21671,7 +21651,7 @@
           </a:ln>
           <a:extLst>
             <a:ext uri="{C572A759-6A51-4108-AA02-DFA0A04FC94B}">
-              <ma14:wrappingTextBoxFlag xmlns="" xmlns:m="http://schemas.openxmlformats.org/officeDocument/2006/math" xmlns:a14="http://schemas.microsoft.com/office/drawing/2010/main" xmlns:ma14="http://schemas.microsoft.com/office/mac/drawingml/2011/main" val="1"/>
+              <ma14:wrappingTextBoxFlag xmlns:ma14="http://schemas.microsoft.com/office/mac/drawingml/2011/main" xmlns:a14="http://schemas.microsoft.com/office/drawing/2010/main" xmlns:m="http://schemas.openxmlformats.org/officeDocument/2006/math" xmlns="" val="1"/>
             </a:ext>
           </a:extLst>
         </p:spPr>
@@ -21769,7 +21749,7 @@
           </a:ln>
           <a:extLst>
             <a:ext uri="{C572A759-6A51-4108-AA02-DFA0A04FC94B}">
-              <ma14:wrappingTextBoxFlag xmlns="" xmlns:m="http://schemas.openxmlformats.org/officeDocument/2006/math" xmlns:a14="http://schemas.microsoft.com/office/drawing/2010/main" xmlns:ma14="http://schemas.microsoft.com/office/mac/drawingml/2011/main" val="1"/>
+              <ma14:wrappingTextBoxFlag xmlns:ma14="http://schemas.microsoft.com/office/mac/drawingml/2011/main" xmlns:a14="http://schemas.microsoft.com/office/drawing/2010/main" xmlns:m="http://schemas.openxmlformats.org/officeDocument/2006/math" xmlns="" val="1"/>
             </a:ext>
           </a:extLst>
         </p:spPr>
@@ -21838,7 +21818,7 @@
           </a:ln>
           <a:extLst>
             <a:ext uri="{C572A759-6A51-4108-AA02-DFA0A04FC94B}">
-              <ma14:wrappingTextBoxFlag xmlns="" xmlns:m="http://schemas.openxmlformats.org/officeDocument/2006/math" xmlns:a14="http://schemas.microsoft.com/office/drawing/2010/main" xmlns:ma14="http://schemas.microsoft.com/office/mac/drawingml/2011/main" val="1"/>
+              <ma14:wrappingTextBoxFlag xmlns:ma14="http://schemas.microsoft.com/office/mac/drawingml/2011/main" xmlns:a14="http://schemas.microsoft.com/office/drawing/2010/main" xmlns:m="http://schemas.openxmlformats.org/officeDocument/2006/math" xmlns="" val="1"/>
             </a:ext>
           </a:extLst>
         </p:spPr>
@@ -21885,7 +21865,7 @@
           </a:ln>
           <a:extLst>
             <a:ext uri="{C572A759-6A51-4108-AA02-DFA0A04FC94B}">
-              <ma14:wrappingTextBoxFlag xmlns="" xmlns:m="http://schemas.openxmlformats.org/officeDocument/2006/math" xmlns:a14="http://schemas.microsoft.com/office/drawing/2010/main" xmlns:ma14="http://schemas.microsoft.com/office/mac/drawingml/2011/main" val="1"/>
+              <ma14:wrappingTextBoxFlag xmlns:ma14="http://schemas.microsoft.com/office/mac/drawingml/2011/main" xmlns:a14="http://schemas.microsoft.com/office/drawing/2010/main" xmlns:m="http://schemas.openxmlformats.org/officeDocument/2006/math" xmlns="" val="1"/>
             </a:ext>
           </a:extLst>
         </p:spPr>
@@ -21932,7 +21912,7 @@
           </a:ln>
           <a:extLst>
             <a:ext uri="{C572A759-6A51-4108-AA02-DFA0A04FC94B}">
-              <ma14:wrappingTextBoxFlag xmlns="" xmlns:m="http://schemas.openxmlformats.org/officeDocument/2006/math" xmlns:a14="http://schemas.microsoft.com/office/drawing/2010/main" xmlns:ma14="http://schemas.microsoft.com/office/mac/drawingml/2011/main" val="1"/>
+              <ma14:wrappingTextBoxFlag xmlns:ma14="http://schemas.microsoft.com/office/mac/drawingml/2011/main" xmlns:a14="http://schemas.microsoft.com/office/drawing/2010/main" xmlns:m="http://schemas.openxmlformats.org/officeDocument/2006/math" xmlns="" val="1"/>
             </a:ext>
           </a:extLst>
         </p:spPr>
@@ -22118,7 +22098,7 @@
           </a:ln>
           <a:extLst>
             <a:ext uri="{C572A759-6A51-4108-AA02-DFA0A04FC94B}">
-              <ma14:wrappingTextBoxFlag xmlns="" xmlns:m="http://schemas.openxmlformats.org/officeDocument/2006/math" xmlns:a14="http://schemas.microsoft.com/office/drawing/2010/main" xmlns:ma14="http://schemas.microsoft.com/office/mac/drawingml/2011/main" val="1"/>
+              <ma14:wrappingTextBoxFlag xmlns:ma14="http://schemas.microsoft.com/office/mac/drawingml/2011/main" xmlns:a14="http://schemas.microsoft.com/office/drawing/2010/main" xmlns:m="http://schemas.openxmlformats.org/officeDocument/2006/math" xmlns="" val="1"/>
             </a:ext>
           </a:extLst>
         </p:spPr>
@@ -22210,7 +22190,7 @@
           </a:ln>
           <a:extLst>
             <a:ext uri="{C572A759-6A51-4108-AA02-DFA0A04FC94B}">
-              <ma14:wrappingTextBoxFlag xmlns="" xmlns:m="http://schemas.openxmlformats.org/officeDocument/2006/math" xmlns:a14="http://schemas.microsoft.com/office/drawing/2010/main" xmlns:ma14="http://schemas.microsoft.com/office/mac/drawingml/2011/main" val="1"/>
+              <ma14:wrappingTextBoxFlag xmlns:ma14="http://schemas.microsoft.com/office/mac/drawingml/2011/main" xmlns:a14="http://schemas.microsoft.com/office/drawing/2010/main" xmlns:m="http://schemas.openxmlformats.org/officeDocument/2006/math" xmlns="" val="1"/>
             </a:ext>
           </a:extLst>
         </p:spPr>
@@ -22335,7 +22315,7 @@
           </a:ln>
           <a:extLst>
             <a:ext uri="{C572A759-6A51-4108-AA02-DFA0A04FC94B}">
-              <ma14:wrappingTextBoxFlag xmlns="" xmlns:m="http://schemas.openxmlformats.org/officeDocument/2006/math" xmlns:a14="http://schemas.microsoft.com/office/drawing/2010/main" xmlns:ma14="http://schemas.microsoft.com/office/mac/drawingml/2011/main" val="1"/>
+              <ma14:wrappingTextBoxFlag xmlns:ma14="http://schemas.microsoft.com/office/mac/drawingml/2011/main" xmlns:a14="http://schemas.microsoft.com/office/drawing/2010/main" xmlns:m="http://schemas.openxmlformats.org/officeDocument/2006/math" xmlns="" val="1"/>
             </a:ext>
           </a:extLst>
         </p:spPr>
@@ -22445,7 +22425,7 @@
           </a:ln>
           <a:extLst>
             <a:ext uri="{C572A759-6A51-4108-AA02-DFA0A04FC94B}">
-              <ma14:wrappingTextBoxFlag xmlns="" xmlns:m="http://schemas.openxmlformats.org/officeDocument/2006/math" xmlns:a14="http://schemas.microsoft.com/office/drawing/2010/main" xmlns:ma14="http://schemas.microsoft.com/office/mac/drawingml/2011/main" val="1"/>
+              <ma14:wrappingTextBoxFlag xmlns:ma14="http://schemas.microsoft.com/office/mac/drawingml/2011/main" xmlns:a14="http://schemas.microsoft.com/office/drawing/2010/main" xmlns:m="http://schemas.openxmlformats.org/officeDocument/2006/math" xmlns="" val="1"/>
             </a:ext>
           </a:extLst>
         </p:spPr>
@@ -22563,7 +22543,7 @@
           </a:ln>
           <a:extLst>
             <a:ext uri="{C572A759-6A51-4108-AA02-DFA0A04FC94B}">
-              <ma14:wrappingTextBoxFlag xmlns="" xmlns:m="http://schemas.openxmlformats.org/officeDocument/2006/math" xmlns:a14="http://schemas.microsoft.com/office/drawing/2010/main" xmlns:ma14="http://schemas.microsoft.com/office/mac/drawingml/2011/main" val="1"/>
+              <ma14:wrappingTextBoxFlag xmlns:ma14="http://schemas.microsoft.com/office/mac/drawingml/2011/main" xmlns:a14="http://schemas.microsoft.com/office/drawing/2010/main" xmlns:m="http://schemas.openxmlformats.org/officeDocument/2006/math" xmlns="" val="1"/>
             </a:ext>
           </a:extLst>
         </p:spPr>
@@ -22795,7 +22775,7 @@
           </a:ln>
           <a:extLst>
             <a:ext uri="{C572A759-6A51-4108-AA02-DFA0A04FC94B}">
-              <ma14:wrappingTextBoxFlag xmlns="" xmlns:m="http://schemas.openxmlformats.org/officeDocument/2006/math" xmlns:a14="http://schemas.microsoft.com/office/drawing/2010/main" xmlns:ma14="http://schemas.microsoft.com/office/mac/drawingml/2011/main" val="1"/>
+              <ma14:wrappingTextBoxFlag xmlns:ma14="http://schemas.microsoft.com/office/mac/drawingml/2011/main" xmlns:a14="http://schemas.microsoft.com/office/drawing/2010/main" xmlns:m="http://schemas.openxmlformats.org/officeDocument/2006/math" xmlns="" val="1"/>
             </a:ext>
           </a:extLst>
         </p:spPr>
@@ -22830,7 +22810,7 @@
           </a:ln>
           <a:extLst>
             <a:ext uri="{C572A759-6A51-4108-AA02-DFA0A04FC94B}">
-              <ma14:wrappingTextBoxFlag xmlns="" xmlns:m="http://schemas.openxmlformats.org/officeDocument/2006/math" xmlns:a14="http://schemas.microsoft.com/office/drawing/2010/main" xmlns:ma14="http://schemas.microsoft.com/office/mac/drawingml/2011/main" val="1"/>
+              <ma14:wrappingTextBoxFlag xmlns:ma14="http://schemas.microsoft.com/office/mac/drawingml/2011/main" xmlns:a14="http://schemas.microsoft.com/office/drawing/2010/main" xmlns:m="http://schemas.openxmlformats.org/officeDocument/2006/math" xmlns="" val="1"/>
             </a:ext>
           </a:extLst>
         </p:spPr>
@@ -22865,7 +22845,7 @@
           </a:ln>
           <a:extLst>
             <a:ext uri="{C572A759-6A51-4108-AA02-DFA0A04FC94B}">
-              <ma14:wrappingTextBoxFlag xmlns="" xmlns:m="http://schemas.openxmlformats.org/officeDocument/2006/math" xmlns:a14="http://schemas.microsoft.com/office/drawing/2010/main" xmlns:ma14="http://schemas.microsoft.com/office/mac/drawingml/2011/main" val="1"/>
+              <ma14:wrappingTextBoxFlag xmlns:ma14="http://schemas.microsoft.com/office/mac/drawingml/2011/main" xmlns:a14="http://schemas.microsoft.com/office/drawing/2010/main" xmlns:m="http://schemas.openxmlformats.org/officeDocument/2006/math" xmlns="" val="1"/>
             </a:ext>
           </a:extLst>
         </p:spPr>
@@ -22963,7 +22943,7 @@
           </a:ln>
           <a:extLst>
             <a:ext uri="{C572A759-6A51-4108-AA02-DFA0A04FC94B}">
-              <ma14:wrappingTextBoxFlag xmlns="" xmlns:m="http://schemas.openxmlformats.org/officeDocument/2006/math" xmlns:a14="http://schemas.microsoft.com/office/drawing/2010/main" xmlns:ma14="http://schemas.microsoft.com/office/mac/drawingml/2011/main" val="1"/>
+              <ma14:wrappingTextBoxFlag xmlns:ma14="http://schemas.microsoft.com/office/mac/drawingml/2011/main" xmlns:a14="http://schemas.microsoft.com/office/drawing/2010/main" xmlns:m="http://schemas.openxmlformats.org/officeDocument/2006/math" xmlns="" val="1"/>
             </a:ext>
           </a:extLst>
         </p:spPr>
@@ -23032,7 +23012,7 @@
           </a:ln>
           <a:extLst>
             <a:ext uri="{C572A759-6A51-4108-AA02-DFA0A04FC94B}">
-              <ma14:wrappingTextBoxFlag xmlns="" xmlns:m="http://schemas.openxmlformats.org/officeDocument/2006/math" xmlns:a14="http://schemas.microsoft.com/office/drawing/2010/main" xmlns:ma14="http://schemas.microsoft.com/office/mac/drawingml/2011/main" val="1"/>
+              <ma14:wrappingTextBoxFlag xmlns:ma14="http://schemas.microsoft.com/office/mac/drawingml/2011/main" xmlns:a14="http://schemas.microsoft.com/office/drawing/2010/main" xmlns:m="http://schemas.openxmlformats.org/officeDocument/2006/math" xmlns="" val="1"/>
             </a:ext>
           </a:extLst>
         </p:spPr>
@@ -23079,7 +23059,7 @@
           </a:ln>
           <a:extLst>
             <a:ext uri="{C572A759-6A51-4108-AA02-DFA0A04FC94B}">
-              <ma14:wrappingTextBoxFlag xmlns="" xmlns:m="http://schemas.openxmlformats.org/officeDocument/2006/math" xmlns:a14="http://schemas.microsoft.com/office/drawing/2010/main" xmlns:ma14="http://schemas.microsoft.com/office/mac/drawingml/2011/main" val="1"/>
+              <ma14:wrappingTextBoxFlag xmlns:ma14="http://schemas.microsoft.com/office/mac/drawingml/2011/main" xmlns:a14="http://schemas.microsoft.com/office/drawing/2010/main" xmlns:m="http://schemas.openxmlformats.org/officeDocument/2006/math" xmlns="" val="1"/>
             </a:ext>
           </a:extLst>
         </p:spPr>
@@ -23126,7 +23106,7 @@
           </a:ln>
           <a:extLst>
             <a:ext uri="{C572A759-6A51-4108-AA02-DFA0A04FC94B}">
-              <ma14:wrappingTextBoxFlag xmlns="" xmlns:m="http://schemas.openxmlformats.org/officeDocument/2006/math" xmlns:a14="http://schemas.microsoft.com/office/drawing/2010/main" xmlns:ma14="http://schemas.microsoft.com/office/mac/drawingml/2011/main" val="1"/>
+              <ma14:wrappingTextBoxFlag xmlns:ma14="http://schemas.microsoft.com/office/mac/drawingml/2011/main" xmlns:a14="http://schemas.microsoft.com/office/drawing/2010/main" xmlns:m="http://schemas.openxmlformats.org/officeDocument/2006/math" xmlns="" val="1"/>
             </a:ext>
           </a:extLst>
         </p:spPr>
@@ -23312,7 +23292,7 @@
           </a:ln>
           <a:extLst>
             <a:ext uri="{C572A759-6A51-4108-AA02-DFA0A04FC94B}">
-              <ma14:wrappingTextBoxFlag xmlns="" xmlns:m="http://schemas.openxmlformats.org/officeDocument/2006/math" xmlns:a14="http://schemas.microsoft.com/office/drawing/2010/main" xmlns:ma14="http://schemas.microsoft.com/office/mac/drawingml/2011/main" val="1"/>
+              <ma14:wrappingTextBoxFlag xmlns:ma14="http://schemas.microsoft.com/office/mac/drawingml/2011/main" xmlns:a14="http://schemas.microsoft.com/office/drawing/2010/main" xmlns:m="http://schemas.openxmlformats.org/officeDocument/2006/math" xmlns="" val="1"/>
             </a:ext>
           </a:extLst>
         </p:spPr>
@@ -23404,7 +23384,7 @@
           </a:ln>
           <a:extLst>
             <a:ext uri="{C572A759-6A51-4108-AA02-DFA0A04FC94B}">
-              <ma14:wrappingTextBoxFlag xmlns="" xmlns:m="http://schemas.openxmlformats.org/officeDocument/2006/math" xmlns:a14="http://schemas.microsoft.com/office/drawing/2010/main" xmlns:ma14="http://schemas.microsoft.com/office/mac/drawingml/2011/main" val="1"/>
+              <ma14:wrappingTextBoxFlag xmlns:ma14="http://schemas.microsoft.com/office/mac/drawingml/2011/main" xmlns:a14="http://schemas.microsoft.com/office/drawing/2010/main" xmlns:m="http://schemas.openxmlformats.org/officeDocument/2006/math" xmlns="" val="1"/>
             </a:ext>
           </a:extLst>
         </p:spPr>
@@ -23529,7 +23509,7 @@
           </a:ln>
           <a:extLst>
             <a:ext uri="{C572A759-6A51-4108-AA02-DFA0A04FC94B}">
-              <ma14:wrappingTextBoxFlag xmlns="" xmlns:m="http://schemas.openxmlformats.org/officeDocument/2006/math" xmlns:a14="http://schemas.microsoft.com/office/drawing/2010/main" xmlns:ma14="http://schemas.microsoft.com/office/mac/drawingml/2011/main" val="1"/>
+              <ma14:wrappingTextBoxFlag xmlns:ma14="http://schemas.microsoft.com/office/mac/drawingml/2011/main" xmlns:a14="http://schemas.microsoft.com/office/drawing/2010/main" xmlns:m="http://schemas.openxmlformats.org/officeDocument/2006/math" xmlns="" val="1"/>
             </a:ext>
           </a:extLst>
         </p:spPr>
@@ -23639,7 +23619,7 @@
           </a:ln>
           <a:extLst>
             <a:ext uri="{C572A759-6A51-4108-AA02-DFA0A04FC94B}">
-              <ma14:wrappingTextBoxFlag xmlns="" xmlns:m="http://schemas.openxmlformats.org/officeDocument/2006/math" xmlns:a14="http://schemas.microsoft.com/office/drawing/2010/main" xmlns:ma14="http://schemas.microsoft.com/office/mac/drawingml/2011/main" val="1"/>
+              <ma14:wrappingTextBoxFlag xmlns:ma14="http://schemas.microsoft.com/office/mac/drawingml/2011/main" xmlns:a14="http://schemas.microsoft.com/office/drawing/2010/main" xmlns:m="http://schemas.openxmlformats.org/officeDocument/2006/math" xmlns="" val="1"/>
             </a:ext>
           </a:extLst>
         </p:spPr>
@@ -23757,7 +23737,7 @@
           </a:ln>
           <a:extLst>
             <a:ext uri="{C572A759-6A51-4108-AA02-DFA0A04FC94B}">
-              <ma14:wrappingTextBoxFlag xmlns="" xmlns:m="http://schemas.openxmlformats.org/officeDocument/2006/math" xmlns:a14="http://schemas.microsoft.com/office/drawing/2010/main" xmlns:ma14="http://schemas.microsoft.com/office/mac/drawingml/2011/main" val="1"/>
+              <ma14:wrappingTextBoxFlag xmlns:ma14="http://schemas.microsoft.com/office/mac/drawingml/2011/main" xmlns:a14="http://schemas.microsoft.com/office/drawing/2010/main" xmlns:m="http://schemas.openxmlformats.org/officeDocument/2006/math" xmlns="" val="1"/>
             </a:ext>
           </a:extLst>
         </p:spPr>

</xml_diff>